<commit_message>
Tabelle zur Abdeckung hinzugefügt
</commit_message>
<xml_diff>
--- a/Dokumente/Qualitätssicherung/Präsentation.pptx
+++ b/Dokumente/Qualitätssicherung/Präsentation.pptx
@@ -147,7 +147,7 @@
           <p:cNvPr id="2" name="Titel 1">
             <a:extLst>
               <a:ext uri="{FF2B5EF4-FFF2-40B4-BE49-F238E27FC236}">
-                <a16:creationId xmlns:a16="http://schemas.microsoft.com/office/drawing/2014/main" id="{F46E85E9-EF07-4635-9681-A5B127DB4D73}"/>
+                <a16:creationId xmlns:a16="http://schemas.microsoft.com/office/drawing/2014/main" xmlns="" id="{F46E85E9-EF07-4635-9681-A5B127DB4D73}"/>
               </a:ext>
             </a:extLst>
           </p:cNvPr>
@@ -185,7 +185,7 @@
           <p:cNvPr id="3" name="Untertitel 2">
             <a:extLst>
               <a:ext uri="{FF2B5EF4-FFF2-40B4-BE49-F238E27FC236}">
-                <a16:creationId xmlns:a16="http://schemas.microsoft.com/office/drawing/2014/main" id="{9E28B89C-A2D1-4D78-9706-A1AB65A1AF20}"/>
+                <a16:creationId xmlns:a16="http://schemas.microsoft.com/office/drawing/2014/main" xmlns="" id="{9E28B89C-A2D1-4D78-9706-A1AB65A1AF20}"/>
               </a:ext>
             </a:extLst>
           </p:cNvPr>
@@ -256,7 +256,7 @@
           <p:cNvPr id="4" name="Datumsplatzhalter 3">
             <a:extLst>
               <a:ext uri="{FF2B5EF4-FFF2-40B4-BE49-F238E27FC236}">
-                <a16:creationId xmlns:a16="http://schemas.microsoft.com/office/drawing/2014/main" id="{D0D44B21-C470-48F4-98FA-209BA90218A9}"/>
+                <a16:creationId xmlns:a16="http://schemas.microsoft.com/office/drawing/2014/main" xmlns="" id="{D0D44B21-C470-48F4-98FA-209BA90218A9}"/>
               </a:ext>
             </a:extLst>
           </p:cNvPr>
@@ -274,7 +274,7 @@
           <a:p>
             <a:fld id="{B94FB1BE-082E-4373-BD0C-0A54DA9A4AF0}" type="datetimeFigureOut">
               <a:rPr lang="de-CH" smtClean="0"/>
-              <a:t>21.02.2019</a:t>
+              <a:t>21.02.19</a:t>
             </a:fld>
             <a:endParaRPr lang="de-CH"/>
           </a:p>
@@ -285,7 +285,7 @@
           <p:cNvPr id="5" name="Fußzeilenplatzhalter 4">
             <a:extLst>
               <a:ext uri="{FF2B5EF4-FFF2-40B4-BE49-F238E27FC236}">
-                <a16:creationId xmlns:a16="http://schemas.microsoft.com/office/drawing/2014/main" id="{55CF6F98-68E1-4363-9B24-DC0D5C72847F}"/>
+                <a16:creationId xmlns:a16="http://schemas.microsoft.com/office/drawing/2014/main" xmlns="" id="{55CF6F98-68E1-4363-9B24-DC0D5C72847F}"/>
               </a:ext>
             </a:extLst>
           </p:cNvPr>
@@ -310,7 +310,7 @@
           <p:cNvPr id="6" name="Foliennummernplatzhalter 5">
             <a:extLst>
               <a:ext uri="{FF2B5EF4-FFF2-40B4-BE49-F238E27FC236}">
-                <a16:creationId xmlns:a16="http://schemas.microsoft.com/office/drawing/2014/main" id="{A03293D5-8E8E-499D-9962-51DD827D138F}"/>
+                <a16:creationId xmlns:a16="http://schemas.microsoft.com/office/drawing/2014/main" xmlns="" id="{A03293D5-8E8E-499D-9962-51DD827D138F}"/>
               </a:ext>
             </a:extLst>
           </p:cNvPr>
@@ -369,7 +369,7 @@
           <p:cNvPr id="2" name="Titel 1">
             <a:extLst>
               <a:ext uri="{FF2B5EF4-FFF2-40B4-BE49-F238E27FC236}">
-                <a16:creationId xmlns:a16="http://schemas.microsoft.com/office/drawing/2014/main" id="{10E81F66-7B53-4398-9D74-0508C34D003B}"/>
+                <a16:creationId xmlns:a16="http://schemas.microsoft.com/office/drawing/2014/main" xmlns="" id="{10E81F66-7B53-4398-9D74-0508C34D003B}"/>
               </a:ext>
             </a:extLst>
           </p:cNvPr>
@@ -398,7 +398,7 @@
           <p:cNvPr id="3" name="Vertikaler Textplatzhalter 2">
             <a:extLst>
               <a:ext uri="{FF2B5EF4-FFF2-40B4-BE49-F238E27FC236}">
-                <a16:creationId xmlns:a16="http://schemas.microsoft.com/office/drawing/2014/main" id="{C22D5661-8400-47C4-ADE2-7E209A248419}"/>
+                <a16:creationId xmlns:a16="http://schemas.microsoft.com/office/drawing/2014/main" xmlns="" id="{C22D5661-8400-47C4-ADE2-7E209A248419}"/>
               </a:ext>
             </a:extLst>
           </p:cNvPr>
@@ -456,7 +456,7 @@
           <p:cNvPr id="4" name="Datumsplatzhalter 3">
             <a:extLst>
               <a:ext uri="{FF2B5EF4-FFF2-40B4-BE49-F238E27FC236}">
-                <a16:creationId xmlns:a16="http://schemas.microsoft.com/office/drawing/2014/main" id="{07F4DCCD-42FB-4380-A06C-DE13C09BD74B}"/>
+                <a16:creationId xmlns:a16="http://schemas.microsoft.com/office/drawing/2014/main" xmlns="" id="{07F4DCCD-42FB-4380-A06C-DE13C09BD74B}"/>
               </a:ext>
             </a:extLst>
           </p:cNvPr>
@@ -474,7 +474,7 @@
           <a:p>
             <a:fld id="{B94FB1BE-082E-4373-BD0C-0A54DA9A4AF0}" type="datetimeFigureOut">
               <a:rPr lang="de-CH" smtClean="0"/>
-              <a:t>21.02.2019</a:t>
+              <a:t>21.02.19</a:t>
             </a:fld>
             <a:endParaRPr lang="de-CH"/>
           </a:p>
@@ -485,7 +485,7 @@
           <p:cNvPr id="5" name="Fußzeilenplatzhalter 4">
             <a:extLst>
               <a:ext uri="{FF2B5EF4-FFF2-40B4-BE49-F238E27FC236}">
-                <a16:creationId xmlns:a16="http://schemas.microsoft.com/office/drawing/2014/main" id="{089A97AE-6258-46CB-BB74-776E7763E34B}"/>
+                <a16:creationId xmlns:a16="http://schemas.microsoft.com/office/drawing/2014/main" xmlns="" id="{089A97AE-6258-46CB-BB74-776E7763E34B}"/>
               </a:ext>
             </a:extLst>
           </p:cNvPr>
@@ -510,7 +510,7 @@
           <p:cNvPr id="6" name="Foliennummernplatzhalter 5">
             <a:extLst>
               <a:ext uri="{FF2B5EF4-FFF2-40B4-BE49-F238E27FC236}">
-                <a16:creationId xmlns:a16="http://schemas.microsoft.com/office/drawing/2014/main" id="{C32B7039-4D09-4954-80A9-570EAA41E85C}"/>
+                <a16:creationId xmlns:a16="http://schemas.microsoft.com/office/drawing/2014/main" xmlns="" id="{C32B7039-4D09-4954-80A9-570EAA41E85C}"/>
               </a:ext>
             </a:extLst>
           </p:cNvPr>
@@ -569,7 +569,7 @@
           <p:cNvPr id="2" name="Vertikaler Titel 1">
             <a:extLst>
               <a:ext uri="{FF2B5EF4-FFF2-40B4-BE49-F238E27FC236}">
-                <a16:creationId xmlns:a16="http://schemas.microsoft.com/office/drawing/2014/main" id="{96C9868A-6D96-447D-B514-294EDC02315E}"/>
+                <a16:creationId xmlns:a16="http://schemas.microsoft.com/office/drawing/2014/main" xmlns="" id="{96C9868A-6D96-447D-B514-294EDC02315E}"/>
               </a:ext>
             </a:extLst>
           </p:cNvPr>
@@ -603,7 +603,7 @@
           <p:cNvPr id="3" name="Vertikaler Textplatzhalter 2">
             <a:extLst>
               <a:ext uri="{FF2B5EF4-FFF2-40B4-BE49-F238E27FC236}">
-                <a16:creationId xmlns:a16="http://schemas.microsoft.com/office/drawing/2014/main" id="{F2AADB6C-9E4A-4380-8C4B-15C50EB83BEC}"/>
+                <a16:creationId xmlns:a16="http://schemas.microsoft.com/office/drawing/2014/main" xmlns="" id="{F2AADB6C-9E4A-4380-8C4B-15C50EB83BEC}"/>
               </a:ext>
             </a:extLst>
           </p:cNvPr>
@@ -666,7 +666,7 @@
           <p:cNvPr id="4" name="Datumsplatzhalter 3">
             <a:extLst>
               <a:ext uri="{FF2B5EF4-FFF2-40B4-BE49-F238E27FC236}">
-                <a16:creationId xmlns:a16="http://schemas.microsoft.com/office/drawing/2014/main" id="{225817EA-7BEB-4E38-8282-32A9328D01A6}"/>
+                <a16:creationId xmlns:a16="http://schemas.microsoft.com/office/drawing/2014/main" xmlns="" id="{225817EA-7BEB-4E38-8282-32A9328D01A6}"/>
               </a:ext>
             </a:extLst>
           </p:cNvPr>
@@ -684,7 +684,7 @@
           <a:p>
             <a:fld id="{B94FB1BE-082E-4373-BD0C-0A54DA9A4AF0}" type="datetimeFigureOut">
               <a:rPr lang="de-CH" smtClean="0"/>
-              <a:t>21.02.2019</a:t>
+              <a:t>21.02.19</a:t>
             </a:fld>
             <a:endParaRPr lang="de-CH"/>
           </a:p>
@@ -695,7 +695,7 @@
           <p:cNvPr id="5" name="Fußzeilenplatzhalter 4">
             <a:extLst>
               <a:ext uri="{FF2B5EF4-FFF2-40B4-BE49-F238E27FC236}">
-                <a16:creationId xmlns:a16="http://schemas.microsoft.com/office/drawing/2014/main" id="{C39FD084-0A7B-479D-9670-1A0AF68E21F9}"/>
+                <a16:creationId xmlns:a16="http://schemas.microsoft.com/office/drawing/2014/main" xmlns="" id="{C39FD084-0A7B-479D-9670-1A0AF68E21F9}"/>
               </a:ext>
             </a:extLst>
           </p:cNvPr>
@@ -720,7 +720,7 @@
           <p:cNvPr id="6" name="Foliennummernplatzhalter 5">
             <a:extLst>
               <a:ext uri="{FF2B5EF4-FFF2-40B4-BE49-F238E27FC236}">
-                <a16:creationId xmlns:a16="http://schemas.microsoft.com/office/drawing/2014/main" id="{96761BD4-AD0E-427C-B3C7-FF6C8EF88839}"/>
+                <a16:creationId xmlns:a16="http://schemas.microsoft.com/office/drawing/2014/main" xmlns="" id="{96761BD4-AD0E-427C-B3C7-FF6C8EF88839}"/>
               </a:ext>
             </a:extLst>
           </p:cNvPr>
@@ -779,7 +779,7 @@
           <p:cNvPr id="2" name="Titel 1">
             <a:extLst>
               <a:ext uri="{FF2B5EF4-FFF2-40B4-BE49-F238E27FC236}">
-                <a16:creationId xmlns:a16="http://schemas.microsoft.com/office/drawing/2014/main" id="{73BE75A9-35DE-49BC-B3BA-4037CD89E35B}"/>
+                <a16:creationId xmlns:a16="http://schemas.microsoft.com/office/drawing/2014/main" xmlns="" id="{73BE75A9-35DE-49BC-B3BA-4037CD89E35B}"/>
               </a:ext>
             </a:extLst>
           </p:cNvPr>
@@ -808,7 +808,7 @@
           <p:cNvPr id="3" name="Inhaltsplatzhalter 2">
             <a:extLst>
               <a:ext uri="{FF2B5EF4-FFF2-40B4-BE49-F238E27FC236}">
-                <a16:creationId xmlns:a16="http://schemas.microsoft.com/office/drawing/2014/main" id="{1871BC89-C33C-466F-BAC8-DFD1EAC65E66}"/>
+                <a16:creationId xmlns:a16="http://schemas.microsoft.com/office/drawing/2014/main" xmlns="" id="{1871BC89-C33C-466F-BAC8-DFD1EAC65E66}"/>
               </a:ext>
             </a:extLst>
           </p:cNvPr>
@@ -866,7 +866,7 @@
           <p:cNvPr id="4" name="Datumsplatzhalter 3">
             <a:extLst>
               <a:ext uri="{FF2B5EF4-FFF2-40B4-BE49-F238E27FC236}">
-                <a16:creationId xmlns:a16="http://schemas.microsoft.com/office/drawing/2014/main" id="{DE2C0D84-A289-45FB-8A2B-40FDBC2CD905}"/>
+                <a16:creationId xmlns:a16="http://schemas.microsoft.com/office/drawing/2014/main" xmlns="" id="{DE2C0D84-A289-45FB-8A2B-40FDBC2CD905}"/>
               </a:ext>
             </a:extLst>
           </p:cNvPr>
@@ -884,7 +884,7 @@
           <a:p>
             <a:fld id="{B94FB1BE-082E-4373-BD0C-0A54DA9A4AF0}" type="datetimeFigureOut">
               <a:rPr lang="de-CH" smtClean="0"/>
-              <a:t>21.02.2019</a:t>
+              <a:t>21.02.19</a:t>
             </a:fld>
             <a:endParaRPr lang="de-CH"/>
           </a:p>
@@ -895,7 +895,7 @@
           <p:cNvPr id="5" name="Fußzeilenplatzhalter 4">
             <a:extLst>
               <a:ext uri="{FF2B5EF4-FFF2-40B4-BE49-F238E27FC236}">
-                <a16:creationId xmlns:a16="http://schemas.microsoft.com/office/drawing/2014/main" id="{BF26B90F-836D-4CE7-B1D3-6F52FEA5392A}"/>
+                <a16:creationId xmlns:a16="http://schemas.microsoft.com/office/drawing/2014/main" xmlns="" id="{BF26B90F-836D-4CE7-B1D3-6F52FEA5392A}"/>
               </a:ext>
             </a:extLst>
           </p:cNvPr>
@@ -920,7 +920,7 @@
           <p:cNvPr id="6" name="Foliennummernplatzhalter 5">
             <a:extLst>
               <a:ext uri="{FF2B5EF4-FFF2-40B4-BE49-F238E27FC236}">
-                <a16:creationId xmlns:a16="http://schemas.microsoft.com/office/drawing/2014/main" id="{4A2EEE48-D597-431A-8857-5FEBC6744564}"/>
+                <a16:creationId xmlns:a16="http://schemas.microsoft.com/office/drawing/2014/main" xmlns="" id="{4A2EEE48-D597-431A-8857-5FEBC6744564}"/>
               </a:ext>
             </a:extLst>
           </p:cNvPr>
@@ -979,7 +979,7 @@
           <p:cNvPr id="2" name="Titel 1">
             <a:extLst>
               <a:ext uri="{FF2B5EF4-FFF2-40B4-BE49-F238E27FC236}">
-                <a16:creationId xmlns:a16="http://schemas.microsoft.com/office/drawing/2014/main" id="{690E032A-DDF2-4FA1-8F7B-7E37DE99765C}"/>
+                <a16:creationId xmlns:a16="http://schemas.microsoft.com/office/drawing/2014/main" xmlns="" id="{690E032A-DDF2-4FA1-8F7B-7E37DE99765C}"/>
               </a:ext>
             </a:extLst>
           </p:cNvPr>
@@ -1017,7 +1017,7 @@
           <p:cNvPr id="3" name="Textplatzhalter 2">
             <a:extLst>
               <a:ext uri="{FF2B5EF4-FFF2-40B4-BE49-F238E27FC236}">
-                <a16:creationId xmlns:a16="http://schemas.microsoft.com/office/drawing/2014/main" id="{ED6E872C-0B3D-47D6-A955-0FE51019E65D}"/>
+                <a16:creationId xmlns:a16="http://schemas.microsoft.com/office/drawing/2014/main" xmlns="" id="{ED6E872C-0B3D-47D6-A955-0FE51019E65D}"/>
               </a:ext>
             </a:extLst>
           </p:cNvPr>
@@ -1142,7 +1142,7 @@
           <p:cNvPr id="4" name="Datumsplatzhalter 3">
             <a:extLst>
               <a:ext uri="{FF2B5EF4-FFF2-40B4-BE49-F238E27FC236}">
-                <a16:creationId xmlns:a16="http://schemas.microsoft.com/office/drawing/2014/main" id="{20F44373-ECFA-4E13-8696-B335F190B236}"/>
+                <a16:creationId xmlns:a16="http://schemas.microsoft.com/office/drawing/2014/main" xmlns="" id="{20F44373-ECFA-4E13-8696-B335F190B236}"/>
               </a:ext>
             </a:extLst>
           </p:cNvPr>
@@ -1160,7 +1160,7 @@
           <a:p>
             <a:fld id="{B94FB1BE-082E-4373-BD0C-0A54DA9A4AF0}" type="datetimeFigureOut">
               <a:rPr lang="de-CH" smtClean="0"/>
-              <a:t>21.02.2019</a:t>
+              <a:t>21.02.19</a:t>
             </a:fld>
             <a:endParaRPr lang="de-CH"/>
           </a:p>
@@ -1171,7 +1171,7 @@
           <p:cNvPr id="5" name="Fußzeilenplatzhalter 4">
             <a:extLst>
               <a:ext uri="{FF2B5EF4-FFF2-40B4-BE49-F238E27FC236}">
-                <a16:creationId xmlns:a16="http://schemas.microsoft.com/office/drawing/2014/main" id="{A76F9FEE-769B-4C95-B865-10C35CACC0E9}"/>
+                <a16:creationId xmlns:a16="http://schemas.microsoft.com/office/drawing/2014/main" xmlns="" id="{A76F9FEE-769B-4C95-B865-10C35CACC0E9}"/>
               </a:ext>
             </a:extLst>
           </p:cNvPr>
@@ -1196,7 +1196,7 @@
           <p:cNvPr id="6" name="Foliennummernplatzhalter 5">
             <a:extLst>
               <a:ext uri="{FF2B5EF4-FFF2-40B4-BE49-F238E27FC236}">
-                <a16:creationId xmlns:a16="http://schemas.microsoft.com/office/drawing/2014/main" id="{A6DD3A67-8368-46A2-A026-D825BC046771}"/>
+                <a16:creationId xmlns:a16="http://schemas.microsoft.com/office/drawing/2014/main" xmlns="" id="{A6DD3A67-8368-46A2-A026-D825BC046771}"/>
               </a:ext>
             </a:extLst>
           </p:cNvPr>
@@ -1255,7 +1255,7 @@
           <p:cNvPr id="2" name="Titel 1">
             <a:extLst>
               <a:ext uri="{FF2B5EF4-FFF2-40B4-BE49-F238E27FC236}">
-                <a16:creationId xmlns:a16="http://schemas.microsoft.com/office/drawing/2014/main" id="{D0C41E86-5BAE-4495-98DA-4AC02F0E3A70}"/>
+                <a16:creationId xmlns:a16="http://schemas.microsoft.com/office/drawing/2014/main" xmlns="" id="{D0C41E86-5BAE-4495-98DA-4AC02F0E3A70}"/>
               </a:ext>
             </a:extLst>
           </p:cNvPr>
@@ -1284,7 +1284,7 @@
           <p:cNvPr id="3" name="Inhaltsplatzhalter 2">
             <a:extLst>
               <a:ext uri="{FF2B5EF4-FFF2-40B4-BE49-F238E27FC236}">
-                <a16:creationId xmlns:a16="http://schemas.microsoft.com/office/drawing/2014/main" id="{5E34415D-E3A3-413E-9499-EBB0321D7BAF}"/>
+                <a16:creationId xmlns:a16="http://schemas.microsoft.com/office/drawing/2014/main" xmlns="" id="{5E34415D-E3A3-413E-9499-EBB0321D7BAF}"/>
               </a:ext>
             </a:extLst>
           </p:cNvPr>
@@ -1347,7 +1347,7 @@
           <p:cNvPr id="4" name="Inhaltsplatzhalter 3">
             <a:extLst>
               <a:ext uri="{FF2B5EF4-FFF2-40B4-BE49-F238E27FC236}">
-                <a16:creationId xmlns:a16="http://schemas.microsoft.com/office/drawing/2014/main" id="{1058E87F-C6E1-4392-B707-510B12C90AF5}"/>
+                <a16:creationId xmlns:a16="http://schemas.microsoft.com/office/drawing/2014/main" xmlns="" id="{1058E87F-C6E1-4392-B707-510B12C90AF5}"/>
               </a:ext>
             </a:extLst>
           </p:cNvPr>
@@ -1410,7 +1410,7 @@
           <p:cNvPr id="5" name="Datumsplatzhalter 4">
             <a:extLst>
               <a:ext uri="{FF2B5EF4-FFF2-40B4-BE49-F238E27FC236}">
-                <a16:creationId xmlns:a16="http://schemas.microsoft.com/office/drawing/2014/main" id="{BE7EE012-9F3B-4363-B94F-2E672ED854E0}"/>
+                <a16:creationId xmlns:a16="http://schemas.microsoft.com/office/drawing/2014/main" xmlns="" id="{BE7EE012-9F3B-4363-B94F-2E672ED854E0}"/>
               </a:ext>
             </a:extLst>
           </p:cNvPr>
@@ -1428,7 +1428,7 @@
           <a:p>
             <a:fld id="{B94FB1BE-082E-4373-BD0C-0A54DA9A4AF0}" type="datetimeFigureOut">
               <a:rPr lang="de-CH" smtClean="0"/>
-              <a:t>21.02.2019</a:t>
+              <a:t>21.02.19</a:t>
             </a:fld>
             <a:endParaRPr lang="de-CH"/>
           </a:p>
@@ -1439,7 +1439,7 @@
           <p:cNvPr id="6" name="Fußzeilenplatzhalter 5">
             <a:extLst>
               <a:ext uri="{FF2B5EF4-FFF2-40B4-BE49-F238E27FC236}">
-                <a16:creationId xmlns:a16="http://schemas.microsoft.com/office/drawing/2014/main" id="{66072169-2BBC-4E88-831F-F25664F2BBDD}"/>
+                <a16:creationId xmlns:a16="http://schemas.microsoft.com/office/drawing/2014/main" xmlns="" id="{66072169-2BBC-4E88-831F-F25664F2BBDD}"/>
               </a:ext>
             </a:extLst>
           </p:cNvPr>
@@ -1464,7 +1464,7 @@
           <p:cNvPr id="7" name="Foliennummernplatzhalter 6">
             <a:extLst>
               <a:ext uri="{FF2B5EF4-FFF2-40B4-BE49-F238E27FC236}">
-                <a16:creationId xmlns:a16="http://schemas.microsoft.com/office/drawing/2014/main" id="{0D6F8A1E-B9ED-4C65-9E1C-0F88D7429E21}"/>
+                <a16:creationId xmlns:a16="http://schemas.microsoft.com/office/drawing/2014/main" xmlns="" id="{0D6F8A1E-B9ED-4C65-9E1C-0F88D7429E21}"/>
               </a:ext>
             </a:extLst>
           </p:cNvPr>
@@ -1523,7 +1523,7 @@
           <p:cNvPr id="2" name="Titel 1">
             <a:extLst>
               <a:ext uri="{FF2B5EF4-FFF2-40B4-BE49-F238E27FC236}">
-                <a16:creationId xmlns:a16="http://schemas.microsoft.com/office/drawing/2014/main" id="{1A4987A6-EDE4-4CF9-B9B6-ECE62D97D840}"/>
+                <a16:creationId xmlns:a16="http://schemas.microsoft.com/office/drawing/2014/main" xmlns="" id="{1A4987A6-EDE4-4CF9-B9B6-ECE62D97D840}"/>
               </a:ext>
             </a:extLst>
           </p:cNvPr>
@@ -1557,7 +1557,7 @@
           <p:cNvPr id="3" name="Textplatzhalter 2">
             <a:extLst>
               <a:ext uri="{FF2B5EF4-FFF2-40B4-BE49-F238E27FC236}">
-                <a16:creationId xmlns:a16="http://schemas.microsoft.com/office/drawing/2014/main" id="{7F2145B9-5FFE-43AD-8B2C-F8E6F32F7BCC}"/>
+                <a16:creationId xmlns:a16="http://schemas.microsoft.com/office/drawing/2014/main" xmlns="" id="{7F2145B9-5FFE-43AD-8B2C-F8E6F32F7BCC}"/>
               </a:ext>
             </a:extLst>
           </p:cNvPr>
@@ -1628,7 +1628,7 @@
           <p:cNvPr id="4" name="Inhaltsplatzhalter 3">
             <a:extLst>
               <a:ext uri="{FF2B5EF4-FFF2-40B4-BE49-F238E27FC236}">
-                <a16:creationId xmlns:a16="http://schemas.microsoft.com/office/drawing/2014/main" id="{91A01D42-0AD3-413A-98DC-FE92CD12BE04}"/>
+                <a16:creationId xmlns:a16="http://schemas.microsoft.com/office/drawing/2014/main" xmlns="" id="{91A01D42-0AD3-413A-98DC-FE92CD12BE04}"/>
               </a:ext>
             </a:extLst>
           </p:cNvPr>
@@ -1691,7 +1691,7 @@
           <p:cNvPr id="5" name="Textplatzhalter 4">
             <a:extLst>
               <a:ext uri="{FF2B5EF4-FFF2-40B4-BE49-F238E27FC236}">
-                <a16:creationId xmlns:a16="http://schemas.microsoft.com/office/drawing/2014/main" id="{93EC1619-7F14-4911-95A7-869EB89EF1D9}"/>
+                <a16:creationId xmlns:a16="http://schemas.microsoft.com/office/drawing/2014/main" xmlns="" id="{93EC1619-7F14-4911-95A7-869EB89EF1D9}"/>
               </a:ext>
             </a:extLst>
           </p:cNvPr>
@@ -1762,7 +1762,7 @@
           <p:cNvPr id="6" name="Inhaltsplatzhalter 5">
             <a:extLst>
               <a:ext uri="{FF2B5EF4-FFF2-40B4-BE49-F238E27FC236}">
-                <a16:creationId xmlns:a16="http://schemas.microsoft.com/office/drawing/2014/main" id="{08ED497B-E51E-4035-B9AB-656F873E8C5B}"/>
+                <a16:creationId xmlns:a16="http://schemas.microsoft.com/office/drawing/2014/main" xmlns="" id="{08ED497B-E51E-4035-B9AB-656F873E8C5B}"/>
               </a:ext>
             </a:extLst>
           </p:cNvPr>
@@ -1825,7 +1825,7 @@
           <p:cNvPr id="7" name="Datumsplatzhalter 6">
             <a:extLst>
               <a:ext uri="{FF2B5EF4-FFF2-40B4-BE49-F238E27FC236}">
-                <a16:creationId xmlns:a16="http://schemas.microsoft.com/office/drawing/2014/main" id="{FE4DA2E8-CC83-46A8-85B3-DC95FE01BD77}"/>
+                <a16:creationId xmlns:a16="http://schemas.microsoft.com/office/drawing/2014/main" xmlns="" id="{FE4DA2E8-CC83-46A8-85B3-DC95FE01BD77}"/>
               </a:ext>
             </a:extLst>
           </p:cNvPr>
@@ -1843,7 +1843,7 @@
           <a:p>
             <a:fld id="{B94FB1BE-082E-4373-BD0C-0A54DA9A4AF0}" type="datetimeFigureOut">
               <a:rPr lang="de-CH" smtClean="0"/>
-              <a:t>21.02.2019</a:t>
+              <a:t>21.02.19</a:t>
             </a:fld>
             <a:endParaRPr lang="de-CH"/>
           </a:p>
@@ -1854,7 +1854,7 @@
           <p:cNvPr id="8" name="Fußzeilenplatzhalter 7">
             <a:extLst>
               <a:ext uri="{FF2B5EF4-FFF2-40B4-BE49-F238E27FC236}">
-                <a16:creationId xmlns:a16="http://schemas.microsoft.com/office/drawing/2014/main" id="{5C00E00A-31FF-47DD-8D58-D444A3477730}"/>
+                <a16:creationId xmlns:a16="http://schemas.microsoft.com/office/drawing/2014/main" xmlns="" id="{5C00E00A-31FF-47DD-8D58-D444A3477730}"/>
               </a:ext>
             </a:extLst>
           </p:cNvPr>
@@ -1879,7 +1879,7 @@
           <p:cNvPr id="9" name="Foliennummernplatzhalter 8">
             <a:extLst>
               <a:ext uri="{FF2B5EF4-FFF2-40B4-BE49-F238E27FC236}">
-                <a16:creationId xmlns:a16="http://schemas.microsoft.com/office/drawing/2014/main" id="{C365682F-698D-410F-8B38-20BFD334F89A}"/>
+                <a16:creationId xmlns:a16="http://schemas.microsoft.com/office/drawing/2014/main" xmlns="" id="{C365682F-698D-410F-8B38-20BFD334F89A}"/>
               </a:ext>
             </a:extLst>
           </p:cNvPr>
@@ -1938,7 +1938,7 @@
           <p:cNvPr id="2" name="Titel 1">
             <a:extLst>
               <a:ext uri="{FF2B5EF4-FFF2-40B4-BE49-F238E27FC236}">
-                <a16:creationId xmlns:a16="http://schemas.microsoft.com/office/drawing/2014/main" id="{48C2AD89-7A55-4F58-AC8B-D44387B6DCDF}"/>
+                <a16:creationId xmlns:a16="http://schemas.microsoft.com/office/drawing/2014/main" xmlns="" id="{48C2AD89-7A55-4F58-AC8B-D44387B6DCDF}"/>
               </a:ext>
             </a:extLst>
           </p:cNvPr>
@@ -1967,7 +1967,7 @@
           <p:cNvPr id="3" name="Datumsplatzhalter 2">
             <a:extLst>
               <a:ext uri="{FF2B5EF4-FFF2-40B4-BE49-F238E27FC236}">
-                <a16:creationId xmlns:a16="http://schemas.microsoft.com/office/drawing/2014/main" id="{247DAE21-785F-44C5-AD87-C81EB574F0E6}"/>
+                <a16:creationId xmlns:a16="http://schemas.microsoft.com/office/drawing/2014/main" xmlns="" id="{247DAE21-785F-44C5-AD87-C81EB574F0E6}"/>
               </a:ext>
             </a:extLst>
           </p:cNvPr>
@@ -1985,7 +1985,7 @@
           <a:p>
             <a:fld id="{B94FB1BE-082E-4373-BD0C-0A54DA9A4AF0}" type="datetimeFigureOut">
               <a:rPr lang="de-CH" smtClean="0"/>
-              <a:t>21.02.2019</a:t>
+              <a:t>21.02.19</a:t>
             </a:fld>
             <a:endParaRPr lang="de-CH"/>
           </a:p>
@@ -1996,7 +1996,7 @@
           <p:cNvPr id="4" name="Fußzeilenplatzhalter 3">
             <a:extLst>
               <a:ext uri="{FF2B5EF4-FFF2-40B4-BE49-F238E27FC236}">
-                <a16:creationId xmlns:a16="http://schemas.microsoft.com/office/drawing/2014/main" id="{63FAB037-1DB6-4C8D-B7F0-75BE73DB3834}"/>
+                <a16:creationId xmlns:a16="http://schemas.microsoft.com/office/drawing/2014/main" xmlns="" id="{63FAB037-1DB6-4C8D-B7F0-75BE73DB3834}"/>
               </a:ext>
             </a:extLst>
           </p:cNvPr>
@@ -2021,7 +2021,7 @@
           <p:cNvPr id="5" name="Foliennummernplatzhalter 4">
             <a:extLst>
               <a:ext uri="{FF2B5EF4-FFF2-40B4-BE49-F238E27FC236}">
-                <a16:creationId xmlns:a16="http://schemas.microsoft.com/office/drawing/2014/main" id="{A0546778-837A-4040-B372-7E67183EDB86}"/>
+                <a16:creationId xmlns:a16="http://schemas.microsoft.com/office/drawing/2014/main" xmlns="" id="{A0546778-837A-4040-B372-7E67183EDB86}"/>
               </a:ext>
             </a:extLst>
           </p:cNvPr>
@@ -2080,7 +2080,7 @@
           <p:cNvPr id="2" name="Datumsplatzhalter 1">
             <a:extLst>
               <a:ext uri="{FF2B5EF4-FFF2-40B4-BE49-F238E27FC236}">
-                <a16:creationId xmlns:a16="http://schemas.microsoft.com/office/drawing/2014/main" id="{72C34522-CF6B-4A4D-853A-ACD1B3F31EE0}"/>
+                <a16:creationId xmlns:a16="http://schemas.microsoft.com/office/drawing/2014/main" xmlns="" id="{72C34522-CF6B-4A4D-853A-ACD1B3F31EE0}"/>
               </a:ext>
             </a:extLst>
           </p:cNvPr>
@@ -2098,7 +2098,7 @@
           <a:p>
             <a:fld id="{B94FB1BE-082E-4373-BD0C-0A54DA9A4AF0}" type="datetimeFigureOut">
               <a:rPr lang="de-CH" smtClean="0"/>
-              <a:t>21.02.2019</a:t>
+              <a:t>21.02.19</a:t>
             </a:fld>
             <a:endParaRPr lang="de-CH"/>
           </a:p>
@@ -2109,7 +2109,7 @@
           <p:cNvPr id="3" name="Fußzeilenplatzhalter 2">
             <a:extLst>
               <a:ext uri="{FF2B5EF4-FFF2-40B4-BE49-F238E27FC236}">
-                <a16:creationId xmlns:a16="http://schemas.microsoft.com/office/drawing/2014/main" id="{885DCB87-5741-4860-99EB-29A076231B36}"/>
+                <a16:creationId xmlns:a16="http://schemas.microsoft.com/office/drawing/2014/main" xmlns="" id="{885DCB87-5741-4860-99EB-29A076231B36}"/>
               </a:ext>
             </a:extLst>
           </p:cNvPr>
@@ -2134,7 +2134,7 @@
           <p:cNvPr id="4" name="Foliennummernplatzhalter 3">
             <a:extLst>
               <a:ext uri="{FF2B5EF4-FFF2-40B4-BE49-F238E27FC236}">
-                <a16:creationId xmlns:a16="http://schemas.microsoft.com/office/drawing/2014/main" id="{FD480011-3635-44F4-B0FD-D6453451C7C8}"/>
+                <a16:creationId xmlns:a16="http://schemas.microsoft.com/office/drawing/2014/main" xmlns="" id="{FD480011-3635-44F4-B0FD-D6453451C7C8}"/>
               </a:ext>
             </a:extLst>
           </p:cNvPr>
@@ -2193,7 +2193,7 @@
           <p:cNvPr id="2" name="Titel 1">
             <a:extLst>
               <a:ext uri="{FF2B5EF4-FFF2-40B4-BE49-F238E27FC236}">
-                <a16:creationId xmlns:a16="http://schemas.microsoft.com/office/drawing/2014/main" id="{5DDE90ED-259D-4254-BAF7-491D5D9FF505}"/>
+                <a16:creationId xmlns:a16="http://schemas.microsoft.com/office/drawing/2014/main" xmlns="" id="{5DDE90ED-259D-4254-BAF7-491D5D9FF505}"/>
               </a:ext>
             </a:extLst>
           </p:cNvPr>
@@ -2231,7 +2231,7 @@
           <p:cNvPr id="3" name="Inhaltsplatzhalter 2">
             <a:extLst>
               <a:ext uri="{FF2B5EF4-FFF2-40B4-BE49-F238E27FC236}">
-                <a16:creationId xmlns:a16="http://schemas.microsoft.com/office/drawing/2014/main" id="{321C5F6F-D4A1-4142-A13B-6F3A3616691E}"/>
+                <a16:creationId xmlns:a16="http://schemas.microsoft.com/office/drawing/2014/main" xmlns="" id="{321C5F6F-D4A1-4142-A13B-6F3A3616691E}"/>
               </a:ext>
             </a:extLst>
           </p:cNvPr>
@@ -2322,7 +2322,7 @@
           <p:cNvPr id="4" name="Textplatzhalter 3">
             <a:extLst>
               <a:ext uri="{FF2B5EF4-FFF2-40B4-BE49-F238E27FC236}">
-                <a16:creationId xmlns:a16="http://schemas.microsoft.com/office/drawing/2014/main" id="{660853D0-958B-4D64-9E3C-64AA0444F9DB}"/>
+                <a16:creationId xmlns:a16="http://schemas.microsoft.com/office/drawing/2014/main" xmlns="" id="{660853D0-958B-4D64-9E3C-64AA0444F9DB}"/>
               </a:ext>
             </a:extLst>
           </p:cNvPr>
@@ -2393,7 +2393,7 @@
           <p:cNvPr id="5" name="Datumsplatzhalter 4">
             <a:extLst>
               <a:ext uri="{FF2B5EF4-FFF2-40B4-BE49-F238E27FC236}">
-                <a16:creationId xmlns:a16="http://schemas.microsoft.com/office/drawing/2014/main" id="{833937D0-5BCC-4A56-BD25-6185B5AFF050}"/>
+                <a16:creationId xmlns:a16="http://schemas.microsoft.com/office/drawing/2014/main" xmlns="" id="{833937D0-5BCC-4A56-BD25-6185B5AFF050}"/>
               </a:ext>
             </a:extLst>
           </p:cNvPr>
@@ -2411,7 +2411,7 @@
           <a:p>
             <a:fld id="{B94FB1BE-082E-4373-BD0C-0A54DA9A4AF0}" type="datetimeFigureOut">
               <a:rPr lang="de-CH" smtClean="0"/>
-              <a:t>21.02.2019</a:t>
+              <a:t>21.02.19</a:t>
             </a:fld>
             <a:endParaRPr lang="de-CH"/>
           </a:p>
@@ -2422,7 +2422,7 @@
           <p:cNvPr id="6" name="Fußzeilenplatzhalter 5">
             <a:extLst>
               <a:ext uri="{FF2B5EF4-FFF2-40B4-BE49-F238E27FC236}">
-                <a16:creationId xmlns:a16="http://schemas.microsoft.com/office/drawing/2014/main" id="{6A8554D6-4EBE-4442-8FB3-C8DD5B5A9ECE}"/>
+                <a16:creationId xmlns:a16="http://schemas.microsoft.com/office/drawing/2014/main" xmlns="" id="{6A8554D6-4EBE-4442-8FB3-C8DD5B5A9ECE}"/>
               </a:ext>
             </a:extLst>
           </p:cNvPr>
@@ -2447,7 +2447,7 @@
           <p:cNvPr id="7" name="Foliennummernplatzhalter 6">
             <a:extLst>
               <a:ext uri="{FF2B5EF4-FFF2-40B4-BE49-F238E27FC236}">
-                <a16:creationId xmlns:a16="http://schemas.microsoft.com/office/drawing/2014/main" id="{5D7CCC38-4DF4-4DCF-9344-B190EE87EB17}"/>
+                <a16:creationId xmlns:a16="http://schemas.microsoft.com/office/drawing/2014/main" xmlns="" id="{5D7CCC38-4DF4-4DCF-9344-B190EE87EB17}"/>
               </a:ext>
             </a:extLst>
           </p:cNvPr>
@@ -2506,7 +2506,7 @@
           <p:cNvPr id="2" name="Titel 1">
             <a:extLst>
               <a:ext uri="{FF2B5EF4-FFF2-40B4-BE49-F238E27FC236}">
-                <a16:creationId xmlns:a16="http://schemas.microsoft.com/office/drawing/2014/main" id="{1D49AC2D-0B36-4382-AC76-05C937DAB958}"/>
+                <a16:creationId xmlns:a16="http://schemas.microsoft.com/office/drawing/2014/main" xmlns="" id="{1D49AC2D-0B36-4382-AC76-05C937DAB958}"/>
               </a:ext>
             </a:extLst>
           </p:cNvPr>
@@ -2544,7 +2544,7 @@
           <p:cNvPr id="3" name="Bildplatzhalter 2">
             <a:extLst>
               <a:ext uri="{FF2B5EF4-FFF2-40B4-BE49-F238E27FC236}">
-                <a16:creationId xmlns:a16="http://schemas.microsoft.com/office/drawing/2014/main" id="{ED1751C8-F889-4260-8874-1449020CB2FA}"/>
+                <a16:creationId xmlns:a16="http://schemas.microsoft.com/office/drawing/2014/main" xmlns="" id="{ED1751C8-F889-4260-8874-1449020CB2FA}"/>
               </a:ext>
             </a:extLst>
           </p:cNvPr>
@@ -2611,7 +2611,7 @@
           <p:cNvPr id="4" name="Textplatzhalter 3">
             <a:extLst>
               <a:ext uri="{FF2B5EF4-FFF2-40B4-BE49-F238E27FC236}">
-                <a16:creationId xmlns:a16="http://schemas.microsoft.com/office/drawing/2014/main" id="{6FCD641E-B967-4643-82BB-23007A5853AC}"/>
+                <a16:creationId xmlns:a16="http://schemas.microsoft.com/office/drawing/2014/main" xmlns="" id="{6FCD641E-B967-4643-82BB-23007A5853AC}"/>
               </a:ext>
             </a:extLst>
           </p:cNvPr>
@@ -2682,7 +2682,7 @@
           <p:cNvPr id="5" name="Datumsplatzhalter 4">
             <a:extLst>
               <a:ext uri="{FF2B5EF4-FFF2-40B4-BE49-F238E27FC236}">
-                <a16:creationId xmlns:a16="http://schemas.microsoft.com/office/drawing/2014/main" id="{22A91131-6478-4D90-87F6-14071969885A}"/>
+                <a16:creationId xmlns:a16="http://schemas.microsoft.com/office/drawing/2014/main" xmlns="" id="{22A91131-6478-4D90-87F6-14071969885A}"/>
               </a:ext>
             </a:extLst>
           </p:cNvPr>
@@ -2700,7 +2700,7 @@
           <a:p>
             <a:fld id="{B94FB1BE-082E-4373-BD0C-0A54DA9A4AF0}" type="datetimeFigureOut">
               <a:rPr lang="de-CH" smtClean="0"/>
-              <a:t>21.02.2019</a:t>
+              <a:t>21.02.19</a:t>
             </a:fld>
             <a:endParaRPr lang="de-CH"/>
           </a:p>
@@ -2711,7 +2711,7 @@
           <p:cNvPr id="6" name="Fußzeilenplatzhalter 5">
             <a:extLst>
               <a:ext uri="{FF2B5EF4-FFF2-40B4-BE49-F238E27FC236}">
-                <a16:creationId xmlns:a16="http://schemas.microsoft.com/office/drawing/2014/main" id="{D9CE147C-30C7-4D52-9F9C-AF547A0620B9}"/>
+                <a16:creationId xmlns:a16="http://schemas.microsoft.com/office/drawing/2014/main" xmlns="" id="{D9CE147C-30C7-4D52-9F9C-AF547A0620B9}"/>
               </a:ext>
             </a:extLst>
           </p:cNvPr>
@@ -2736,7 +2736,7 @@
           <p:cNvPr id="7" name="Foliennummernplatzhalter 6">
             <a:extLst>
               <a:ext uri="{FF2B5EF4-FFF2-40B4-BE49-F238E27FC236}">
-                <a16:creationId xmlns:a16="http://schemas.microsoft.com/office/drawing/2014/main" id="{9A6D3D60-B498-43D4-B9BD-EA63BAE0B5AE}"/>
+                <a16:creationId xmlns:a16="http://schemas.microsoft.com/office/drawing/2014/main" xmlns="" id="{9A6D3D60-B498-43D4-B9BD-EA63BAE0B5AE}"/>
               </a:ext>
             </a:extLst>
           </p:cNvPr>
@@ -2800,7 +2800,7 @@
           <p:cNvPr id="2" name="Titelplatzhalter 1">
             <a:extLst>
               <a:ext uri="{FF2B5EF4-FFF2-40B4-BE49-F238E27FC236}">
-                <a16:creationId xmlns:a16="http://schemas.microsoft.com/office/drawing/2014/main" id="{D889ED81-9677-4075-9BF4-B94337B2A47A}"/>
+                <a16:creationId xmlns:a16="http://schemas.microsoft.com/office/drawing/2014/main" xmlns="" id="{D889ED81-9677-4075-9BF4-B94337B2A47A}"/>
               </a:ext>
             </a:extLst>
           </p:cNvPr>
@@ -2839,7 +2839,7 @@
           <p:cNvPr id="3" name="Textplatzhalter 2">
             <a:extLst>
               <a:ext uri="{FF2B5EF4-FFF2-40B4-BE49-F238E27FC236}">
-                <a16:creationId xmlns:a16="http://schemas.microsoft.com/office/drawing/2014/main" id="{7F34CF19-EABE-4F0B-B4AD-87D2E6331025}"/>
+                <a16:creationId xmlns:a16="http://schemas.microsoft.com/office/drawing/2014/main" xmlns="" id="{7F34CF19-EABE-4F0B-B4AD-87D2E6331025}"/>
               </a:ext>
             </a:extLst>
           </p:cNvPr>
@@ -2907,7 +2907,7 @@
           <p:cNvPr id="4" name="Datumsplatzhalter 3">
             <a:extLst>
               <a:ext uri="{FF2B5EF4-FFF2-40B4-BE49-F238E27FC236}">
-                <a16:creationId xmlns:a16="http://schemas.microsoft.com/office/drawing/2014/main" id="{2A8A6C8B-60DA-4470-A5B3-D7828F1AFA0D}"/>
+                <a16:creationId xmlns:a16="http://schemas.microsoft.com/office/drawing/2014/main" xmlns="" id="{2A8A6C8B-60DA-4470-A5B3-D7828F1AFA0D}"/>
               </a:ext>
             </a:extLst>
           </p:cNvPr>
@@ -2943,7 +2943,7 @@
           <a:p>
             <a:fld id="{B94FB1BE-082E-4373-BD0C-0A54DA9A4AF0}" type="datetimeFigureOut">
               <a:rPr lang="de-CH" smtClean="0"/>
-              <a:t>21.02.2019</a:t>
+              <a:t>21.02.19</a:t>
             </a:fld>
             <a:endParaRPr lang="de-CH"/>
           </a:p>
@@ -2954,7 +2954,7 @@
           <p:cNvPr id="5" name="Fußzeilenplatzhalter 4">
             <a:extLst>
               <a:ext uri="{FF2B5EF4-FFF2-40B4-BE49-F238E27FC236}">
-                <a16:creationId xmlns:a16="http://schemas.microsoft.com/office/drawing/2014/main" id="{05881D91-6D11-40A8-9CE3-ED023A7B4C47}"/>
+                <a16:creationId xmlns:a16="http://schemas.microsoft.com/office/drawing/2014/main" xmlns="" id="{05881D91-6D11-40A8-9CE3-ED023A7B4C47}"/>
               </a:ext>
             </a:extLst>
           </p:cNvPr>
@@ -2997,7 +2997,7 @@
           <p:cNvPr id="6" name="Foliennummernplatzhalter 5">
             <a:extLst>
               <a:ext uri="{FF2B5EF4-FFF2-40B4-BE49-F238E27FC236}">
-                <a16:creationId xmlns:a16="http://schemas.microsoft.com/office/drawing/2014/main" id="{5DC318CB-1677-4E52-AC0F-4B3F7ADFBDAA}"/>
+                <a16:creationId xmlns:a16="http://schemas.microsoft.com/office/drawing/2014/main" xmlns="" id="{5DC318CB-1677-4E52-AC0F-4B3F7ADFBDAA}"/>
               </a:ext>
             </a:extLst>
           </p:cNvPr>
@@ -3365,7 +3365,7 @@
           <p:cNvPr id="2" name="Titel 1">
             <a:extLst>
               <a:ext uri="{FF2B5EF4-FFF2-40B4-BE49-F238E27FC236}">
-                <a16:creationId xmlns:a16="http://schemas.microsoft.com/office/drawing/2014/main" id="{B546CD53-F628-4921-AB00-C1B41183297C}"/>
+                <a16:creationId xmlns:a16="http://schemas.microsoft.com/office/drawing/2014/main" xmlns="" id="{B546CD53-F628-4921-AB00-C1B41183297C}"/>
               </a:ext>
             </a:extLst>
           </p:cNvPr>
@@ -3390,7 +3390,7 @@
           <p:cNvPr id="3" name="Untertitel 2">
             <a:extLst>
               <a:ext uri="{FF2B5EF4-FFF2-40B4-BE49-F238E27FC236}">
-                <a16:creationId xmlns:a16="http://schemas.microsoft.com/office/drawing/2014/main" id="{0703C719-B931-4FF1-8A37-A47F9BB39F6E}"/>
+                <a16:creationId xmlns:a16="http://schemas.microsoft.com/office/drawing/2014/main" xmlns="" id="{0703C719-B931-4FF1-8A37-A47F9BB39F6E}"/>
               </a:ext>
             </a:extLst>
           </p:cNvPr>
@@ -3435,7 +3435,7 @@
           <p:cNvPr id="6" name="Grafik 5">
             <a:extLst>
               <a:ext uri="{FF2B5EF4-FFF2-40B4-BE49-F238E27FC236}">
-                <a16:creationId xmlns:a16="http://schemas.microsoft.com/office/drawing/2014/main" id="{5D2BD1CF-3E73-4540-962F-4B216DB4FA31}"/>
+                <a16:creationId xmlns:a16="http://schemas.microsoft.com/office/drawing/2014/main" xmlns="" id="{5D2BD1CF-3E73-4540-962F-4B216DB4FA31}"/>
               </a:ext>
             </a:extLst>
           </p:cNvPr>
@@ -3476,6 +3476,13 @@
   <p:clrMapOvr>
     <a:masterClrMapping/>
   </p:clrMapOvr>
+  <p:timing>
+    <p:tnLst>
+      <p:par>
+        <p:cTn id="1" dur="indefinite" restart="never" nodeType="tmRoot"/>
+      </p:par>
+    </p:tnLst>
+  </p:timing>
 </p:sld>
 </file>
 
@@ -3501,7 +3508,7 @@
           <p:cNvPr id="88" name="Gruppieren 87">
             <a:extLst>
               <a:ext uri="{FF2B5EF4-FFF2-40B4-BE49-F238E27FC236}">
-                <a16:creationId xmlns:a16="http://schemas.microsoft.com/office/drawing/2014/main" id="{9C7F16F0-753A-47CF-99C8-7DC1D7FCBBD9}"/>
+                <a16:creationId xmlns:a16="http://schemas.microsoft.com/office/drawing/2014/main" xmlns="" id="{9C7F16F0-753A-47CF-99C8-7DC1D7FCBBD9}"/>
               </a:ext>
             </a:extLst>
           </p:cNvPr>
@@ -3521,7 +3528,7 @@
             <p:cNvPr id="4" name="Gruppieren 3">
               <a:extLst>
                 <a:ext uri="{FF2B5EF4-FFF2-40B4-BE49-F238E27FC236}">
-                  <a16:creationId xmlns:a16="http://schemas.microsoft.com/office/drawing/2014/main" id="{67ECDFEA-C7F7-46C7-82B5-7AD051F27BFC}"/>
+                  <a16:creationId xmlns:a16="http://schemas.microsoft.com/office/drawing/2014/main" xmlns="" id="{67ECDFEA-C7F7-46C7-82B5-7AD051F27BFC}"/>
                 </a:ext>
               </a:extLst>
             </p:cNvPr>
@@ -3541,7 +3548,7 @@
               <p:cNvPr id="5" name="Rechteck: obere Ecken abgerundet 4">
                 <a:extLst>
                   <a:ext uri="{FF2B5EF4-FFF2-40B4-BE49-F238E27FC236}">
-                    <a16:creationId xmlns:a16="http://schemas.microsoft.com/office/drawing/2014/main" id="{716995A8-4DFE-4AC6-9BE9-E0366B673E38}"/>
+                    <a16:creationId xmlns:a16="http://schemas.microsoft.com/office/drawing/2014/main" xmlns="" id="{716995A8-4DFE-4AC6-9BE9-E0366B673E38}"/>
                   </a:ext>
                 </a:extLst>
               </p:cNvPr>
@@ -3600,7 +3607,7 @@
               <p:cNvPr id="6" name="Ellipse 5">
                 <a:extLst>
                   <a:ext uri="{FF2B5EF4-FFF2-40B4-BE49-F238E27FC236}">
-                    <a16:creationId xmlns:a16="http://schemas.microsoft.com/office/drawing/2014/main" id="{F94FA258-93D9-48D3-AFDB-49308A91376D}"/>
+                    <a16:creationId xmlns:a16="http://schemas.microsoft.com/office/drawing/2014/main" xmlns="" id="{F94FA258-93D9-48D3-AFDB-49308A91376D}"/>
                   </a:ext>
                 </a:extLst>
               </p:cNvPr>
@@ -3657,7 +3664,7 @@
             <p:cNvPr id="7" name="Gruppieren 6">
               <a:extLst>
                 <a:ext uri="{FF2B5EF4-FFF2-40B4-BE49-F238E27FC236}">
-                  <a16:creationId xmlns:a16="http://schemas.microsoft.com/office/drawing/2014/main" id="{C5279C5A-4543-428C-B9BB-F05FD2862340}"/>
+                  <a16:creationId xmlns:a16="http://schemas.microsoft.com/office/drawing/2014/main" xmlns="" id="{C5279C5A-4543-428C-B9BB-F05FD2862340}"/>
                 </a:ext>
               </a:extLst>
             </p:cNvPr>
@@ -3677,7 +3684,7 @@
               <p:cNvPr id="8" name="Rechteck: obere Ecken abgerundet 7">
                 <a:extLst>
                   <a:ext uri="{FF2B5EF4-FFF2-40B4-BE49-F238E27FC236}">
-                    <a16:creationId xmlns:a16="http://schemas.microsoft.com/office/drawing/2014/main" id="{C7EC54D9-C7E5-411A-96C9-9030EA55186E}"/>
+                    <a16:creationId xmlns:a16="http://schemas.microsoft.com/office/drawing/2014/main" xmlns="" id="{C7EC54D9-C7E5-411A-96C9-9030EA55186E}"/>
                   </a:ext>
                 </a:extLst>
               </p:cNvPr>
@@ -3736,7 +3743,7 @@
               <p:cNvPr id="9" name="Ellipse 8">
                 <a:extLst>
                   <a:ext uri="{FF2B5EF4-FFF2-40B4-BE49-F238E27FC236}">
-                    <a16:creationId xmlns:a16="http://schemas.microsoft.com/office/drawing/2014/main" id="{60E07259-615A-44AA-B79A-FA5F7446501A}"/>
+                    <a16:creationId xmlns:a16="http://schemas.microsoft.com/office/drawing/2014/main" xmlns="" id="{60E07259-615A-44AA-B79A-FA5F7446501A}"/>
                   </a:ext>
                 </a:extLst>
               </p:cNvPr>
@@ -3793,7 +3800,7 @@
             <p:cNvPr id="10" name="Rechteck: abgerundete Ecken 9">
               <a:extLst>
                 <a:ext uri="{FF2B5EF4-FFF2-40B4-BE49-F238E27FC236}">
-                  <a16:creationId xmlns:a16="http://schemas.microsoft.com/office/drawing/2014/main" id="{0ACA73AA-A7DC-4D31-AC56-CCE6912DA8A7}"/>
+                  <a16:creationId xmlns:a16="http://schemas.microsoft.com/office/drawing/2014/main" xmlns="" id="{0ACA73AA-A7DC-4D31-AC56-CCE6912DA8A7}"/>
                 </a:ext>
               </a:extLst>
             </p:cNvPr>
@@ -3856,7 +3863,7 @@
             <p:cNvPr id="11" name="Rechteck: abgerundete Ecken 10">
               <a:extLst>
                 <a:ext uri="{FF2B5EF4-FFF2-40B4-BE49-F238E27FC236}">
-                  <a16:creationId xmlns:a16="http://schemas.microsoft.com/office/drawing/2014/main" id="{09E6810C-ECCE-4BCB-B54F-115DA41FECD6}"/>
+                  <a16:creationId xmlns:a16="http://schemas.microsoft.com/office/drawing/2014/main" xmlns="" id="{09E6810C-ECCE-4BCB-B54F-115DA41FECD6}"/>
                 </a:ext>
               </a:extLst>
             </p:cNvPr>
@@ -3919,7 +3926,7 @@
             <p:cNvPr id="12" name="Textfeld 11">
               <a:extLst>
                 <a:ext uri="{FF2B5EF4-FFF2-40B4-BE49-F238E27FC236}">
-                  <a16:creationId xmlns:a16="http://schemas.microsoft.com/office/drawing/2014/main" id="{CACC825B-A01A-44AF-8A16-EE77F17F3DAD}"/>
+                  <a16:creationId xmlns:a16="http://schemas.microsoft.com/office/drawing/2014/main" xmlns="" id="{CACC825B-A01A-44AF-8A16-EE77F17F3DAD}"/>
                 </a:ext>
               </a:extLst>
             </p:cNvPr>
@@ -3954,7 +3961,7 @@
             <p:cNvPr id="13" name="Textfeld 12">
               <a:extLst>
                 <a:ext uri="{FF2B5EF4-FFF2-40B4-BE49-F238E27FC236}">
-                  <a16:creationId xmlns:a16="http://schemas.microsoft.com/office/drawing/2014/main" id="{D0315F4D-A0EA-4B91-9186-2E6170F55A07}"/>
+                  <a16:creationId xmlns:a16="http://schemas.microsoft.com/office/drawing/2014/main" xmlns="" id="{D0315F4D-A0EA-4B91-9186-2E6170F55A07}"/>
                 </a:ext>
               </a:extLst>
             </p:cNvPr>
@@ -3989,7 +3996,7 @@
             <p:cNvPr id="14" name="Gruppieren 13">
               <a:extLst>
                 <a:ext uri="{FF2B5EF4-FFF2-40B4-BE49-F238E27FC236}">
-                  <a16:creationId xmlns:a16="http://schemas.microsoft.com/office/drawing/2014/main" id="{560B1DD5-8673-4C4C-B867-015472A3C2DA}"/>
+                  <a16:creationId xmlns:a16="http://schemas.microsoft.com/office/drawing/2014/main" xmlns="" id="{560B1DD5-8673-4C4C-B867-015472A3C2DA}"/>
                 </a:ext>
               </a:extLst>
             </p:cNvPr>
@@ -4009,7 +4016,7 @@
               <p:cNvPr id="15" name="Rechteck: obere Ecken abgerundet 14">
                 <a:extLst>
                   <a:ext uri="{FF2B5EF4-FFF2-40B4-BE49-F238E27FC236}">
-                    <a16:creationId xmlns:a16="http://schemas.microsoft.com/office/drawing/2014/main" id="{D4421D9F-5FBF-4C41-9B29-008E757C04E6}"/>
+                    <a16:creationId xmlns:a16="http://schemas.microsoft.com/office/drawing/2014/main" xmlns="" id="{D4421D9F-5FBF-4C41-9B29-008E757C04E6}"/>
                   </a:ext>
                 </a:extLst>
               </p:cNvPr>
@@ -4068,7 +4075,7 @@
               <p:cNvPr id="16" name="Ellipse 15">
                 <a:extLst>
                   <a:ext uri="{FF2B5EF4-FFF2-40B4-BE49-F238E27FC236}">
-                    <a16:creationId xmlns:a16="http://schemas.microsoft.com/office/drawing/2014/main" id="{EA3687B2-F403-4CFE-B55B-7A50793847CC}"/>
+                    <a16:creationId xmlns:a16="http://schemas.microsoft.com/office/drawing/2014/main" xmlns="" id="{EA3687B2-F403-4CFE-B55B-7A50793847CC}"/>
                   </a:ext>
                 </a:extLst>
               </p:cNvPr>
@@ -4125,7 +4132,7 @@
             <p:cNvPr id="17" name="Gruppieren 16">
               <a:extLst>
                 <a:ext uri="{FF2B5EF4-FFF2-40B4-BE49-F238E27FC236}">
-                  <a16:creationId xmlns:a16="http://schemas.microsoft.com/office/drawing/2014/main" id="{CBE2F339-C67D-4C47-A7ED-3B8A8A1038A6}"/>
+                  <a16:creationId xmlns:a16="http://schemas.microsoft.com/office/drawing/2014/main" xmlns="" id="{CBE2F339-C67D-4C47-A7ED-3B8A8A1038A6}"/>
                 </a:ext>
               </a:extLst>
             </p:cNvPr>
@@ -4145,7 +4152,7 @@
               <p:cNvPr id="18" name="Rechteck: obere Ecken abgerundet 17">
                 <a:extLst>
                   <a:ext uri="{FF2B5EF4-FFF2-40B4-BE49-F238E27FC236}">
-                    <a16:creationId xmlns:a16="http://schemas.microsoft.com/office/drawing/2014/main" id="{481D02E6-705F-4923-9778-5725C4D555E0}"/>
+                    <a16:creationId xmlns:a16="http://schemas.microsoft.com/office/drawing/2014/main" xmlns="" id="{481D02E6-705F-4923-9778-5725C4D555E0}"/>
                   </a:ext>
                 </a:extLst>
               </p:cNvPr>
@@ -4204,7 +4211,7 @@
               <p:cNvPr id="19" name="Ellipse 18">
                 <a:extLst>
                   <a:ext uri="{FF2B5EF4-FFF2-40B4-BE49-F238E27FC236}">
-                    <a16:creationId xmlns:a16="http://schemas.microsoft.com/office/drawing/2014/main" id="{68D20774-73FD-4847-AD87-4C8A7C77702E}"/>
+                    <a16:creationId xmlns:a16="http://schemas.microsoft.com/office/drawing/2014/main" xmlns="" id="{68D20774-73FD-4847-AD87-4C8A7C77702E}"/>
                   </a:ext>
                 </a:extLst>
               </p:cNvPr>
@@ -4261,7 +4268,7 @@
             <p:cNvPr id="20" name="Rechteck: abgerundete Ecken 19">
               <a:extLst>
                 <a:ext uri="{FF2B5EF4-FFF2-40B4-BE49-F238E27FC236}">
-                  <a16:creationId xmlns:a16="http://schemas.microsoft.com/office/drawing/2014/main" id="{6A31D0B3-8678-4A04-A019-F08B2A41B8EB}"/>
+                  <a16:creationId xmlns:a16="http://schemas.microsoft.com/office/drawing/2014/main" xmlns="" id="{6A31D0B3-8678-4A04-A019-F08B2A41B8EB}"/>
                 </a:ext>
               </a:extLst>
             </p:cNvPr>
@@ -4324,7 +4331,7 @@
             <p:cNvPr id="21" name="Rechteck: abgerundete Ecken 20">
               <a:extLst>
                 <a:ext uri="{FF2B5EF4-FFF2-40B4-BE49-F238E27FC236}">
-                  <a16:creationId xmlns:a16="http://schemas.microsoft.com/office/drawing/2014/main" id="{B4C589D2-A103-42B3-B91E-D6205ABF7F5A}"/>
+                  <a16:creationId xmlns:a16="http://schemas.microsoft.com/office/drawing/2014/main" xmlns="" id="{B4C589D2-A103-42B3-B91E-D6205ABF7F5A}"/>
                 </a:ext>
               </a:extLst>
             </p:cNvPr>
@@ -4387,7 +4394,7 @@
             <p:cNvPr id="22" name="Textfeld 21">
               <a:extLst>
                 <a:ext uri="{FF2B5EF4-FFF2-40B4-BE49-F238E27FC236}">
-                  <a16:creationId xmlns:a16="http://schemas.microsoft.com/office/drawing/2014/main" id="{8FCC2BD9-F20E-41B8-B321-CD5890C3DAA2}"/>
+                  <a16:creationId xmlns:a16="http://schemas.microsoft.com/office/drawing/2014/main" xmlns="" id="{8FCC2BD9-F20E-41B8-B321-CD5890C3DAA2}"/>
                 </a:ext>
               </a:extLst>
             </p:cNvPr>
@@ -4422,7 +4429,7 @@
             <p:cNvPr id="23" name="Textfeld 22">
               <a:extLst>
                 <a:ext uri="{FF2B5EF4-FFF2-40B4-BE49-F238E27FC236}">
-                  <a16:creationId xmlns:a16="http://schemas.microsoft.com/office/drawing/2014/main" id="{D0E67B75-9DAB-46B9-9B42-558A4746CF92}"/>
+                  <a16:creationId xmlns:a16="http://schemas.microsoft.com/office/drawing/2014/main" xmlns="" id="{D0E67B75-9DAB-46B9-9B42-558A4746CF92}"/>
                 </a:ext>
               </a:extLst>
             </p:cNvPr>
@@ -4457,7 +4464,7 @@
             <p:cNvPr id="24" name="Bogen 23">
               <a:extLst>
                 <a:ext uri="{FF2B5EF4-FFF2-40B4-BE49-F238E27FC236}">
-                  <a16:creationId xmlns:a16="http://schemas.microsoft.com/office/drawing/2014/main" id="{9E606C54-A77A-4121-BB1E-5E91F9EB972A}"/>
+                  <a16:creationId xmlns:a16="http://schemas.microsoft.com/office/drawing/2014/main" xmlns="" id="{9E606C54-A77A-4121-BB1E-5E91F9EB972A}"/>
                 </a:ext>
               </a:extLst>
             </p:cNvPr>
@@ -4511,7 +4518,7 @@
           <p:cNvPr id="25" name="Pfeil: nach rechts 24">
             <a:extLst>
               <a:ext uri="{FF2B5EF4-FFF2-40B4-BE49-F238E27FC236}">
-                <a16:creationId xmlns:a16="http://schemas.microsoft.com/office/drawing/2014/main" id="{65E24FF5-B1AA-43CA-9064-5AA2DD28446A}"/>
+                <a16:creationId xmlns:a16="http://schemas.microsoft.com/office/drawing/2014/main" xmlns="" id="{65E24FF5-B1AA-43CA-9064-5AA2DD28446A}"/>
               </a:ext>
             </a:extLst>
           </p:cNvPr>
@@ -4568,7 +4575,7 @@
           <p:cNvPr id="47" name="Pfeil: nach rechts 46">
             <a:extLst>
               <a:ext uri="{FF2B5EF4-FFF2-40B4-BE49-F238E27FC236}">
-                <a16:creationId xmlns:a16="http://schemas.microsoft.com/office/drawing/2014/main" id="{D4DFE8DE-D43D-495A-B031-3E4B46876D96}"/>
+                <a16:creationId xmlns:a16="http://schemas.microsoft.com/office/drawing/2014/main" xmlns="" id="{D4DFE8DE-D43D-495A-B031-3E4B46876D96}"/>
               </a:ext>
             </a:extLst>
           </p:cNvPr>
@@ -4625,7 +4632,7 @@
           <p:cNvPr id="89" name="Gruppieren 88">
             <a:extLst>
               <a:ext uri="{FF2B5EF4-FFF2-40B4-BE49-F238E27FC236}">
-                <a16:creationId xmlns:a16="http://schemas.microsoft.com/office/drawing/2014/main" id="{7DADACA5-5CA1-47D7-B0BC-557226F5E020}"/>
+                <a16:creationId xmlns:a16="http://schemas.microsoft.com/office/drawing/2014/main" xmlns="" id="{7DADACA5-5CA1-47D7-B0BC-557226F5E020}"/>
               </a:ext>
             </a:extLst>
           </p:cNvPr>
@@ -4645,7 +4652,7 @@
             <p:cNvPr id="26" name="Gruppieren 25">
               <a:extLst>
                 <a:ext uri="{FF2B5EF4-FFF2-40B4-BE49-F238E27FC236}">
-                  <a16:creationId xmlns:a16="http://schemas.microsoft.com/office/drawing/2014/main" id="{0BDEA192-AC26-4EB9-81F7-76DD6AC3564C}"/>
+                  <a16:creationId xmlns:a16="http://schemas.microsoft.com/office/drawing/2014/main" xmlns="" id="{0BDEA192-AC26-4EB9-81F7-76DD6AC3564C}"/>
                 </a:ext>
               </a:extLst>
             </p:cNvPr>
@@ -4665,7 +4672,7 @@
               <p:cNvPr id="27" name="Rechteck: obere Ecken abgerundet 26">
                 <a:extLst>
                   <a:ext uri="{FF2B5EF4-FFF2-40B4-BE49-F238E27FC236}">
-                    <a16:creationId xmlns:a16="http://schemas.microsoft.com/office/drawing/2014/main" id="{9F6990A9-57D7-410D-B965-DA249271F9F9}"/>
+                    <a16:creationId xmlns:a16="http://schemas.microsoft.com/office/drawing/2014/main" xmlns="" id="{9F6990A9-57D7-410D-B965-DA249271F9F9}"/>
                   </a:ext>
                 </a:extLst>
               </p:cNvPr>
@@ -4724,7 +4731,7 @@
               <p:cNvPr id="28" name="Ellipse 27">
                 <a:extLst>
                   <a:ext uri="{FF2B5EF4-FFF2-40B4-BE49-F238E27FC236}">
-                    <a16:creationId xmlns:a16="http://schemas.microsoft.com/office/drawing/2014/main" id="{12D6AFBA-19B3-46CE-ADBC-D1006AF9992F}"/>
+                    <a16:creationId xmlns:a16="http://schemas.microsoft.com/office/drawing/2014/main" xmlns="" id="{12D6AFBA-19B3-46CE-ADBC-D1006AF9992F}"/>
                   </a:ext>
                 </a:extLst>
               </p:cNvPr>
@@ -4781,7 +4788,7 @@
             <p:cNvPr id="29" name="Gruppieren 28">
               <a:extLst>
                 <a:ext uri="{FF2B5EF4-FFF2-40B4-BE49-F238E27FC236}">
-                  <a16:creationId xmlns:a16="http://schemas.microsoft.com/office/drawing/2014/main" id="{20D97C1B-0E43-40E2-86F3-296FAEAE2057}"/>
+                  <a16:creationId xmlns:a16="http://schemas.microsoft.com/office/drawing/2014/main" xmlns="" id="{20D97C1B-0E43-40E2-86F3-296FAEAE2057}"/>
                 </a:ext>
               </a:extLst>
             </p:cNvPr>
@@ -4801,7 +4808,7 @@
               <p:cNvPr id="30" name="Rechteck: obere Ecken abgerundet 29">
                 <a:extLst>
                   <a:ext uri="{FF2B5EF4-FFF2-40B4-BE49-F238E27FC236}">
-                    <a16:creationId xmlns:a16="http://schemas.microsoft.com/office/drawing/2014/main" id="{088EA9B5-AF75-4AAE-A1CE-452DC8B02CE9}"/>
+                    <a16:creationId xmlns:a16="http://schemas.microsoft.com/office/drawing/2014/main" xmlns="" id="{088EA9B5-AF75-4AAE-A1CE-452DC8B02CE9}"/>
                   </a:ext>
                 </a:extLst>
               </p:cNvPr>
@@ -4860,7 +4867,7 @@
               <p:cNvPr id="31" name="Ellipse 30">
                 <a:extLst>
                   <a:ext uri="{FF2B5EF4-FFF2-40B4-BE49-F238E27FC236}">
-                    <a16:creationId xmlns:a16="http://schemas.microsoft.com/office/drawing/2014/main" id="{9436A90F-F956-469D-9C68-58A480579DF1}"/>
+                    <a16:creationId xmlns:a16="http://schemas.microsoft.com/office/drawing/2014/main" xmlns="" id="{9436A90F-F956-469D-9C68-58A480579DF1}"/>
                   </a:ext>
                 </a:extLst>
               </p:cNvPr>
@@ -4917,7 +4924,7 @@
             <p:cNvPr id="32" name="Rechteck: abgerundete Ecken 31">
               <a:extLst>
                 <a:ext uri="{FF2B5EF4-FFF2-40B4-BE49-F238E27FC236}">
-                  <a16:creationId xmlns:a16="http://schemas.microsoft.com/office/drawing/2014/main" id="{38B02968-AED7-46CD-A99A-521B95B1A0E4}"/>
+                  <a16:creationId xmlns:a16="http://schemas.microsoft.com/office/drawing/2014/main" xmlns="" id="{38B02968-AED7-46CD-A99A-521B95B1A0E4}"/>
                 </a:ext>
               </a:extLst>
             </p:cNvPr>
@@ -4980,7 +4987,7 @@
             <p:cNvPr id="33" name="Rechteck: abgerundete Ecken 32">
               <a:extLst>
                 <a:ext uri="{FF2B5EF4-FFF2-40B4-BE49-F238E27FC236}">
-                  <a16:creationId xmlns:a16="http://schemas.microsoft.com/office/drawing/2014/main" id="{A3460637-2E18-46DC-B28F-B32236277DFE}"/>
+                  <a16:creationId xmlns:a16="http://schemas.microsoft.com/office/drawing/2014/main" xmlns="" id="{A3460637-2E18-46DC-B28F-B32236277DFE}"/>
                 </a:ext>
               </a:extLst>
             </p:cNvPr>
@@ -5043,7 +5050,7 @@
             <p:cNvPr id="34" name="Textfeld 33">
               <a:extLst>
                 <a:ext uri="{FF2B5EF4-FFF2-40B4-BE49-F238E27FC236}">
-                  <a16:creationId xmlns:a16="http://schemas.microsoft.com/office/drawing/2014/main" id="{04621091-8D39-45FA-B228-65AFE64167DB}"/>
+                  <a16:creationId xmlns:a16="http://schemas.microsoft.com/office/drawing/2014/main" xmlns="" id="{04621091-8D39-45FA-B228-65AFE64167DB}"/>
                 </a:ext>
               </a:extLst>
             </p:cNvPr>
@@ -5078,7 +5085,7 @@
             <p:cNvPr id="35" name="Textfeld 34">
               <a:extLst>
                 <a:ext uri="{FF2B5EF4-FFF2-40B4-BE49-F238E27FC236}">
-                  <a16:creationId xmlns:a16="http://schemas.microsoft.com/office/drawing/2014/main" id="{B567D6C2-ECFB-45C7-BDC1-7D59A844E996}"/>
+                  <a16:creationId xmlns:a16="http://schemas.microsoft.com/office/drawing/2014/main" xmlns="" id="{B567D6C2-ECFB-45C7-BDC1-7D59A844E996}"/>
                 </a:ext>
               </a:extLst>
             </p:cNvPr>
@@ -5113,7 +5120,7 @@
             <p:cNvPr id="39" name="Gruppieren 38">
               <a:extLst>
                 <a:ext uri="{FF2B5EF4-FFF2-40B4-BE49-F238E27FC236}">
-                  <a16:creationId xmlns:a16="http://schemas.microsoft.com/office/drawing/2014/main" id="{4C86AB00-B103-4E3E-A532-25FFA88EC3B0}"/>
+                  <a16:creationId xmlns:a16="http://schemas.microsoft.com/office/drawing/2014/main" xmlns="" id="{4C86AB00-B103-4E3E-A532-25FFA88EC3B0}"/>
                 </a:ext>
               </a:extLst>
             </p:cNvPr>
@@ -5133,7 +5140,7 @@
               <p:cNvPr id="40" name="Rechteck: obere Ecken abgerundet 39">
                 <a:extLst>
                   <a:ext uri="{FF2B5EF4-FFF2-40B4-BE49-F238E27FC236}">
-                    <a16:creationId xmlns:a16="http://schemas.microsoft.com/office/drawing/2014/main" id="{53F71C67-84D6-48AB-A000-A3B1CEE33816}"/>
+                    <a16:creationId xmlns:a16="http://schemas.microsoft.com/office/drawing/2014/main" xmlns="" id="{53F71C67-84D6-48AB-A000-A3B1CEE33816}"/>
                   </a:ext>
                 </a:extLst>
               </p:cNvPr>
@@ -5192,7 +5199,7 @@
               <p:cNvPr id="41" name="Ellipse 40">
                 <a:extLst>
                   <a:ext uri="{FF2B5EF4-FFF2-40B4-BE49-F238E27FC236}">
-                    <a16:creationId xmlns:a16="http://schemas.microsoft.com/office/drawing/2014/main" id="{CF668C80-D5F7-4FE6-B46A-485C7D307481}"/>
+                    <a16:creationId xmlns:a16="http://schemas.microsoft.com/office/drawing/2014/main" xmlns="" id="{CF668C80-D5F7-4FE6-B46A-485C7D307481}"/>
                   </a:ext>
                 </a:extLst>
               </p:cNvPr>
@@ -5249,7 +5256,7 @@
             <p:cNvPr id="42" name="Rechteck: abgerundete Ecken 41">
               <a:extLst>
                 <a:ext uri="{FF2B5EF4-FFF2-40B4-BE49-F238E27FC236}">
-                  <a16:creationId xmlns:a16="http://schemas.microsoft.com/office/drawing/2014/main" id="{67E5B9A2-6E69-4D22-9F8C-F944A518F918}"/>
+                  <a16:creationId xmlns:a16="http://schemas.microsoft.com/office/drawing/2014/main" xmlns="" id="{67E5B9A2-6E69-4D22-9F8C-F944A518F918}"/>
                 </a:ext>
               </a:extLst>
             </p:cNvPr>
@@ -5312,7 +5319,7 @@
             <p:cNvPr id="44" name="Textfeld 43">
               <a:extLst>
                 <a:ext uri="{FF2B5EF4-FFF2-40B4-BE49-F238E27FC236}">
-                  <a16:creationId xmlns:a16="http://schemas.microsoft.com/office/drawing/2014/main" id="{876BCE2A-37C3-4597-B55C-DFB20C5B8DDC}"/>
+                  <a16:creationId xmlns:a16="http://schemas.microsoft.com/office/drawing/2014/main" xmlns="" id="{876BCE2A-37C3-4597-B55C-DFB20C5B8DDC}"/>
                 </a:ext>
               </a:extLst>
             </p:cNvPr>
@@ -5347,7 +5354,7 @@
             <p:cNvPr id="45" name="Textfeld 44">
               <a:extLst>
                 <a:ext uri="{FF2B5EF4-FFF2-40B4-BE49-F238E27FC236}">
-                  <a16:creationId xmlns:a16="http://schemas.microsoft.com/office/drawing/2014/main" id="{F170ACB8-63F9-4432-80B4-5F30AF5845DD}"/>
+                  <a16:creationId xmlns:a16="http://schemas.microsoft.com/office/drawing/2014/main" xmlns="" id="{F170ACB8-63F9-4432-80B4-5F30AF5845DD}"/>
                 </a:ext>
               </a:extLst>
             </p:cNvPr>
@@ -5382,7 +5389,7 @@
             <p:cNvPr id="46" name="Bogen 45">
               <a:extLst>
                 <a:ext uri="{FF2B5EF4-FFF2-40B4-BE49-F238E27FC236}">
-                  <a16:creationId xmlns:a16="http://schemas.microsoft.com/office/drawing/2014/main" id="{D3F0F151-507E-4C03-91CD-8E34C3467E7A}"/>
+                  <a16:creationId xmlns:a16="http://schemas.microsoft.com/office/drawing/2014/main" xmlns="" id="{D3F0F151-507E-4C03-91CD-8E34C3467E7A}"/>
                 </a:ext>
               </a:extLst>
             </p:cNvPr>
@@ -5435,7 +5442,7 @@
             <p:cNvPr id="48" name="Rechteck: abgerundete Ecken 47">
               <a:extLst>
                 <a:ext uri="{FF2B5EF4-FFF2-40B4-BE49-F238E27FC236}">
-                  <a16:creationId xmlns:a16="http://schemas.microsoft.com/office/drawing/2014/main" id="{0864F0D3-25BD-40B0-A3EF-94AA006A8D7F}"/>
+                  <a16:creationId xmlns:a16="http://schemas.microsoft.com/office/drawing/2014/main" xmlns="" id="{0864F0D3-25BD-40B0-A3EF-94AA006A8D7F}"/>
                 </a:ext>
               </a:extLst>
             </p:cNvPr>
@@ -5498,7 +5505,7 @@
             <p:cNvPr id="49" name="Gruppieren 48">
               <a:extLst>
                 <a:ext uri="{FF2B5EF4-FFF2-40B4-BE49-F238E27FC236}">
-                  <a16:creationId xmlns:a16="http://schemas.microsoft.com/office/drawing/2014/main" id="{A4165298-8979-468F-82D7-3EFB21516A52}"/>
+                  <a16:creationId xmlns:a16="http://schemas.microsoft.com/office/drawing/2014/main" xmlns="" id="{A4165298-8979-468F-82D7-3EFB21516A52}"/>
                 </a:ext>
               </a:extLst>
             </p:cNvPr>
@@ -5518,7 +5525,7 @@
               <p:cNvPr id="50" name="Rechteck: obere Ecken abgerundet 49">
                 <a:extLst>
                   <a:ext uri="{FF2B5EF4-FFF2-40B4-BE49-F238E27FC236}">
-                    <a16:creationId xmlns:a16="http://schemas.microsoft.com/office/drawing/2014/main" id="{ABFC1CDB-641A-4B2F-8E6C-338E7E3F6625}"/>
+                    <a16:creationId xmlns:a16="http://schemas.microsoft.com/office/drawing/2014/main" xmlns="" id="{ABFC1CDB-641A-4B2F-8E6C-338E7E3F6625}"/>
                   </a:ext>
                 </a:extLst>
               </p:cNvPr>
@@ -5577,7 +5584,7 @@
               <p:cNvPr id="51" name="Ellipse 50">
                 <a:extLst>
                   <a:ext uri="{FF2B5EF4-FFF2-40B4-BE49-F238E27FC236}">
-                    <a16:creationId xmlns:a16="http://schemas.microsoft.com/office/drawing/2014/main" id="{1EB558F7-EF06-4682-AB88-C3E37A0B5DE1}"/>
+                    <a16:creationId xmlns:a16="http://schemas.microsoft.com/office/drawing/2014/main" xmlns="" id="{1EB558F7-EF06-4682-AB88-C3E37A0B5DE1}"/>
                   </a:ext>
                 </a:extLst>
               </p:cNvPr>
@@ -5635,7 +5642,7 @@
           <p:cNvPr id="90" name="Gruppieren 89">
             <a:extLst>
               <a:ext uri="{FF2B5EF4-FFF2-40B4-BE49-F238E27FC236}">
-                <a16:creationId xmlns:a16="http://schemas.microsoft.com/office/drawing/2014/main" id="{D950DAE2-B285-4EBF-A8FC-1AAE131C97B2}"/>
+                <a16:creationId xmlns:a16="http://schemas.microsoft.com/office/drawing/2014/main" xmlns="" id="{D950DAE2-B285-4EBF-A8FC-1AAE131C97B2}"/>
               </a:ext>
             </a:extLst>
           </p:cNvPr>
@@ -5655,7 +5662,7 @@
             <p:cNvPr id="55" name="Gruppieren 54">
               <a:extLst>
                 <a:ext uri="{FF2B5EF4-FFF2-40B4-BE49-F238E27FC236}">
-                  <a16:creationId xmlns:a16="http://schemas.microsoft.com/office/drawing/2014/main" id="{7C529067-6DCC-4976-87F4-BEAC46291249}"/>
+                  <a16:creationId xmlns:a16="http://schemas.microsoft.com/office/drawing/2014/main" xmlns="" id="{7C529067-6DCC-4976-87F4-BEAC46291249}"/>
                 </a:ext>
               </a:extLst>
             </p:cNvPr>
@@ -5675,7 +5682,7 @@
               <p:cNvPr id="56" name="Rechteck: obere Ecken abgerundet 55">
                 <a:extLst>
                   <a:ext uri="{FF2B5EF4-FFF2-40B4-BE49-F238E27FC236}">
-                    <a16:creationId xmlns:a16="http://schemas.microsoft.com/office/drawing/2014/main" id="{86F7B514-4556-48AE-85CC-AF876AFB30EC}"/>
+                    <a16:creationId xmlns:a16="http://schemas.microsoft.com/office/drawing/2014/main" xmlns="" id="{86F7B514-4556-48AE-85CC-AF876AFB30EC}"/>
                   </a:ext>
                 </a:extLst>
               </p:cNvPr>
@@ -5734,7 +5741,7 @@
               <p:cNvPr id="57" name="Ellipse 56">
                 <a:extLst>
                   <a:ext uri="{FF2B5EF4-FFF2-40B4-BE49-F238E27FC236}">
-                    <a16:creationId xmlns:a16="http://schemas.microsoft.com/office/drawing/2014/main" id="{193EFBED-4EF6-40FA-89FF-F22C9065A059}"/>
+                    <a16:creationId xmlns:a16="http://schemas.microsoft.com/office/drawing/2014/main" xmlns="" id="{193EFBED-4EF6-40FA-89FF-F22C9065A059}"/>
                   </a:ext>
                 </a:extLst>
               </p:cNvPr>
@@ -5791,7 +5798,7 @@
             <p:cNvPr id="58" name="Rechteck: abgerundete Ecken 57">
               <a:extLst>
                 <a:ext uri="{FF2B5EF4-FFF2-40B4-BE49-F238E27FC236}">
-                  <a16:creationId xmlns:a16="http://schemas.microsoft.com/office/drawing/2014/main" id="{49E45ED3-067D-4246-B13B-C5F56D930E80}"/>
+                  <a16:creationId xmlns:a16="http://schemas.microsoft.com/office/drawing/2014/main" xmlns="" id="{49E45ED3-067D-4246-B13B-C5F56D930E80}"/>
                 </a:ext>
               </a:extLst>
             </p:cNvPr>
@@ -5854,7 +5861,7 @@
             <p:cNvPr id="60" name="Textfeld 59">
               <a:extLst>
                 <a:ext uri="{FF2B5EF4-FFF2-40B4-BE49-F238E27FC236}">
-                  <a16:creationId xmlns:a16="http://schemas.microsoft.com/office/drawing/2014/main" id="{95515A46-0A60-456B-9E22-551E6971C1FD}"/>
+                  <a16:creationId xmlns:a16="http://schemas.microsoft.com/office/drawing/2014/main" xmlns="" id="{95515A46-0A60-456B-9E22-551E6971C1FD}"/>
                 </a:ext>
               </a:extLst>
             </p:cNvPr>
@@ -5889,7 +5896,7 @@
             <p:cNvPr id="61" name="Textfeld 60">
               <a:extLst>
                 <a:ext uri="{FF2B5EF4-FFF2-40B4-BE49-F238E27FC236}">
-                  <a16:creationId xmlns:a16="http://schemas.microsoft.com/office/drawing/2014/main" id="{3BF283B3-8A47-4F17-B31B-07AC7E4E0DB7}"/>
+                  <a16:creationId xmlns:a16="http://schemas.microsoft.com/office/drawing/2014/main" xmlns="" id="{3BF283B3-8A47-4F17-B31B-07AC7E4E0DB7}"/>
                 </a:ext>
               </a:extLst>
             </p:cNvPr>
@@ -5924,7 +5931,7 @@
             <p:cNvPr id="62" name="Gruppieren 61">
               <a:extLst>
                 <a:ext uri="{FF2B5EF4-FFF2-40B4-BE49-F238E27FC236}">
-                  <a16:creationId xmlns:a16="http://schemas.microsoft.com/office/drawing/2014/main" id="{C5632381-62AF-41AD-A0E7-C897FC4CCC30}"/>
+                  <a16:creationId xmlns:a16="http://schemas.microsoft.com/office/drawing/2014/main" xmlns="" id="{C5632381-62AF-41AD-A0E7-C897FC4CCC30}"/>
                 </a:ext>
               </a:extLst>
             </p:cNvPr>
@@ -5944,7 +5951,7 @@
               <p:cNvPr id="63" name="Rechteck: obere Ecken abgerundet 62">
                 <a:extLst>
                   <a:ext uri="{FF2B5EF4-FFF2-40B4-BE49-F238E27FC236}">
-                    <a16:creationId xmlns:a16="http://schemas.microsoft.com/office/drawing/2014/main" id="{DFBB5A90-21BB-4893-AF46-DFDEA165261B}"/>
+                    <a16:creationId xmlns:a16="http://schemas.microsoft.com/office/drawing/2014/main" xmlns="" id="{DFBB5A90-21BB-4893-AF46-DFDEA165261B}"/>
                   </a:ext>
                 </a:extLst>
               </p:cNvPr>
@@ -6003,7 +6010,7 @@
               <p:cNvPr id="64" name="Ellipse 63">
                 <a:extLst>
                   <a:ext uri="{FF2B5EF4-FFF2-40B4-BE49-F238E27FC236}">
-                    <a16:creationId xmlns:a16="http://schemas.microsoft.com/office/drawing/2014/main" id="{5CF91120-58AF-4E16-AC01-2B7977E96552}"/>
+                    <a16:creationId xmlns:a16="http://schemas.microsoft.com/office/drawing/2014/main" xmlns="" id="{5CF91120-58AF-4E16-AC01-2B7977E96552}"/>
                   </a:ext>
                 </a:extLst>
               </p:cNvPr>
@@ -6060,7 +6067,7 @@
             <p:cNvPr id="65" name="Rechteck: abgerundete Ecken 64">
               <a:extLst>
                 <a:ext uri="{FF2B5EF4-FFF2-40B4-BE49-F238E27FC236}">
-                  <a16:creationId xmlns:a16="http://schemas.microsoft.com/office/drawing/2014/main" id="{E5397E03-9002-4C27-852B-0E0EF4487837}"/>
+                  <a16:creationId xmlns:a16="http://schemas.microsoft.com/office/drawing/2014/main" xmlns="" id="{E5397E03-9002-4C27-852B-0E0EF4487837}"/>
                 </a:ext>
               </a:extLst>
             </p:cNvPr>
@@ -6123,7 +6130,7 @@
             <p:cNvPr id="66" name="Textfeld 65">
               <a:extLst>
                 <a:ext uri="{FF2B5EF4-FFF2-40B4-BE49-F238E27FC236}">
-                  <a16:creationId xmlns:a16="http://schemas.microsoft.com/office/drawing/2014/main" id="{E67F00E2-BAF7-4B8D-863E-8F35A0B7B1B2}"/>
+                  <a16:creationId xmlns:a16="http://schemas.microsoft.com/office/drawing/2014/main" xmlns="" id="{E67F00E2-BAF7-4B8D-863E-8F35A0B7B1B2}"/>
                 </a:ext>
               </a:extLst>
             </p:cNvPr>
@@ -6158,7 +6165,7 @@
             <p:cNvPr id="67" name="Textfeld 66">
               <a:extLst>
                 <a:ext uri="{FF2B5EF4-FFF2-40B4-BE49-F238E27FC236}">
-                  <a16:creationId xmlns:a16="http://schemas.microsoft.com/office/drawing/2014/main" id="{BC34DDE6-7F52-4425-9F97-269201EAB402}"/>
+                  <a16:creationId xmlns:a16="http://schemas.microsoft.com/office/drawing/2014/main" xmlns="" id="{BC34DDE6-7F52-4425-9F97-269201EAB402}"/>
                 </a:ext>
               </a:extLst>
             </p:cNvPr>
@@ -6193,7 +6200,7 @@
             <p:cNvPr id="69" name="Rechteck: abgerundete Ecken 68">
               <a:extLst>
                 <a:ext uri="{FF2B5EF4-FFF2-40B4-BE49-F238E27FC236}">
-                  <a16:creationId xmlns:a16="http://schemas.microsoft.com/office/drawing/2014/main" id="{59C00337-32C6-46C5-B7D1-1958E7C89BD2}"/>
+                  <a16:creationId xmlns:a16="http://schemas.microsoft.com/office/drawing/2014/main" xmlns="" id="{59C00337-32C6-46C5-B7D1-1958E7C89BD2}"/>
                 </a:ext>
               </a:extLst>
             </p:cNvPr>
@@ -6256,7 +6263,7 @@
             <p:cNvPr id="70" name="Gruppieren 69">
               <a:extLst>
                 <a:ext uri="{FF2B5EF4-FFF2-40B4-BE49-F238E27FC236}">
-                  <a16:creationId xmlns:a16="http://schemas.microsoft.com/office/drawing/2014/main" id="{27634134-E9EB-4F8C-AE47-0F526C7CB793}"/>
+                  <a16:creationId xmlns:a16="http://schemas.microsoft.com/office/drawing/2014/main" xmlns="" id="{27634134-E9EB-4F8C-AE47-0F526C7CB793}"/>
                 </a:ext>
               </a:extLst>
             </p:cNvPr>
@@ -6276,7 +6283,7 @@
               <p:cNvPr id="71" name="Rechteck: obere Ecken abgerundet 70">
                 <a:extLst>
                   <a:ext uri="{FF2B5EF4-FFF2-40B4-BE49-F238E27FC236}">
-                    <a16:creationId xmlns:a16="http://schemas.microsoft.com/office/drawing/2014/main" id="{0B7E16FC-1936-47B8-9FB5-B75CB8117EE8}"/>
+                    <a16:creationId xmlns:a16="http://schemas.microsoft.com/office/drawing/2014/main" xmlns="" id="{0B7E16FC-1936-47B8-9FB5-B75CB8117EE8}"/>
                   </a:ext>
                 </a:extLst>
               </p:cNvPr>
@@ -6335,7 +6342,7 @@
               <p:cNvPr id="72" name="Ellipse 71">
                 <a:extLst>
                   <a:ext uri="{FF2B5EF4-FFF2-40B4-BE49-F238E27FC236}">
-                    <a16:creationId xmlns:a16="http://schemas.microsoft.com/office/drawing/2014/main" id="{89F04DED-70C5-4505-955F-93A4ABA024CA}"/>
+                    <a16:creationId xmlns:a16="http://schemas.microsoft.com/office/drawing/2014/main" xmlns="" id="{89F04DED-70C5-4505-955F-93A4ABA024CA}"/>
                   </a:ext>
                 </a:extLst>
               </p:cNvPr>
@@ -6392,7 +6399,7 @@
             <p:cNvPr id="73" name="Rechteck: abgerundete Ecken 72">
               <a:extLst>
                 <a:ext uri="{FF2B5EF4-FFF2-40B4-BE49-F238E27FC236}">
-                  <a16:creationId xmlns:a16="http://schemas.microsoft.com/office/drawing/2014/main" id="{77FD0564-CBD1-41EE-9279-FBA2E4A04EB1}"/>
+                  <a16:creationId xmlns:a16="http://schemas.microsoft.com/office/drawing/2014/main" xmlns="" id="{77FD0564-CBD1-41EE-9279-FBA2E4A04EB1}"/>
                 </a:ext>
               </a:extLst>
             </p:cNvPr>
@@ -6455,7 +6462,7 @@
             <p:cNvPr id="74" name="Gruppieren 73">
               <a:extLst>
                 <a:ext uri="{FF2B5EF4-FFF2-40B4-BE49-F238E27FC236}">
-                  <a16:creationId xmlns:a16="http://schemas.microsoft.com/office/drawing/2014/main" id="{EA1FA1FA-9BFE-4C42-B329-440D206B9DEB}"/>
+                  <a16:creationId xmlns:a16="http://schemas.microsoft.com/office/drawing/2014/main" xmlns="" id="{EA1FA1FA-9BFE-4C42-B329-440D206B9DEB}"/>
                 </a:ext>
               </a:extLst>
             </p:cNvPr>
@@ -6475,7 +6482,7 @@
               <p:cNvPr id="75" name="Rechteck: obere Ecken abgerundet 74">
                 <a:extLst>
                   <a:ext uri="{FF2B5EF4-FFF2-40B4-BE49-F238E27FC236}">
-                    <a16:creationId xmlns:a16="http://schemas.microsoft.com/office/drawing/2014/main" id="{007A5BE8-DB3E-4835-B951-9F9BD199F518}"/>
+                    <a16:creationId xmlns:a16="http://schemas.microsoft.com/office/drawing/2014/main" xmlns="" id="{007A5BE8-DB3E-4835-B951-9F9BD199F518}"/>
                   </a:ext>
                 </a:extLst>
               </p:cNvPr>
@@ -6534,7 +6541,7 @@
               <p:cNvPr id="76" name="Ellipse 75">
                 <a:extLst>
                   <a:ext uri="{FF2B5EF4-FFF2-40B4-BE49-F238E27FC236}">
-                    <a16:creationId xmlns:a16="http://schemas.microsoft.com/office/drawing/2014/main" id="{C608C56B-9D96-4DD0-8137-D0ADF93E869B}"/>
+                    <a16:creationId xmlns:a16="http://schemas.microsoft.com/office/drawing/2014/main" xmlns="" id="{C608C56B-9D96-4DD0-8137-D0ADF93E869B}"/>
                   </a:ext>
                 </a:extLst>
               </p:cNvPr>
@@ -6592,7 +6599,7 @@
           <p:cNvPr id="80" name="Titel 1">
             <a:extLst>
               <a:ext uri="{FF2B5EF4-FFF2-40B4-BE49-F238E27FC236}">
-                <a16:creationId xmlns:a16="http://schemas.microsoft.com/office/drawing/2014/main" id="{1DC5EA29-B20F-4E40-9060-547F40A617DB}"/>
+                <a16:creationId xmlns:a16="http://schemas.microsoft.com/office/drawing/2014/main" xmlns="" id="{1DC5EA29-B20F-4E40-9060-547F40A617DB}"/>
               </a:ext>
             </a:extLst>
           </p:cNvPr>
@@ -6625,7 +6632,7 @@
           <p:cNvPr id="83" name="Grafik 82">
             <a:extLst>
               <a:ext uri="{FF2B5EF4-FFF2-40B4-BE49-F238E27FC236}">
-                <a16:creationId xmlns:a16="http://schemas.microsoft.com/office/drawing/2014/main" id="{EBF1A908-3658-45E9-9375-2406DEB9FD5E}"/>
+                <a16:creationId xmlns:a16="http://schemas.microsoft.com/office/drawing/2014/main" xmlns="" id="{EBF1A908-3658-45E9-9375-2406DEB9FD5E}"/>
               </a:ext>
             </a:extLst>
           </p:cNvPr>
@@ -6661,7 +6668,7 @@
           <p:cNvPr id="87" name="Textfeld 86">
             <a:extLst>
               <a:ext uri="{FF2B5EF4-FFF2-40B4-BE49-F238E27FC236}">
-                <a16:creationId xmlns:a16="http://schemas.microsoft.com/office/drawing/2014/main" id="{A9D04EAB-0599-46D9-916A-50A1E611D79B}"/>
+                <a16:creationId xmlns:a16="http://schemas.microsoft.com/office/drawing/2014/main" xmlns="" id="{A9D04EAB-0599-46D9-916A-50A1E611D79B}"/>
               </a:ext>
             </a:extLst>
           </p:cNvPr>
@@ -6981,7 +6988,7 @@
           <p:cNvPr id="4" name="Grafik 3">
             <a:extLst>
               <a:ext uri="{FF2B5EF4-FFF2-40B4-BE49-F238E27FC236}">
-                <a16:creationId xmlns:a16="http://schemas.microsoft.com/office/drawing/2014/main" id="{F99A212A-4427-4D63-83C6-A504D8957438}"/>
+                <a16:creationId xmlns:a16="http://schemas.microsoft.com/office/drawing/2014/main" xmlns="" id="{F99A212A-4427-4D63-83C6-A504D8957438}"/>
               </a:ext>
             </a:extLst>
           </p:cNvPr>
@@ -7016,7 +7023,7 @@
           <p:cNvPr id="6" name="Titel 1">
             <a:extLst>
               <a:ext uri="{FF2B5EF4-FFF2-40B4-BE49-F238E27FC236}">
-                <a16:creationId xmlns:a16="http://schemas.microsoft.com/office/drawing/2014/main" id="{C5AA3EC1-2448-468A-AE92-790677090544}"/>
+                <a16:creationId xmlns:a16="http://schemas.microsoft.com/office/drawing/2014/main" xmlns="" id="{C5AA3EC1-2448-468A-AE92-790677090544}"/>
               </a:ext>
             </a:extLst>
           </p:cNvPr>
@@ -7049,7 +7056,7 @@
           <p:cNvPr id="7" name="Grafik 6">
             <a:extLst>
               <a:ext uri="{FF2B5EF4-FFF2-40B4-BE49-F238E27FC236}">
-                <a16:creationId xmlns:a16="http://schemas.microsoft.com/office/drawing/2014/main" id="{D83DB4C8-7F6F-44A6-B6B6-CF84179EF2FD}"/>
+                <a16:creationId xmlns:a16="http://schemas.microsoft.com/office/drawing/2014/main" xmlns="" id="{D83DB4C8-7F6F-44A6-B6B6-CF84179EF2FD}"/>
               </a:ext>
             </a:extLst>
           </p:cNvPr>
@@ -7090,6 +7097,13 @@
   <p:clrMapOvr>
     <a:masterClrMapping/>
   </p:clrMapOvr>
+  <p:timing>
+    <p:tnLst>
+      <p:par>
+        <p:cTn id="1" dur="indefinite" restart="never" nodeType="tmRoot"/>
+      </p:par>
+    </p:tnLst>
+  </p:timing>
 </p:sld>
 </file>
 
@@ -7115,7 +7129,7 @@
           <p:cNvPr id="6" name="Titel 1">
             <a:extLst>
               <a:ext uri="{FF2B5EF4-FFF2-40B4-BE49-F238E27FC236}">
-                <a16:creationId xmlns:a16="http://schemas.microsoft.com/office/drawing/2014/main" id="{C5AA3EC1-2448-468A-AE92-790677090544}"/>
+                <a16:creationId xmlns:a16="http://schemas.microsoft.com/office/drawing/2014/main" xmlns="" id="{C5AA3EC1-2448-468A-AE92-790677090544}"/>
               </a:ext>
             </a:extLst>
           </p:cNvPr>
@@ -7148,7 +7162,7 @@
           <p:cNvPr id="7" name="Grafik 6">
             <a:extLst>
               <a:ext uri="{FF2B5EF4-FFF2-40B4-BE49-F238E27FC236}">
-                <a16:creationId xmlns:a16="http://schemas.microsoft.com/office/drawing/2014/main" id="{D83DB4C8-7F6F-44A6-B6B6-CF84179EF2FD}"/>
+                <a16:creationId xmlns:a16="http://schemas.microsoft.com/office/drawing/2014/main" xmlns="" id="{D83DB4C8-7F6F-44A6-B6B6-CF84179EF2FD}"/>
               </a:ext>
             </a:extLst>
           </p:cNvPr>
@@ -7184,7 +7198,7 @@
           <p:cNvPr id="5" name="Grafik 4">
             <a:extLst>
               <a:ext uri="{FF2B5EF4-FFF2-40B4-BE49-F238E27FC236}">
-                <a16:creationId xmlns:a16="http://schemas.microsoft.com/office/drawing/2014/main" id="{631A1F56-4742-4B93-AF31-9A95193C91B4}"/>
+                <a16:creationId xmlns:a16="http://schemas.microsoft.com/office/drawing/2014/main" xmlns="" id="{631A1F56-4742-4B93-AF31-9A95193C91B4}"/>
               </a:ext>
             </a:extLst>
           </p:cNvPr>
@@ -7224,6 +7238,13 @@
   <p:clrMapOvr>
     <a:masterClrMapping/>
   </p:clrMapOvr>
+  <p:timing>
+    <p:tnLst>
+      <p:par>
+        <p:cTn id="1" dur="indefinite" restart="never" nodeType="tmRoot"/>
+      </p:par>
+    </p:tnLst>
+  </p:timing>
 </p:sld>
 </file>
 
@@ -7249,7 +7270,7 @@
           <p:cNvPr id="5" name="Titel 1">
             <a:extLst>
               <a:ext uri="{FF2B5EF4-FFF2-40B4-BE49-F238E27FC236}">
-                <a16:creationId xmlns:a16="http://schemas.microsoft.com/office/drawing/2014/main" id="{0414DF75-E692-43F3-A07F-F54CE7C528ED}"/>
+                <a16:creationId xmlns:a16="http://schemas.microsoft.com/office/drawing/2014/main" xmlns="" id="{0414DF75-E692-43F3-A07F-F54CE7C528ED}"/>
               </a:ext>
             </a:extLst>
           </p:cNvPr>
@@ -7282,7 +7303,7 @@
           <p:cNvPr id="6" name="Grafik 5">
             <a:extLst>
               <a:ext uri="{FF2B5EF4-FFF2-40B4-BE49-F238E27FC236}">
-                <a16:creationId xmlns:a16="http://schemas.microsoft.com/office/drawing/2014/main" id="{024FC5CC-B75F-4D21-9FAB-EA7C81B69608}"/>
+                <a16:creationId xmlns:a16="http://schemas.microsoft.com/office/drawing/2014/main" xmlns="" id="{024FC5CC-B75F-4D21-9FAB-EA7C81B69608}"/>
               </a:ext>
             </a:extLst>
           </p:cNvPr>
@@ -7318,7 +7339,7 @@
           <p:cNvPr id="7" name="Grafik 6">
             <a:extLst>
               <a:ext uri="{FF2B5EF4-FFF2-40B4-BE49-F238E27FC236}">
-                <a16:creationId xmlns:a16="http://schemas.microsoft.com/office/drawing/2014/main" id="{A8BCC594-BA8B-4E23-88F7-4912FD10579E}"/>
+                <a16:creationId xmlns:a16="http://schemas.microsoft.com/office/drawing/2014/main" xmlns="" id="{A8BCC594-BA8B-4E23-88F7-4912FD10579E}"/>
               </a:ext>
             </a:extLst>
           </p:cNvPr>
@@ -7358,6 +7379,13 @@
   <p:clrMapOvr>
     <a:masterClrMapping/>
   </p:clrMapOvr>
+  <p:timing>
+    <p:tnLst>
+      <p:par>
+        <p:cTn id="1" dur="indefinite" restart="never" nodeType="tmRoot"/>
+      </p:par>
+    </p:tnLst>
+  </p:timing>
 </p:sld>
 </file>
 
@@ -7383,7 +7411,7 @@
           <p:cNvPr id="4" name="Grafik 3">
             <a:extLst>
               <a:ext uri="{FF2B5EF4-FFF2-40B4-BE49-F238E27FC236}">
-                <a16:creationId xmlns:a16="http://schemas.microsoft.com/office/drawing/2014/main" id="{F987C00E-C416-4040-BDF4-D1E96CD1B20D}"/>
+                <a16:creationId xmlns:a16="http://schemas.microsoft.com/office/drawing/2014/main" xmlns="" id="{F987C00E-C416-4040-BDF4-D1E96CD1B20D}"/>
               </a:ext>
             </a:extLst>
           </p:cNvPr>
@@ -7418,7 +7446,7 @@
           <p:cNvPr id="5" name="Titel 1">
             <a:extLst>
               <a:ext uri="{FF2B5EF4-FFF2-40B4-BE49-F238E27FC236}">
-                <a16:creationId xmlns:a16="http://schemas.microsoft.com/office/drawing/2014/main" id="{0414DF75-E692-43F3-A07F-F54CE7C528ED}"/>
+                <a16:creationId xmlns:a16="http://schemas.microsoft.com/office/drawing/2014/main" xmlns="" id="{0414DF75-E692-43F3-A07F-F54CE7C528ED}"/>
               </a:ext>
             </a:extLst>
           </p:cNvPr>
@@ -7451,7 +7479,7 @@
           <p:cNvPr id="6" name="Grafik 5">
             <a:extLst>
               <a:ext uri="{FF2B5EF4-FFF2-40B4-BE49-F238E27FC236}">
-                <a16:creationId xmlns:a16="http://schemas.microsoft.com/office/drawing/2014/main" id="{024FC5CC-B75F-4D21-9FAB-EA7C81B69608}"/>
+                <a16:creationId xmlns:a16="http://schemas.microsoft.com/office/drawing/2014/main" xmlns="" id="{024FC5CC-B75F-4D21-9FAB-EA7C81B69608}"/>
               </a:ext>
             </a:extLst>
           </p:cNvPr>
@@ -7492,6 +7520,13 @@
   <p:clrMapOvr>
     <a:masterClrMapping/>
   </p:clrMapOvr>
+  <p:timing>
+    <p:tnLst>
+      <p:par>
+        <p:cTn id="1" dur="indefinite" restart="never" nodeType="tmRoot"/>
+      </p:par>
+    </p:tnLst>
+  </p:timing>
 </p:sld>
 </file>
 
@@ -7517,7 +7552,7 @@
           <p:cNvPr id="4" name="Titel 1">
             <a:extLst>
               <a:ext uri="{FF2B5EF4-FFF2-40B4-BE49-F238E27FC236}">
-                <a16:creationId xmlns:a16="http://schemas.microsoft.com/office/drawing/2014/main" id="{B453ED61-2837-4DEE-AD29-85C425BDB7F2}"/>
+                <a16:creationId xmlns:a16="http://schemas.microsoft.com/office/drawing/2014/main" xmlns="" id="{B453ED61-2837-4DEE-AD29-85C425BDB7F2}"/>
               </a:ext>
             </a:extLst>
           </p:cNvPr>
@@ -7554,7 +7589,7 @@
           <p:cNvPr id="5" name="Grafik 4">
             <a:extLst>
               <a:ext uri="{FF2B5EF4-FFF2-40B4-BE49-F238E27FC236}">
-                <a16:creationId xmlns:a16="http://schemas.microsoft.com/office/drawing/2014/main" id="{02B10405-AFC8-4F9A-9AA1-FA1B927D035C}"/>
+                <a16:creationId xmlns:a16="http://schemas.microsoft.com/office/drawing/2014/main" xmlns="" id="{02B10405-AFC8-4F9A-9AA1-FA1B927D035C}"/>
               </a:ext>
             </a:extLst>
           </p:cNvPr>
@@ -7584,7 +7619,7 @@
           <p:cNvPr id="6" name="Grafik 5">
             <a:extLst>
               <a:ext uri="{FF2B5EF4-FFF2-40B4-BE49-F238E27FC236}">
-                <a16:creationId xmlns:a16="http://schemas.microsoft.com/office/drawing/2014/main" id="{D9C7537E-64D7-43A8-8157-EC73AF934240}"/>
+                <a16:creationId xmlns:a16="http://schemas.microsoft.com/office/drawing/2014/main" xmlns="" id="{D9C7537E-64D7-43A8-8157-EC73AF934240}"/>
               </a:ext>
             </a:extLst>
           </p:cNvPr>
@@ -7614,7 +7649,7 @@
           <p:cNvPr id="7" name="Titel 1">
             <a:extLst>
               <a:ext uri="{FF2B5EF4-FFF2-40B4-BE49-F238E27FC236}">
-                <a16:creationId xmlns:a16="http://schemas.microsoft.com/office/drawing/2014/main" id="{28F53DE5-130F-457C-98E6-913F8625A286}"/>
+                <a16:creationId xmlns:a16="http://schemas.microsoft.com/office/drawing/2014/main" xmlns="" id="{28F53DE5-130F-457C-98E6-913F8625A286}"/>
               </a:ext>
             </a:extLst>
           </p:cNvPr>
@@ -7673,7 +7708,7 @@
           <p:cNvPr id="8" name="Grafik 7">
             <a:extLst>
               <a:ext uri="{FF2B5EF4-FFF2-40B4-BE49-F238E27FC236}">
-                <a16:creationId xmlns:a16="http://schemas.microsoft.com/office/drawing/2014/main" id="{A27FA97B-067D-4ECA-87C9-032C32C555A9}"/>
+                <a16:creationId xmlns:a16="http://schemas.microsoft.com/office/drawing/2014/main" xmlns="" id="{A27FA97B-067D-4ECA-87C9-032C32C555A9}"/>
               </a:ext>
             </a:extLst>
           </p:cNvPr>
@@ -7703,7 +7738,7 @@
           <p:cNvPr id="9" name="Titel 1">
             <a:extLst>
               <a:ext uri="{FF2B5EF4-FFF2-40B4-BE49-F238E27FC236}">
-                <a16:creationId xmlns:a16="http://schemas.microsoft.com/office/drawing/2014/main" id="{F98DFF16-ED47-410C-9843-929F061E6A8E}"/>
+                <a16:creationId xmlns:a16="http://schemas.microsoft.com/office/drawing/2014/main" xmlns="" id="{F98DFF16-ED47-410C-9843-929F061E6A8E}"/>
               </a:ext>
             </a:extLst>
           </p:cNvPr>
@@ -7970,7 +8005,7 @@
           <p:cNvPr id="2" name="Titel 1">
             <a:extLst>
               <a:ext uri="{FF2B5EF4-FFF2-40B4-BE49-F238E27FC236}">
-                <a16:creationId xmlns:a16="http://schemas.microsoft.com/office/drawing/2014/main" id="{77054662-E199-4C6D-9DD9-F99ADD6B70CB}"/>
+                <a16:creationId xmlns:a16="http://schemas.microsoft.com/office/drawing/2014/main" xmlns="" id="{77054662-E199-4C6D-9DD9-F99ADD6B70CB}"/>
               </a:ext>
             </a:extLst>
           </p:cNvPr>
@@ -8003,7 +8038,7 @@
           <p:cNvPr id="7" name="Grafik 6">
             <a:extLst>
               <a:ext uri="{FF2B5EF4-FFF2-40B4-BE49-F238E27FC236}">
-                <a16:creationId xmlns:a16="http://schemas.microsoft.com/office/drawing/2014/main" id="{7B5E6D19-7F31-41E6-B4C5-CE1265229A06}"/>
+                <a16:creationId xmlns:a16="http://schemas.microsoft.com/office/drawing/2014/main" xmlns="" id="{7B5E6D19-7F31-41E6-B4C5-CE1265229A06}"/>
               </a:ext>
             </a:extLst>
           </p:cNvPr>
@@ -8028,61 +8063,308 @@
           </a:prstGeom>
         </p:spPr>
       </p:pic>
-      <p:sp>
-        <p:nvSpPr>
-          <p:cNvPr id="3" name="Textfeld 2">
-            <a:extLst>
-              <a:ext uri="{FF2B5EF4-FFF2-40B4-BE49-F238E27FC236}">
-                <a16:creationId xmlns:a16="http://schemas.microsoft.com/office/drawing/2014/main" id="{CBBA3FB8-8B2F-448A-BAC9-3B67066E375B}"/>
-              </a:ext>
-            </a:extLst>
-          </p:cNvPr>
-          <p:cNvSpPr txBox="1"/>
-          <p:nvPr/>
-        </p:nvSpPr>
-        <p:spPr>
-          <a:xfrm>
-            <a:off x="5273964" y="3694545"/>
-            <a:ext cx="2719784" cy="369332"/>
-          </a:xfrm>
-          <a:prstGeom prst="rect">
-            <a:avLst/>
-          </a:prstGeom>
-          <a:noFill/>
-        </p:spPr>
-        <p:txBody>
-          <a:bodyPr wrap="none" rtlCol="0">
-            <a:spAutoFit/>
-          </a:bodyPr>
-          <a:lstStyle/>
-          <a:p>
-            <a:r>
-              <a:rPr lang="de-DE" dirty="0" err="1"/>
-              <a:t>tabelle</a:t>
-            </a:r>
-            <a:r>
-              <a:rPr lang="de-DE" dirty="0"/>
-              <a:t> </a:t>
-            </a:r>
-            <a:r>
-              <a:rPr lang="de-DE" dirty="0" err="1"/>
-              <a:t>testabdeckung</a:t>
-            </a:r>
-            <a:r>
-              <a:rPr lang="de-DE" dirty="0"/>
-              <a:t> (</a:t>
-            </a:r>
-            <a:r>
-              <a:rPr lang="de-DE" dirty="0" err="1"/>
-              <a:t>luc</a:t>
-            </a:r>
-            <a:r>
-              <a:rPr lang="de-DE" dirty="0"/>
-              <a:t>)</a:t>
-            </a:r>
-          </a:p>
-        </p:txBody>
-      </p:sp>
+      <p:graphicFrame>
+        <p:nvGraphicFramePr>
+          <p:cNvPr id="5" name="Tabelle 4"/>
+          <p:cNvGraphicFramePr>
+            <a:graphicFrameLocks noGrp="1"/>
+          </p:cNvGraphicFramePr>
+          <p:nvPr>
+            <p:extLst>
+              <p:ext uri="{D42A27DB-BD31-4B8C-83A1-F6EECF244321}">
+                <p14:modId xmlns:p14="http://schemas.microsoft.com/office/powerpoint/2010/main" val="295160271"/>
+              </p:ext>
+            </p:extLst>
+          </p:nvPr>
+        </p:nvGraphicFramePr>
+        <p:xfrm>
+          <a:off x="1872166" y="2168005"/>
+          <a:ext cx="8128000" cy="3053080"/>
+        </p:xfrm>
+        <a:graphic>
+          <a:graphicData uri="http://schemas.openxmlformats.org/drawingml/2006/table">
+            <a:tbl>
+              <a:tblPr firstRow="1" bandRow="1">
+                <a:tableStyleId>{5C22544A-7EE6-4342-B048-85BDC9FD1C3A}</a:tableStyleId>
+              </a:tblPr>
+              <a:tblGrid>
+                <a:gridCol w="4588011"/>
+                <a:gridCol w="3539989"/>
+              </a:tblGrid>
+              <a:tr h="370840">
+                <a:tc>
+                  <a:txBody>
+                    <a:bodyPr/>
+                    <a:lstStyle/>
+                    <a:p>
+                      <a:pPr algn="l"/>
+                      <a:r>
+                        <a:rPr lang="de-DE" sz="2400" dirty="0" smtClean="0"/>
+                        <a:t>Paket</a:t>
+                      </a:r>
+                      <a:endParaRPr lang="de-DE" sz="2400" dirty="0"/>
+                    </a:p>
+                  </a:txBody>
+                  <a:tcPr anchor="ctr"/>
+                </a:tc>
+                <a:tc>
+                  <a:txBody>
+                    <a:bodyPr/>
+                    <a:lstStyle/>
+                    <a:p>
+                      <a:r>
+                        <a:rPr lang="de-DE" sz="2400" dirty="0" smtClean="0"/>
+                        <a:t>Überdeckung (%)</a:t>
+                      </a:r>
+                      <a:endParaRPr lang="de-DE" sz="2400" dirty="0"/>
+                    </a:p>
+                  </a:txBody>
+                  <a:tcPr anchor="ctr"/>
+                </a:tc>
+              </a:tr>
+              <a:tr h="370840">
+                <a:tc>
+                  <a:txBody>
+                    <a:bodyPr/>
+                    <a:lstStyle/>
+                    <a:p>
+                      <a:r>
+                        <a:rPr lang="de-DE" dirty="0" err="1" smtClean="0"/>
+                        <a:t>loop.model.simulationengine</a:t>
+                      </a:r>
+                      <a:endParaRPr lang="de-DE" dirty="0"/>
+                    </a:p>
+                  </a:txBody>
+                  <a:tcPr anchor="ctr"/>
+                </a:tc>
+                <a:tc>
+                  <a:txBody>
+                    <a:bodyPr/>
+                    <a:lstStyle/>
+                    <a:p>
+                      <a:r>
+                        <a:rPr lang="de-DE" dirty="0" smtClean="0"/>
+                        <a:t>96,0</a:t>
+                      </a:r>
+                      <a:endParaRPr lang="de-DE" dirty="0"/>
+                    </a:p>
+                  </a:txBody>
+                  <a:tcPr anchor="ctr"/>
+                </a:tc>
+              </a:tr>
+              <a:tr h="370840">
+                <a:tc>
+                  <a:txBody>
+                    <a:bodyPr/>
+                    <a:lstStyle/>
+                    <a:p>
+                      <a:r>
+                        <a:rPr lang="de-DE" dirty="0" err="1" smtClean="0"/>
+                        <a:t>loop.model.simulationengine.strategies</a:t>
+                      </a:r>
+                      <a:endParaRPr lang="de-DE" dirty="0" smtClean="0"/>
+                    </a:p>
+                  </a:txBody>
+                  <a:tcPr/>
+                </a:tc>
+                <a:tc>
+                  <a:txBody>
+                    <a:bodyPr/>
+                    <a:lstStyle/>
+                    <a:p>
+                      <a:r>
+                        <a:rPr lang="de-DE" dirty="0" smtClean="0"/>
+                        <a:t>97,4</a:t>
+                      </a:r>
+                      <a:endParaRPr lang="de-DE" dirty="0"/>
+                    </a:p>
+                  </a:txBody>
+                  <a:tcPr/>
+                </a:tc>
+              </a:tr>
+              <a:tr h="370840">
+                <a:tc>
+                  <a:txBody>
+                    <a:bodyPr/>
+                    <a:lstStyle/>
+                    <a:p>
+                      <a:pPr marL="0" marR="0" indent="0" algn="l" defTabSz="914400" rtl="0" eaLnBrk="1" fontAlgn="auto" latinLnBrk="0" hangingPunct="1">
+                        <a:lnSpc>
+                          <a:spcPct val="100000"/>
+                        </a:lnSpc>
+                        <a:spcBef>
+                          <a:spcPts val="0"/>
+                        </a:spcBef>
+                        <a:spcAft>
+                          <a:spcPts val="0"/>
+                        </a:spcAft>
+                        <a:buClrTx/>
+                        <a:buSzTx/>
+                        <a:buFontTx/>
+                        <a:buNone/>
+                        <a:tabLst/>
+                        <a:defRPr/>
+                      </a:pPr>
+                      <a:r>
+                        <a:rPr lang="de-DE" dirty="0" err="1" smtClean="0"/>
+                        <a:t>loop.model.simulationengine.distributions</a:t>
+                      </a:r>
+                      <a:endParaRPr lang="de-DE" dirty="0" smtClean="0"/>
+                    </a:p>
+                  </a:txBody>
+                  <a:tcPr/>
+                </a:tc>
+                <a:tc>
+                  <a:txBody>
+                    <a:bodyPr/>
+                    <a:lstStyle/>
+                    <a:p>
+                      <a:r>
+                        <a:rPr lang="de-DE" dirty="0" smtClean="0"/>
+                        <a:t>95,7</a:t>
+                      </a:r>
+                      <a:endParaRPr lang="de-DE" dirty="0"/>
+                    </a:p>
+                  </a:txBody>
+                  <a:tcPr/>
+                </a:tc>
+              </a:tr>
+              <a:tr h="370840">
+                <a:tc>
+                  <a:txBody>
+                    <a:bodyPr/>
+                    <a:lstStyle/>
+                    <a:p>
+                      <a:r>
+                        <a:rPr lang="de-DE" dirty="0" err="1" smtClean="0"/>
+                        <a:t>loop.model.plugin</a:t>
+                      </a:r>
+                      <a:endParaRPr lang="de-DE" dirty="0"/>
+                    </a:p>
+                  </a:txBody>
+                  <a:tcPr/>
+                </a:tc>
+                <a:tc>
+                  <a:txBody>
+                    <a:bodyPr/>
+                    <a:lstStyle/>
+                    <a:p>
+                      <a:r>
+                        <a:rPr lang="de-DE" dirty="0" smtClean="0"/>
+                        <a:t>34,3</a:t>
+                      </a:r>
+                      <a:endParaRPr lang="de-DE" dirty="0"/>
+                    </a:p>
+                  </a:txBody>
+                  <a:tcPr/>
+                </a:tc>
+              </a:tr>
+              <a:tr h="370840">
+                <a:tc>
+                  <a:txBody>
+                    <a:bodyPr/>
+                    <a:lstStyle/>
+                    <a:p>
+                      <a:r>
+                        <a:rPr lang="de-DE" dirty="0" err="1" smtClean="0"/>
+                        <a:t>loop.model.repository</a:t>
+                      </a:r>
+                      <a:endParaRPr lang="de-DE" dirty="0"/>
+                    </a:p>
+                  </a:txBody>
+                  <a:tcPr/>
+                </a:tc>
+                <a:tc>
+                  <a:txBody>
+                    <a:bodyPr/>
+                    <a:lstStyle/>
+                    <a:p>
+                      <a:r>
+                        <a:rPr lang="de-DE" dirty="0" smtClean="0"/>
+                        <a:t>74,6</a:t>
+                      </a:r>
+                      <a:endParaRPr lang="de-DE" dirty="0"/>
+                    </a:p>
+                  </a:txBody>
+                  <a:tcPr/>
+                </a:tc>
+              </a:tr>
+              <a:tr h="370840">
+                <a:tc>
+                  <a:txBody>
+                    <a:bodyPr/>
+                    <a:lstStyle/>
+                    <a:p>
+                      <a:r>
+                        <a:rPr lang="de-DE" smtClean="0"/>
+                        <a:t>sinnvoll</a:t>
+                      </a:r>
+                      <a:r>
+                        <a:rPr lang="de-DE" baseline="0" smtClean="0"/>
+                        <a:t> </a:t>
+                      </a:r>
+                      <a:r>
+                        <a:rPr lang="de-DE" baseline="0" dirty="0" smtClean="0"/>
+                        <a:t>zu testende Pakete aus dem Model</a:t>
+                      </a:r>
+                      <a:endParaRPr lang="de-DE" dirty="0"/>
+                    </a:p>
+                  </a:txBody>
+                  <a:tcPr/>
+                </a:tc>
+                <a:tc>
+                  <a:txBody>
+                    <a:bodyPr/>
+                    <a:lstStyle/>
+                    <a:p>
+                      <a:r>
+                        <a:rPr lang="de-DE" dirty="0" smtClean="0"/>
+                        <a:t>96,7</a:t>
+                      </a:r>
+                      <a:endParaRPr lang="de-DE" dirty="0"/>
+                    </a:p>
+                  </a:txBody>
+                  <a:tcPr/>
+                </a:tc>
+              </a:tr>
+              <a:tr h="370840">
+                <a:tc>
+                  <a:txBody>
+                    <a:bodyPr/>
+                    <a:lstStyle/>
+                    <a:p>
+                      <a:r>
+                        <a:rPr lang="de-DE" dirty="0" smtClean="0"/>
+                        <a:t>alle Pakete</a:t>
+                      </a:r>
+                      <a:r>
+                        <a:rPr lang="de-DE" baseline="0" dirty="0" smtClean="0"/>
+                        <a:t> aus dem Model</a:t>
+                      </a:r>
+                      <a:endParaRPr lang="de-DE" dirty="0"/>
+                    </a:p>
+                  </a:txBody>
+                  <a:tcPr/>
+                </a:tc>
+                <a:tc>
+                  <a:txBody>
+                    <a:bodyPr/>
+                    <a:lstStyle/>
+                    <a:p>
+                      <a:r>
+                        <a:rPr lang="de-DE" dirty="0" smtClean="0"/>
+                        <a:t>86,7</a:t>
+                      </a:r>
+                      <a:endParaRPr lang="de-DE" dirty="0"/>
+                    </a:p>
+                  </a:txBody>
+                  <a:tcPr/>
+                </a:tc>
+              </a:tr>
+            </a:tbl>
+          </a:graphicData>
+        </a:graphic>
+      </p:graphicFrame>
     </p:spTree>
     <p:extLst>
       <p:ext uri="{BB962C8B-B14F-4D97-AF65-F5344CB8AC3E}">
@@ -8093,6 +8375,13 @@
   <p:clrMapOvr>
     <a:masterClrMapping/>
   </p:clrMapOvr>
+  <p:timing>
+    <p:tnLst>
+      <p:par>
+        <p:cTn id="1" dur="indefinite" restart="never" nodeType="tmRoot"/>
+      </p:par>
+    </p:tnLst>
+  </p:timing>
 </p:sld>
 </file>
 
@@ -8118,7 +8407,7 @@
           <p:cNvPr id="2" name="Titel 1">
             <a:extLst>
               <a:ext uri="{FF2B5EF4-FFF2-40B4-BE49-F238E27FC236}">
-                <a16:creationId xmlns:a16="http://schemas.microsoft.com/office/drawing/2014/main" id="{77054662-E199-4C6D-9DD9-F99ADD6B70CB}"/>
+                <a16:creationId xmlns:a16="http://schemas.microsoft.com/office/drawing/2014/main" xmlns="" id="{77054662-E199-4C6D-9DD9-F99ADD6B70CB}"/>
               </a:ext>
             </a:extLst>
           </p:cNvPr>
@@ -8151,7 +8440,7 @@
           <p:cNvPr id="5" name="Grafik 4">
             <a:extLst>
               <a:ext uri="{FF2B5EF4-FFF2-40B4-BE49-F238E27FC236}">
-                <a16:creationId xmlns:a16="http://schemas.microsoft.com/office/drawing/2014/main" id="{C187BA4A-6C36-4ACB-B033-CA98382373C3}"/>
+                <a16:creationId xmlns:a16="http://schemas.microsoft.com/office/drawing/2014/main" xmlns="" id="{C187BA4A-6C36-4ACB-B033-CA98382373C3}"/>
               </a:ext>
             </a:extLst>
           </p:cNvPr>
@@ -8181,7 +8470,7 @@
           <p:cNvPr id="4" name="Grafik 3">
             <a:extLst>
               <a:ext uri="{FF2B5EF4-FFF2-40B4-BE49-F238E27FC236}">
-                <a16:creationId xmlns:a16="http://schemas.microsoft.com/office/drawing/2014/main" id="{6320A846-85B1-41B0-96C6-C56AF057F189}"/>
+                <a16:creationId xmlns:a16="http://schemas.microsoft.com/office/drawing/2014/main" xmlns="" id="{6320A846-85B1-41B0-96C6-C56AF057F189}"/>
               </a:ext>
             </a:extLst>
           </p:cNvPr>
@@ -8221,7 +8510,7 @@
           <p:cNvPr id="7" name="Rechteck 6">
             <a:extLst>
               <a:ext uri="{FF2B5EF4-FFF2-40B4-BE49-F238E27FC236}">
-                <a16:creationId xmlns:a16="http://schemas.microsoft.com/office/drawing/2014/main" id="{F96427ED-6524-473D-8E20-B2DA03F37926}"/>
+                <a16:creationId xmlns:a16="http://schemas.microsoft.com/office/drawing/2014/main" xmlns="" id="{F96427ED-6524-473D-8E20-B2DA03F37926}"/>
               </a:ext>
             </a:extLst>
           </p:cNvPr>
@@ -8378,7 +8667,7 @@
           <p:cNvPr id="2" name="Titel 1">
             <a:extLst>
               <a:ext uri="{FF2B5EF4-FFF2-40B4-BE49-F238E27FC236}">
-                <a16:creationId xmlns:a16="http://schemas.microsoft.com/office/drawing/2014/main" id="{77054662-E199-4C6D-9DD9-F99ADD6B70CB}"/>
+                <a16:creationId xmlns:a16="http://schemas.microsoft.com/office/drawing/2014/main" xmlns="" id="{77054662-E199-4C6D-9DD9-F99ADD6B70CB}"/>
               </a:ext>
             </a:extLst>
           </p:cNvPr>
@@ -8411,7 +8700,7 @@
           <p:cNvPr id="5" name="Grafik 4">
             <a:extLst>
               <a:ext uri="{FF2B5EF4-FFF2-40B4-BE49-F238E27FC236}">
-                <a16:creationId xmlns:a16="http://schemas.microsoft.com/office/drawing/2014/main" id="{C187BA4A-6C36-4ACB-B033-CA98382373C3}"/>
+                <a16:creationId xmlns:a16="http://schemas.microsoft.com/office/drawing/2014/main" xmlns="" id="{C187BA4A-6C36-4ACB-B033-CA98382373C3}"/>
               </a:ext>
             </a:extLst>
           </p:cNvPr>
@@ -8441,7 +8730,7 @@
           <p:cNvPr id="11" name="Grafik 10">
             <a:extLst>
               <a:ext uri="{FF2B5EF4-FFF2-40B4-BE49-F238E27FC236}">
-                <a16:creationId xmlns:a16="http://schemas.microsoft.com/office/drawing/2014/main" id="{2D2C24F1-0807-4A44-A896-6D579E58C8D2}"/>
+                <a16:creationId xmlns:a16="http://schemas.microsoft.com/office/drawing/2014/main" xmlns="" id="{2D2C24F1-0807-4A44-A896-6D579E58C8D2}"/>
               </a:ext>
             </a:extLst>
           </p:cNvPr>
@@ -8482,6 +8771,13 @@
   <p:clrMapOvr>
     <a:masterClrMapping/>
   </p:clrMapOvr>
+  <p:timing>
+    <p:tnLst>
+      <p:par>
+        <p:cTn id="1" dur="indefinite" restart="never" nodeType="tmRoot"/>
+      </p:par>
+    </p:tnLst>
+  </p:timing>
 </p:sld>
 </file>
 
@@ -8507,7 +8803,7 @@
           <p:cNvPr id="2" name="Titel 1">
             <a:extLst>
               <a:ext uri="{FF2B5EF4-FFF2-40B4-BE49-F238E27FC236}">
-                <a16:creationId xmlns:a16="http://schemas.microsoft.com/office/drawing/2014/main" id="{77054662-E199-4C6D-9DD9-F99ADD6B70CB}"/>
+                <a16:creationId xmlns:a16="http://schemas.microsoft.com/office/drawing/2014/main" xmlns="" id="{77054662-E199-4C6D-9DD9-F99ADD6B70CB}"/>
               </a:ext>
             </a:extLst>
           </p:cNvPr>
@@ -8540,7 +8836,7 @@
           <p:cNvPr id="5" name="Grafik 4">
             <a:extLst>
               <a:ext uri="{FF2B5EF4-FFF2-40B4-BE49-F238E27FC236}">
-                <a16:creationId xmlns:a16="http://schemas.microsoft.com/office/drawing/2014/main" id="{C187BA4A-6C36-4ACB-B033-CA98382373C3}"/>
+                <a16:creationId xmlns:a16="http://schemas.microsoft.com/office/drawing/2014/main" xmlns="" id="{C187BA4A-6C36-4ACB-B033-CA98382373C3}"/>
               </a:ext>
             </a:extLst>
           </p:cNvPr>
@@ -8570,7 +8866,7 @@
           <p:cNvPr id="9" name="Grafik 8">
             <a:extLst>
               <a:ext uri="{FF2B5EF4-FFF2-40B4-BE49-F238E27FC236}">
-                <a16:creationId xmlns:a16="http://schemas.microsoft.com/office/drawing/2014/main" id="{CE0D307F-3F68-467A-BEF0-7E4C5AA5056F}"/>
+                <a16:creationId xmlns:a16="http://schemas.microsoft.com/office/drawing/2014/main" xmlns="" id="{CE0D307F-3F68-467A-BEF0-7E4C5AA5056F}"/>
               </a:ext>
             </a:extLst>
           </p:cNvPr>
@@ -8606,7 +8902,7 @@
           <p:cNvPr id="4" name="Pfeil: nach rechts 3">
             <a:extLst>
               <a:ext uri="{FF2B5EF4-FFF2-40B4-BE49-F238E27FC236}">
-                <a16:creationId xmlns:a16="http://schemas.microsoft.com/office/drawing/2014/main" id="{B149E191-5D63-4A59-8508-354EAC11FC71}"/>
+                <a16:creationId xmlns:a16="http://schemas.microsoft.com/office/drawing/2014/main" xmlns="" id="{B149E191-5D63-4A59-8508-354EAC11FC71}"/>
               </a:ext>
             </a:extLst>
           </p:cNvPr>
@@ -8663,7 +8959,7 @@
           <p:cNvPr id="7" name="Grafik 6">
             <a:extLst>
               <a:ext uri="{FF2B5EF4-FFF2-40B4-BE49-F238E27FC236}">
-                <a16:creationId xmlns:a16="http://schemas.microsoft.com/office/drawing/2014/main" id="{A99A5AE1-30AA-4587-9F1F-C91BAAE54BAC}"/>
+                <a16:creationId xmlns:a16="http://schemas.microsoft.com/office/drawing/2014/main" xmlns="" id="{A99A5AE1-30AA-4587-9F1F-C91BAAE54BAC}"/>
               </a:ext>
             </a:extLst>
           </p:cNvPr>
@@ -8807,7 +9103,7 @@
           <p:cNvPr id="2" name="Titel 1">
             <a:extLst>
               <a:ext uri="{FF2B5EF4-FFF2-40B4-BE49-F238E27FC236}">
-                <a16:creationId xmlns:a16="http://schemas.microsoft.com/office/drawing/2014/main" id="{77054662-E199-4C6D-9DD9-F99ADD6B70CB}"/>
+                <a16:creationId xmlns:a16="http://schemas.microsoft.com/office/drawing/2014/main" xmlns="" id="{77054662-E199-4C6D-9DD9-F99ADD6B70CB}"/>
               </a:ext>
             </a:extLst>
           </p:cNvPr>
@@ -8840,7 +9136,7 @@
           <p:cNvPr id="4" name="Grafik 3">
             <a:extLst>
               <a:ext uri="{FF2B5EF4-FFF2-40B4-BE49-F238E27FC236}">
-                <a16:creationId xmlns:a16="http://schemas.microsoft.com/office/drawing/2014/main" id="{2ABF8F8C-E80E-4DE7-AFBD-AC867B5E9134}"/>
+                <a16:creationId xmlns:a16="http://schemas.microsoft.com/office/drawing/2014/main" xmlns="" id="{2ABF8F8C-E80E-4DE7-AFBD-AC867B5E9134}"/>
               </a:ext>
             </a:extLst>
           </p:cNvPr>
@@ -8870,7 +9166,7 @@
           <p:cNvPr id="5" name="Textfeld 4">
             <a:extLst>
               <a:ext uri="{FF2B5EF4-FFF2-40B4-BE49-F238E27FC236}">
-                <a16:creationId xmlns:a16="http://schemas.microsoft.com/office/drawing/2014/main" id="{38DDDC9A-26AF-4597-AB91-FD4794DCA7FA}"/>
+                <a16:creationId xmlns:a16="http://schemas.microsoft.com/office/drawing/2014/main" xmlns="" id="{38DDDC9A-26AF-4597-AB91-FD4794DCA7FA}"/>
               </a:ext>
             </a:extLst>
           </p:cNvPr>
@@ -8930,6 +9226,13 @@
   <p:clrMapOvr>
     <a:masterClrMapping/>
   </p:clrMapOvr>
+  <p:timing>
+    <p:tnLst>
+      <p:par>
+        <p:cTn id="1" dur="indefinite" restart="never" nodeType="tmRoot"/>
+      </p:par>
+    </p:tnLst>
+  </p:timing>
 </p:sld>
 </file>
 
@@ -8955,7 +9258,7 @@
           <p:cNvPr id="2" name="Titel 1">
             <a:extLst>
               <a:ext uri="{FF2B5EF4-FFF2-40B4-BE49-F238E27FC236}">
-                <a16:creationId xmlns:a16="http://schemas.microsoft.com/office/drawing/2014/main" id="{77054662-E199-4C6D-9DD9-F99ADD6B70CB}"/>
+                <a16:creationId xmlns:a16="http://schemas.microsoft.com/office/drawing/2014/main" xmlns="" id="{77054662-E199-4C6D-9DD9-F99ADD6B70CB}"/>
               </a:ext>
             </a:extLst>
           </p:cNvPr>
@@ -8988,7 +9291,7 @@
           <p:cNvPr id="4" name="Grafik 3">
             <a:extLst>
               <a:ext uri="{FF2B5EF4-FFF2-40B4-BE49-F238E27FC236}">
-                <a16:creationId xmlns:a16="http://schemas.microsoft.com/office/drawing/2014/main" id="{2ABF8F8C-E80E-4DE7-AFBD-AC867B5E9134}"/>
+                <a16:creationId xmlns:a16="http://schemas.microsoft.com/office/drawing/2014/main" xmlns="" id="{2ABF8F8C-E80E-4DE7-AFBD-AC867B5E9134}"/>
               </a:ext>
             </a:extLst>
           </p:cNvPr>
@@ -9018,7 +9321,7 @@
           <p:cNvPr id="3" name="Grafik 2">
             <a:extLst>
               <a:ext uri="{FF2B5EF4-FFF2-40B4-BE49-F238E27FC236}">
-                <a16:creationId xmlns:a16="http://schemas.microsoft.com/office/drawing/2014/main" id="{5037875D-223D-4E6A-B507-1684835F0906}"/>
+                <a16:creationId xmlns:a16="http://schemas.microsoft.com/office/drawing/2014/main" xmlns="" id="{5037875D-223D-4E6A-B507-1684835F0906}"/>
               </a:ext>
             </a:extLst>
           </p:cNvPr>
@@ -9058,6 +9361,13 @@
   <p:clrMapOvr>
     <a:masterClrMapping/>
   </p:clrMapOvr>
+  <p:timing>
+    <p:tnLst>
+      <p:par>
+        <p:cTn id="1" dur="indefinite" restart="never" nodeType="tmRoot"/>
+      </p:par>
+    </p:tnLst>
+  </p:timing>
 </p:sld>
 </file>
 
@@ -9083,7 +9393,7 @@
           <p:cNvPr id="2" name="Titel 1">
             <a:extLst>
               <a:ext uri="{FF2B5EF4-FFF2-40B4-BE49-F238E27FC236}">
-                <a16:creationId xmlns:a16="http://schemas.microsoft.com/office/drawing/2014/main" id="{77054662-E199-4C6D-9DD9-F99ADD6B70CB}"/>
+                <a16:creationId xmlns:a16="http://schemas.microsoft.com/office/drawing/2014/main" xmlns="" id="{77054662-E199-4C6D-9DD9-F99ADD6B70CB}"/>
               </a:ext>
             </a:extLst>
           </p:cNvPr>
@@ -9116,7 +9426,7 @@
           <p:cNvPr id="4" name="Grafik 3">
             <a:extLst>
               <a:ext uri="{FF2B5EF4-FFF2-40B4-BE49-F238E27FC236}">
-                <a16:creationId xmlns:a16="http://schemas.microsoft.com/office/drawing/2014/main" id="{2ABF8F8C-E80E-4DE7-AFBD-AC867B5E9134}"/>
+                <a16:creationId xmlns:a16="http://schemas.microsoft.com/office/drawing/2014/main" xmlns="" id="{2ABF8F8C-E80E-4DE7-AFBD-AC867B5E9134}"/>
               </a:ext>
             </a:extLst>
           </p:cNvPr>
@@ -9146,7 +9456,7 @@
           <p:cNvPr id="5" name="Textfeld 4">
             <a:extLst>
               <a:ext uri="{FF2B5EF4-FFF2-40B4-BE49-F238E27FC236}">
-                <a16:creationId xmlns:a16="http://schemas.microsoft.com/office/drawing/2014/main" id="{7903ABD0-89CF-40E9-8392-5F4320D3B433}"/>
+                <a16:creationId xmlns:a16="http://schemas.microsoft.com/office/drawing/2014/main" xmlns="" id="{7903ABD0-89CF-40E9-8392-5F4320D3B433}"/>
               </a:ext>
             </a:extLst>
           </p:cNvPr>
@@ -9214,6 +9524,13 @@
   <p:clrMapOvr>
     <a:masterClrMapping/>
   </p:clrMapOvr>
+  <p:timing>
+    <p:tnLst>
+      <p:par>
+        <p:cTn id="1" dur="indefinite" restart="never" nodeType="tmRoot"/>
+      </p:par>
+    </p:tnLst>
+  </p:timing>
 </p:sld>
 </file>
 

</xml_diff>

<commit_message>
Kleine Änderung in der PowerPoint
</commit_message>
<xml_diff>
--- a/Dokumente/Qualitätssicherung/Präsentation.pptx
+++ b/Dokumente/Qualitätssicherung/Präsentation.pptx
@@ -147,7 +147,7 @@
           <p:cNvPr id="2" name="Titel 1">
             <a:extLst>
               <a:ext uri="{FF2B5EF4-FFF2-40B4-BE49-F238E27FC236}">
-                <a16:creationId xmlns:a16="http://schemas.microsoft.com/office/drawing/2014/main" xmlns="" id="{F46E85E9-EF07-4635-9681-A5B127DB4D73}"/>
+                <a16:creationId xmlns="" xmlns:a16="http://schemas.microsoft.com/office/drawing/2014/main" id="{F46E85E9-EF07-4635-9681-A5B127DB4D73}"/>
               </a:ext>
             </a:extLst>
           </p:cNvPr>
@@ -185,7 +185,7 @@
           <p:cNvPr id="3" name="Untertitel 2">
             <a:extLst>
               <a:ext uri="{FF2B5EF4-FFF2-40B4-BE49-F238E27FC236}">
-                <a16:creationId xmlns:a16="http://schemas.microsoft.com/office/drawing/2014/main" xmlns="" id="{9E28B89C-A2D1-4D78-9706-A1AB65A1AF20}"/>
+                <a16:creationId xmlns="" xmlns:a16="http://schemas.microsoft.com/office/drawing/2014/main" id="{9E28B89C-A2D1-4D78-9706-A1AB65A1AF20}"/>
               </a:ext>
             </a:extLst>
           </p:cNvPr>
@@ -256,7 +256,7 @@
           <p:cNvPr id="4" name="Datumsplatzhalter 3">
             <a:extLst>
               <a:ext uri="{FF2B5EF4-FFF2-40B4-BE49-F238E27FC236}">
-                <a16:creationId xmlns:a16="http://schemas.microsoft.com/office/drawing/2014/main" xmlns="" id="{D0D44B21-C470-48F4-98FA-209BA90218A9}"/>
+                <a16:creationId xmlns="" xmlns:a16="http://schemas.microsoft.com/office/drawing/2014/main" id="{D0D44B21-C470-48F4-98FA-209BA90218A9}"/>
               </a:ext>
             </a:extLst>
           </p:cNvPr>
@@ -285,7 +285,7 @@
           <p:cNvPr id="5" name="Fußzeilenplatzhalter 4">
             <a:extLst>
               <a:ext uri="{FF2B5EF4-FFF2-40B4-BE49-F238E27FC236}">
-                <a16:creationId xmlns:a16="http://schemas.microsoft.com/office/drawing/2014/main" xmlns="" id="{55CF6F98-68E1-4363-9B24-DC0D5C72847F}"/>
+                <a16:creationId xmlns="" xmlns:a16="http://schemas.microsoft.com/office/drawing/2014/main" id="{55CF6F98-68E1-4363-9B24-DC0D5C72847F}"/>
               </a:ext>
             </a:extLst>
           </p:cNvPr>
@@ -310,7 +310,7 @@
           <p:cNvPr id="6" name="Foliennummernplatzhalter 5">
             <a:extLst>
               <a:ext uri="{FF2B5EF4-FFF2-40B4-BE49-F238E27FC236}">
-                <a16:creationId xmlns:a16="http://schemas.microsoft.com/office/drawing/2014/main" xmlns="" id="{A03293D5-8E8E-499D-9962-51DD827D138F}"/>
+                <a16:creationId xmlns="" xmlns:a16="http://schemas.microsoft.com/office/drawing/2014/main" id="{A03293D5-8E8E-499D-9962-51DD827D138F}"/>
               </a:ext>
             </a:extLst>
           </p:cNvPr>
@@ -369,7 +369,7 @@
           <p:cNvPr id="2" name="Titel 1">
             <a:extLst>
               <a:ext uri="{FF2B5EF4-FFF2-40B4-BE49-F238E27FC236}">
-                <a16:creationId xmlns:a16="http://schemas.microsoft.com/office/drawing/2014/main" xmlns="" id="{10E81F66-7B53-4398-9D74-0508C34D003B}"/>
+                <a16:creationId xmlns="" xmlns:a16="http://schemas.microsoft.com/office/drawing/2014/main" id="{10E81F66-7B53-4398-9D74-0508C34D003B}"/>
               </a:ext>
             </a:extLst>
           </p:cNvPr>
@@ -398,7 +398,7 @@
           <p:cNvPr id="3" name="Vertikaler Textplatzhalter 2">
             <a:extLst>
               <a:ext uri="{FF2B5EF4-FFF2-40B4-BE49-F238E27FC236}">
-                <a16:creationId xmlns:a16="http://schemas.microsoft.com/office/drawing/2014/main" xmlns="" id="{C22D5661-8400-47C4-ADE2-7E209A248419}"/>
+                <a16:creationId xmlns="" xmlns:a16="http://schemas.microsoft.com/office/drawing/2014/main" id="{C22D5661-8400-47C4-ADE2-7E209A248419}"/>
               </a:ext>
             </a:extLst>
           </p:cNvPr>
@@ -456,7 +456,7 @@
           <p:cNvPr id="4" name="Datumsplatzhalter 3">
             <a:extLst>
               <a:ext uri="{FF2B5EF4-FFF2-40B4-BE49-F238E27FC236}">
-                <a16:creationId xmlns:a16="http://schemas.microsoft.com/office/drawing/2014/main" xmlns="" id="{07F4DCCD-42FB-4380-A06C-DE13C09BD74B}"/>
+                <a16:creationId xmlns="" xmlns:a16="http://schemas.microsoft.com/office/drawing/2014/main" id="{07F4DCCD-42FB-4380-A06C-DE13C09BD74B}"/>
               </a:ext>
             </a:extLst>
           </p:cNvPr>
@@ -485,7 +485,7 @@
           <p:cNvPr id="5" name="Fußzeilenplatzhalter 4">
             <a:extLst>
               <a:ext uri="{FF2B5EF4-FFF2-40B4-BE49-F238E27FC236}">
-                <a16:creationId xmlns:a16="http://schemas.microsoft.com/office/drawing/2014/main" xmlns="" id="{089A97AE-6258-46CB-BB74-776E7763E34B}"/>
+                <a16:creationId xmlns="" xmlns:a16="http://schemas.microsoft.com/office/drawing/2014/main" id="{089A97AE-6258-46CB-BB74-776E7763E34B}"/>
               </a:ext>
             </a:extLst>
           </p:cNvPr>
@@ -510,7 +510,7 @@
           <p:cNvPr id="6" name="Foliennummernplatzhalter 5">
             <a:extLst>
               <a:ext uri="{FF2B5EF4-FFF2-40B4-BE49-F238E27FC236}">
-                <a16:creationId xmlns:a16="http://schemas.microsoft.com/office/drawing/2014/main" xmlns="" id="{C32B7039-4D09-4954-80A9-570EAA41E85C}"/>
+                <a16:creationId xmlns="" xmlns:a16="http://schemas.microsoft.com/office/drawing/2014/main" id="{C32B7039-4D09-4954-80A9-570EAA41E85C}"/>
               </a:ext>
             </a:extLst>
           </p:cNvPr>
@@ -569,7 +569,7 @@
           <p:cNvPr id="2" name="Vertikaler Titel 1">
             <a:extLst>
               <a:ext uri="{FF2B5EF4-FFF2-40B4-BE49-F238E27FC236}">
-                <a16:creationId xmlns:a16="http://schemas.microsoft.com/office/drawing/2014/main" xmlns="" id="{96C9868A-6D96-447D-B514-294EDC02315E}"/>
+                <a16:creationId xmlns="" xmlns:a16="http://schemas.microsoft.com/office/drawing/2014/main" id="{96C9868A-6D96-447D-B514-294EDC02315E}"/>
               </a:ext>
             </a:extLst>
           </p:cNvPr>
@@ -603,7 +603,7 @@
           <p:cNvPr id="3" name="Vertikaler Textplatzhalter 2">
             <a:extLst>
               <a:ext uri="{FF2B5EF4-FFF2-40B4-BE49-F238E27FC236}">
-                <a16:creationId xmlns:a16="http://schemas.microsoft.com/office/drawing/2014/main" xmlns="" id="{F2AADB6C-9E4A-4380-8C4B-15C50EB83BEC}"/>
+                <a16:creationId xmlns="" xmlns:a16="http://schemas.microsoft.com/office/drawing/2014/main" id="{F2AADB6C-9E4A-4380-8C4B-15C50EB83BEC}"/>
               </a:ext>
             </a:extLst>
           </p:cNvPr>
@@ -666,7 +666,7 @@
           <p:cNvPr id="4" name="Datumsplatzhalter 3">
             <a:extLst>
               <a:ext uri="{FF2B5EF4-FFF2-40B4-BE49-F238E27FC236}">
-                <a16:creationId xmlns:a16="http://schemas.microsoft.com/office/drawing/2014/main" xmlns="" id="{225817EA-7BEB-4E38-8282-32A9328D01A6}"/>
+                <a16:creationId xmlns="" xmlns:a16="http://schemas.microsoft.com/office/drawing/2014/main" id="{225817EA-7BEB-4E38-8282-32A9328D01A6}"/>
               </a:ext>
             </a:extLst>
           </p:cNvPr>
@@ -695,7 +695,7 @@
           <p:cNvPr id="5" name="Fußzeilenplatzhalter 4">
             <a:extLst>
               <a:ext uri="{FF2B5EF4-FFF2-40B4-BE49-F238E27FC236}">
-                <a16:creationId xmlns:a16="http://schemas.microsoft.com/office/drawing/2014/main" xmlns="" id="{C39FD084-0A7B-479D-9670-1A0AF68E21F9}"/>
+                <a16:creationId xmlns="" xmlns:a16="http://schemas.microsoft.com/office/drawing/2014/main" id="{C39FD084-0A7B-479D-9670-1A0AF68E21F9}"/>
               </a:ext>
             </a:extLst>
           </p:cNvPr>
@@ -720,7 +720,7 @@
           <p:cNvPr id="6" name="Foliennummernplatzhalter 5">
             <a:extLst>
               <a:ext uri="{FF2B5EF4-FFF2-40B4-BE49-F238E27FC236}">
-                <a16:creationId xmlns:a16="http://schemas.microsoft.com/office/drawing/2014/main" xmlns="" id="{96761BD4-AD0E-427C-B3C7-FF6C8EF88839}"/>
+                <a16:creationId xmlns="" xmlns:a16="http://schemas.microsoft.com/office/drawing/2014/main" id="{96761BD4-AD0E-427C-B3C7-FF6C8EF88839}"/>
               </a:ext>
             </a:extLst>
           </p:cNvPr>
@@ -779,7 +779,7 @@
           <p:cNvPr id="2" name="Titel 1">
             <a:extLst>
               <a:ext uri="{FF2B5EF4-FFF2-40B4-BE49-F238E27FC236}">
-                <a16:creationId xmlns:a16="http://schemas.microsoft.com/office/drawing/2014/main" xmlns="" id="{73BE75A9-35DE-49BC-B3BA-4037CD89E35B}"/>
+                <a16:creationId xmlns="" xmlns:a16="http://schemas.microsoft.com/office/drawing/2014/main" id="{73BE75A9-35DE-49BC-B3BA-4037CD89E35B}"/>
               </a:ext>
             </a:extLst>
           </p:cNvPr>
@@ -808,7 +808,7 @@
           <p:cNvPr id="3" name="Inhaltsplatzhalter 2">
             <a:extLst>
               <a:ext uri="{FF2B5EF4-FFF2-40B4-BE49-F238E27FC236}">
-                <a16:creationId xmlns:a16="http://schemas.microsoft.com/office/drawing/2014/main" xmlns="" id="{1871BC89-C33C-466F-BAC8-DFD1EAC65E66}"/>
+                <a16:creationId xmlns="" xmlns:a16="http://schemas.microsoft.com/office/drawing/2014/main" id="{1871BC89-C33C-466F-BAC8-DFD1EAC65E66}"/>
               </a:ext>
             </a:extLst>
           </p:cNvPr>
@@ -866,7 +866,7 @@
           <p:cNvPr id="4" name="Datumsplatzhalter 3">
             <a:extLst>
               <a:ext uri="{FF2B5EF4-FFF2-40B4-BE49-F238E27FC236}">
-                <a16:creationId xmlns:a16="http://schemas.microsoft.com/office/drawing/2014/main" xmlns="" id="{DE2C0D84-A289-45FB-8A2B-40FDBC2CD905}"/>
+                <a16:creationId xmlns="" xmlns:a16="http://schemas.microsoft.com/office/drawing/2014/main" id="{DE2C0D84-A289-45FB-8A2B-40FDBC2CD905}"/>
               </a:ext>
             </a:extLst>
           </p:cNvPr>
@@ -895,7 +895,7 @@
           <p:cNvPr id="5" name="Fußzeilenplatzhalter 4">
             <a:extLst>
               <a:ext uri="{FF2B5EF4-FFF2-40B4-BE49-F238E27FC236}">
-                <a16:creationId xmlns:a16="http://schemas.microsoft.com/office/drawing/2014/main" xmlns="" id="{BF26B90F-836D-4CE7-B1D3-6F52FEA5392A}"/>
+                <a16:creationId xmlns="" xmlns:a16="http://schemas.microsoft.com/office/drawing/2014/main" id="{BF26B90F-836D-4CE7-B1D3-6F52FEA5392A}"/>
               </a:ext>
             </a:extLst>
           </p:cNvPr>
@@ -920,7 +920,7 @@
           <p:cNvPr id="6" name="Foliennummernplatzhalter 5">
             <a:extLst>
               <a:ext uri="{FF2B5EF4-FFF2-40B4-BE49-F238E27FC236}">
-                <a16:creationId xmlns:a16="http://schemas.microsoft.com/office/drawing/2014/main" xmlns="" id="{4A2EEE48-D597-431A-8857-5FEBC6744564}"/>
+                <a16:creationId xmlns="" xmlns:a16="http://schemas.microsoft.com/office/drawing/2014/main" id="{4A2EEE48-D597-431A-8857-5FEBC6744564}"/>
               </a:ext>
             </a:extLst>
           </p:cNvPr>
@@ -979,7 +979,7 @@
           <p:cNvPr id="2" name="Titel 1">
             <a:extLst>
               <a:ext uri="{FF2B5EF4-FFF2-40B4-BE49-F238E27FC236}">
-                <a16:creationId xmlns:a16="http://schemas.microsoft.com/office/drawing/2014/main" xmlns="" id="{690E032A-DDF2-4FA1-8F7B-7E37DE99765C}"/>
+                <a16:creationId xmlns="" xmlns:a16="http://schemas.microsoft.com/office/drawing/2014/main" id="{690E032A-DDF2-4FA1-8F7B-7E37DE99765C}"/>
               </a:ext>
             </a:extLst>
           </p:cNvPr>
@@ -1017,7 +1017,7 @@
           <p:cNvPr id="3" name="Textplatzhalter 2">
             <a:extLst>
               <a:ext uri="{FF2B5EF4-FFF2-40B4-BE49-F238E27FC236}">
-                <a16:creationId xmlns:a16="http://schemas.microsoft.com/office/drawing/2014/main" xmlns="" id="{ED6E872C-0B3D-47D6-A955-0FE51019E65D}"/>
+                <a16:creationId xmlns="" xmlns:a16="http://schemas.microsoft.com/office/drawing/2014/main" id="{ED6E872C-0B3D-47D6-A955-0FE51019E65D}"/>
               </a:ext>
             </a:extLst>
           </p:cNvPr>
@@ -1142,7 +1142,7 @@
           <p:cNvPr id="4" name="Datumsplatzhalter 3">
             <a:extLst>
               <a:ext uri="{FF2B5EF4-FFF2-40B4-BE49-F238E27FC236}">
-                <a16:creationId xmlns:a16="http://schemas.microsoft.com/office/drawing/2014/main" xmlns="" id="{20F44373-ECFA-4E13-8696-B335F190B236}"/>
+                <a16:creationId xmlns="" xmlns:a16="http://schemas.microsoft.com/office/drawing/2014/main" id="{20F44373-ECFA-4E13-8696-B335F190B236}"/>
               </a:ext>
             </a:extLst>
           </p:cNvPr>
@@ -1171,7 +1171,7 @@
           <p:cNvPr id="5" name="Fußzeilenplatzhalter 4">
             <a:extLst>
               <a:ext uri="{FF2B5EF4-FFF2-40B4-BE49-F238E27FC236}">
-                <a16:creationId xmlns:a16="http://schemas.microsoft.com/office/drawing/2014/main" xmlns="" id="{A76F9FEE-769B-4C95-B865-10C35CACC0E9}"/>
+                <a16:creationId xmlns="" xmlns:a16="http://schemas.microsoft.com/office/drawing/2014/main" id="{A76F9FEE-769B-4C95-B865-10C35CACC0E9}"/>
               </a:ext>
             </a:extLst>
           </p:cNvPr>
@@ -1196,7 +1196,7 @@
           <p:cNvPr id="6" name="Foliennummernplatzhalter 5">
             <a:extLst>
               <a:ext uri="{FF2B5EF4-FFF2-40B4-BE49-F238E27FC236}">
-                <a16:creationId xmlns:a16="http://schemas.microsoft.com/office/drawing/2014/main" xmlns="" id="{A6DD3A67-8368-46A2-A026-D825BC046771}"/>
+                <a16:creationId xmlns="" xmlns:a16="http://schemas.microsoft.com/office/drawing/2014/main" id="{A6DD3A67-8368-46A2-A026-D825BC046771}"/>
               </a:ext>
             </a:extLst>
           </p:cNvPr>
@@ -1255,7 +1255,7 @@
           <p:cNvPr id="2" name="Titel 1">
             <a:extLst>
               <a:ext uri="{FF2B5EF4-FFF2-40B4-BE49-F238E27FC236}">
-                <a16:creationId xmlns:a16="http://schemas.microsoft.com/office/drawing/2014/main" xmlns="" id="{D0C41E86-5BAE-4495-98DA-4AC02F0E3A70}"/>
+                <a16:creationId xmlns="" xmlns:a16="http://schemas.microsoft.com/office/drawing/2014/main" id="{D0C41E86-5BAE-4495-98DA-4AC02F0E3A70}"/>
               </a:ext>
             </a:extLst>
           </p:cNvPr>
@@ -1284,7 +1284,7 @@
           <p:cNvPr id="3" name="Inhaltsplatzhalter 2">
             <a:extLst>
               <a:ext uri="{FF2B5EF4-FFF2-40B4-BE49-F238E27FC236}">
-                <a16:creationId xmlns:a16="http://schemas.microsoft.com/office/drawing/2014/main" xmlns="" id="{5E34415D-E3A3-413E-9499-EBB0321D7BAF}"/>
+                <a16:creationId xmlns="" xmlns:a16="http://schemas.microsoft.com/office/drawing/2014/main" id="{5E34415D-E3A3-413E-9499-EBB0321D7BAF}"/>
               </a:ext>
             </a:extLst>
           </p:cNvPr>
@@ -1347,7 +1347,7 @@
           <p:cNvPr id="4" name="Inhaltsplatzhalter 3">
             <a:extLst>
               <a:ext uri="{FF2B5EF4-FFF2-40B4-BE49-F238E27FC236}">
-                <a16:creationId xmlns:a16="http://schemas.microsoft.com/office/drawing/2014/main" xmlns="" id="{1058E87F-C6E1-4392-B707-510B12C90AF5}"/>
+                <a16:creationId xmlns="" xmlns:a16="http://schemas.microsoft.com/office/drawing/2014/main" id="{1058E87F-C6E1-4392-B707-510B12C90AF5}"/>
               </a:ext>
             </a:extLst>
           </p:cNvPr>
@@ -1410,7 +1410,7 @@
           <p:cNvPr id="5" name="Datumsplatzhalter 4">
             <a:extLst>
               <a:ext uri="{FF2B5EF4-FFF2-40B4-BE49-F238E27FC236}">
-                <a16:creationId xmlns:a16="http://schemas.microsoft.com/office/drawing/2014/main" xmlns="" id="{BE7EE012-9F3B-4363-B94F-2E672ED854E0}"/>
+                <a16:creationId xmlns="" xmlns:a16="http://schemas.microsoft.com/office/drawing/2014/main" id="{BE7EE012-9F3B-4363-B94F-2E672ED854E0}"/>
               </a:ext>
             </a:extLst>
           </p:cNvPr>
@@ -1439,7 +1439,7 @@
           <p:cNvPr id="6" name="Fußzeilenplatzhalter 5">
             <a:extLst>
               <a:ext uri="{FF2B5EF4-FFF2-40B4-BE49-F238E27FC236}">
-                <a16:creationId xmlns:a16="http://schemas.microsoft.com/office/drawing/2014/main" xmlns="" id="{66072169-2BBC-4E88-831F-F25664F2BBDD}"/>
+                <a16:creationId xmlns="" xmlns:a16="http://schemas.microsoft.com/office/drawing/2014/main" id="{66072169-2BBC-4E88-831F-F25664F2BBDD}"/>
               </a:ext>
             </a:extLst>
           </p:cNvPr>
@@ -1464,7 +1464,7 @@
           <p:cNvPr id="7" name="Foliennummernplatzhalter 6">
             <a:extLst>
               <a:ext uri="{FF2B5EF4-FFF2-40B4-BE49-F238E27FC236}">
-                <a16:creationId xmlns:a16="http://schemas.microsoft.com/office/drawing/2014/main" xmlns="" id="{0D6F8A1E-B9ED-4C65-9E1C-0F88D7429E21}"/>
+                <a16:creationId xmlns="" xmlns:a16="http://schemas.microsoft.com/office/drawing/2014/main" id="{0D6F8A1E-B9ED-4C65-9E1C-0F88D7429E21}"/>
               </a:ext>
             </a:extLst>
           </p:cNvPr>
@@ -1523,7 +1523,7 @@
           <p:cNvPr id="2" name="Titel 1">
             <a:extLst>
               <a:ext uri="{FF2B5EF4-FFF2-40B4-BE49-F238E27FC236}">
-                <a16:creationId xmlns:a16="http://schemas.microsoft.com/office/drawing/2014/main" xmlns="" id="{1A4987A6-EDE4-4CF9-B9B6-ECE62D97D840}"/>
+                <a16:creationId xmlns="" xmlns:a16="http://schemas.microsoft.com/office/drawing/2014/main" id="{1A4987A6-EDE4-4CF9-B9B6-ECE62D97D840}"/>
               </a:ext>
             </a:extLst>
           </p:cNvPr>
@@ -1557,7 +1557,7 @@
           <p:cNvPr id="3" name="Textplatzhalter 2">
             <a:extLst>
               <a:ext uri="{FF2B5EF4-FFF2-40B4-BE49-F238E27FC236}">
-                <a16:creationId xmlns:a16="http://schemas.microsoft.com/office/drawing/2014/main" xmlns="" id="{7F2145B9-5FFE-43AD-8B2C-F8E6F32F7BCC}"/>
+                <a16:creationId xmlns="" xmlns:a16="http://schemas.microsoft.com/office/drawing/2014/main" id="{7F2145B9-5FFE-43AD-8B2C-F8E6F32F7BCC}"/>
               </a:ext>
             </a:extLst>
           </p:cNvPr>
@@ -1628,7 +1628,7 @@
           <p:cNvPr id="4" name="Inhaltsplatzhalter 3">
             <a:extLst>
               <a:ext uri="{FF2B5EF4-FFF2-40B4-BE49-F238E27FC236}">
-                <a16:creationId xmlns:a16="http://schemas.microsoft.com/office/drawing/2014/main" xmlns="" id="{91A01D42-0AD3-413A-98DC-FE92CD12BE04}"/>
+                <a16:creationId xmlns="" xmlns:a16="http://schemas.microsoft.com/office/drawing/2014/main" id="{91A01D42-0AD3-413A-98DC-FE92CD12BE04}"/>
               </a:ext>
             </a:extLst>
           </p:cNvPr>
@@ -1691,7 +1691,7 @@
           <p:cNvPr id="5" name="Textplatzhalter 4">
             <a:extLst>
               <a:ext uri="{FF2B5EF4-FFF2-40B4-BE49-F238E27FC236}">
-                <a16:creationId xmlns:a16="http://schemas.microsoft.com/office/drawing/2014/main" xmlns="" id="{93EC1619-7F14-4911-95A7-869EB89EF1D9}"/>
+                <a16:creationId xmlns="" xmlns:a16="http://schemas.microsoft.com/office/drawing/2014/main" id="{93EC1619-7F14-4911-95A7-869EB89EF1D9}"/>
               </a:ext>
             </a:extLst>
           </p:cNvPr>
@@ -1762,7 +1762,7 @@
           <p:cNvPr id="6" name="Inhaltsplatzhalter 5">
             <a:extLst>
               <a:ext uri="{FF2B5EF4-FFF2-40B4-BE49-F238E27FC236}">
-                <a16:creationId xmlns:a16="http://schemas.microsoft.com/office/drawing/2014/main" xmlns="" id="{08ED497B-E51E-4035-B9AB-656F873E8C5B}"/>
+                <a16:creationId xmlns="" xmlns:a16="http://schemas.microsoft.com/office/drawing/2014/main" id="{08ED497B-E51E-4035-B9AB-656F873E8C5B}"/>
               </a:ext>
             </a:extLst>
           </p:cNvPr>
@@ -1825,7 +1825,7 @@
           <p:cNvPr id="7" name="Datumsplatzhalter 6">
             <a:extLst>
               <a:ext uri="{FF2B5EF4-FFF2-40B4-BE49-F238E27FC236}">
-                <a16:creationId xmlns:a16="http://schemas.microsoft.com/office/drawing/2014/main" xmlns="" id="{FE4DA2E8-CC83-46A8-85B3-DC95FE01BD77}"/>
+                <a16:creationId xmlns="" xmlns:a16="http://schemas.microsoft.com/office/drawing/2014/main" id="{FE4DA2E8-CC83-46A8-85B3-DC95FE01BD77}"/>
               </a:ext>
             </a:extLst>
           </p:cNvPr>
@@ -1854,7 +1854,7 @@
           <p:cNvPr id="8" name="Fußzeilenplatzhalter 7">
             <a:extLst>
               <a:ext uri="{FF2B5EF4-FFF2-40B4-BE49-F238E27FC236}">
-                <a16:creationId xmlns:a16="http://schemas.microsoft.com/office/drawing/2014/main" xmlns="" id="{5C00E00A-31FF-47DD-8D58-D444A3477730}"/>
+                <a16:creationId xmlns="" xmlns:a16="http://schemas.microsoft.com/office/drawing/2014/main" id="{5C00E00A-31FF-47DD-8D58-D444A3477730}"/>
               </a:ext>
             </a:extLst>
           </p:cNvPr>
@@ -1879,7 +1879,7 @@
           <p:cNvPr id="9" name="Foliennummernplatzhalter 8">
             <a:extLst>
               <a:ext uri="{FF2B5EF4-FFF2-40B4-BE49-F238E27FC236}">
-                <a16:creationId xmlns:a16="http://schemas.microsoft.com/office/drawing/2014/main" xmlns="" id="{C365682F-698D-410F-8B38-20BFD334F89A}"/>
+                <a16:creationId xmlns="" xmlns:a16="http://schemas.microsoft.com/office/drawing/2014/main" id="{C365682F-698D-410F-8B38-20BFD334F89A}"/>
               </a:ext>
             </a:extLst>
           </p:cNvPr>
@@ -1938,7 +1938,7 @@
           <p:cNvPr id="2" name="Titel 1">
             <a:extLst>
               <a:ext uri="{FF2B5EF4-FFF2-40B4-BE49-F238E27FC236}">
-                <a16:creationId xmlns:a16="http://schemas.microsoft.com/office/drawing/2014/main" xmlns="" id="{48C2AD89-7A55-4F58-AC8B-D44387B6DCDF}"/>
+                <a16:creationId xmlns="" xmlns:a16="http://schemas.microsoft.com/office/drawing/2014/main" id="{48C2AD89-7A55-4F58-AC8B-D44387B6DCDF}"/>
               </a:ext>
             </a:extLst>
           </p:cNvPr>
@@ -1967,7 +1967,7 @@
           <p:cNvPr id="3" name="Datumsplatzhalter 2">
             <a:extLst>
               <a:ext uri="{FF2B5EF4-FFF2-40B4-BE49-F238E27FC236}">
-                <a16:creationId xmlns:a16="http://schemas.microsoft.com/office/drawing/2014/main" xmlns="" id="{247DAE21-785F-44C5-AD87-C81EB574F0E6}"/>
+                <a16:creationId xmlns="" xmlns:a16="http://schemas.microsoft.com/office/drawing/2014/main" id="{247DAE21-785F-44C5-AD87-C81EB574F0E6}"/>
               </a:ext>
             </a:extLst>
           </p:cNvPr>
@@ -1996,7 +1996,7 @@
           <p:cNvPr id="4" name="Fußzeilenplatzhalter 3">
             <a:extLst>
               <a:ext uri="{FF2B5EF4-FFF2-40B4-BE49-F238E27FC236}">
-                <a16:creationId xmlns:a16="http://schemas.microsoft.com/office/drawing/2014/main" xmlns="" id="{63FAB037-1DB6-4C8D-B7F0-75BE73DB3834}"/>
+                <a16:creationId xmlns="" xmlns:a16="http://schemas.microsoft.com/office/drawing/2014/main" id="{63FAB037-1DB6-4C8D-B7F0-75BE73DB3834}"/>
               </a:ext>
             </a:extLst>
           </p:cNvPr>
@@ -2021,7 +2021,7 @@
           <p:cNvPr id="5" name="Foliennummernplatzhalter 4">
             <a:extLst>
               <a:ext uri="{FF2B5EF4-FFF2-40B4-BE49-F238E27FC236}">
-                <a16:creationId xmlns:a16="http://schemas.microsoft.com/office/drawing/2014/main" xmlns="" id="{A0546778-837A-4040-B372-7E67183EDB86}"/>
+                <a16:creationId xmlns="" xmlns:a16="http://schemas.microsoft.com/office/drawing/2014/main" id="{A0546778-837A-4040-B372-7E67183EDB86}"/>
               </a:ext>
             </a:extLst>
           </p:cNvPr>
@@ -2080,7 +2080,7 @@
           <p:cNvPr id="2" name="Datumsplatzhalter 1">
             <a:extLst>
               <a:ext uri="{FF2B5EF4-FFF2-40B4-BE49-F238E27FC236}">
-                <a16:creationId xmlns:a16="http://schemas.microsoft.com/office/drawing/2014/main" xmlns="" id="{72C34522-CF6B-4A4D-853A-ACD1B3F31EE0}"/>
+                <a16:creationId xmlns="" xmlns:a16="http://schemas.microsoft.com/office/drawing/2014/main" id="{72C34522-CF6B-4A4D-853A-ACD1B3F31EE0}"/>
               </a:ext>
             </a:extLst>
           </p:cNvPr>
@@ -2109,7 +2109,7 @@
           <p:cNvPr id="3" name="Fußzeilenplatzhalter 2">
             <a:extLst>
               <a:ext uri="{FF2B5EF4-FFF2-40B4-BE49-F238E27FC236}">
-                <a16:creationId xmlns:a16="http://schemas.microsoft.com/office/drawing/2014/main" xmlns="" id="{885DCB87-5741-4860-99EB-29A076231B36}"/>
+                <a16:creationId xmlns="" xmlns:a16="http://schemas.microsoft.com/office/drawing/2014/main" id="{885DCB87-5741-4860-99EB-29A076231B36}"/>
               </a:ext>
             </a:extLst>
           </p:cNvPr>
@@ -2134,7 +2134,7 @@
           <p:cNvPr id="4" name="Foliennummernplatzhalter 3">
             <a:extLst>
               <a:ext uri="{FF2B5EF4-FFF2-40B4-BE49-F238E27FC236}">
-                <a16:creationId xmlns:a16="http://schemas.microsoft.com/office/drawing/2014/main" xmlns="" id="{FD480011-3635-44F4-B0FD-D6453451C7C8}"/>
+                <a16:creationId xmlns="" xmlns:a16="http://schemas.microsoft.com/office/drawing/2014/main" id="{FD480011-3635-44F4-B0FD-D6453451C7C8}"/>
               </a:ext>
             </a:extLst>
           </p:cNvPr>
@@ -2193,7 +2193,7 @@
           <p:cNvPr id="2" name="Titel 1">
             <a:extLst>
               <a:ext uri="{FF2B5EF4-FFF2-40B4-BE49-F238E27FC236}">
-                <a16:creationId xmlns:a16="http://schemas.microsoft.com/office/drawing/2014/main" xmlns="" id="{5DDE90ED-259D-4254-BAF7-491D5D9FF505}"/>
+                <a16:creationId xmlns="" xmlns:a16="http://schemas.microsoft.com/office/drawing/2014/main" id="{5DDE90ED-259D-4254-BAF7-491D5D9FF505}"/>
               </a:ext>
             </a:extLst>
           </p:cNvPr>
@@ -2231,7 +2231,7 @@
           <p:cNvPr id="3" name="Inhaltsplatzhalter 2">
             <a:extLst>
               <a:ext uri="{FF2B5EF4-FFF2-40B4-BE49-F238E27FC236}">
-                <a16:creationId xmlns:a16="http://schemas.microsoft.com/office/drawing/2014/main" xmlns="" id="{321C5F6F-D4A1-4142-A13B-6F3A3616691E}"/>
+                <a16:creationId xmlns="" xmlns:a16="http://schemas.microsoft.com/office/drawing/2014/main" id="{321C5F6F-D4A1-4142-A13B-6F3A3616691E}"/>
               </a:ext>
             </a:extLst>
           </p:cNvPr>
@@ -2322,7 +2322,7 @@
           <p:cNvPr id="4" name="Textplatzhalter 3">
             <a:extLst>
               <a:ext uri="{FF2B5EF4-FFF2-40B4-BE49-F238E27FC236}">
-                <a16:creationId xmlns:a16="http://schemas.microsoft.com/office/drawing/2014/main" xmlns="" id="{660853D0-958B-4D64-9E3C-64AA0444F9DB}"/>
+                <a16:creationId xmlns="" xmlns:a16="http://schemas.microsoft.com/office/drawing/2014/main" id="{660853D0-958B-4D64-9E3C-64AA0444F9DB}"/>
               </a:ext>
             </a:extLst>
           </p:cNvPr>
@@ -2393,7 +2393,7 @@
           <p:cNvPr id="5" name="Datumsplatzhalter 4">
             <a:extLst>
               <a:ext uri="{FF2B5EF4-FFF2-40B4-BE49-F238E27FC236}">
-                <a16:creationId xmlns:a16="http://schemas.microsoft.com/office/drawing/2014/main" xmlns="" id="{833937D0-5BCC-4A56-BD25-6185B5AFF050}"/>
+                <a16:creationId xmlns="" xmlns:a16="http://schemas.microsoft.com/office/drawing/2014/main" id="{833937D0-5BCC-4A56-BD25-6185B5AFF050}"/>
               </a:ext>
             </a:extLst>
           </p:cNvPr>
@@ -2422,7 +2422,7 @@
           <p:cNvPr id="6" name="Fußzeilenplatzhalter 5">
             <a:extLst>
               <a:ext uri="{FF2B5EF4-FFF2-40B4-BE49-F238E27FC236}">
-                <a16:creationId xmlns:a16="http://schemas.microsoft.com/office/drawing/2014/main" xmlns="" id="{6A8554D6-4EBE-4442-8FB3-C8DD5B5A9ECE}"/>
+                <a16:creationId xmlns="" xmlns:a16="http://schemas.microsoft.com/office/drawing/2014/main" id="{6A8554D6-4EBE-4442-8FB3-C8DD5B5A9ECE}"/>
               </a:ext>
             </a:extLst>
           </p:cNvPr>
@@ -2447,7 +2447,7 @@
           <p:cNvPr id="7" name="Foliennummernplatzhalter 6">
             <a:extLst>
               <a:ext uri="{FF2B5EF4-FFF2-40B4-BE49-F238E27FC236}">
-                <a16:creationId xmlns:a16="http://schemas.microsoft.com/office/drawing/2014/main" xmlns="" id="{5D7CCC38-4DF4-4DCF-9344-B190EE87EB17}"/>
+                <a16:creationId xmlns="" xmlns:a16="http://schemas.microsoft.com/office/drawing/2014/main" id="{5D7CCC38-4DF4-4DCF-9344-B190EE87EB17}"/>
               </a:ext>
             </a:extLst>
           </p:cNvPr>
@@ -2506,7 +2506,7 @@
           <p:cNvPr id="2" name="Titel 1">
             <a:extLst>
               <a:ext uri="{FF2B5EF4-FFF2-40B4-BE49-F238E27FC236}">
-                <a16:creationId xmlns:a16="http://schemas.microsoft.com/office/drawing/2014/main" xmlns="" id="{1D49AC2D-0B36-4382-AC76-05C937DAB958}"/>
+                <a16:creationId xmlns="" xmlns:a16="http://schemas.microsoft.com/office/drawing/2014/main" id="{1D49AC2D-0B36-4382-AC76-05C937DAB958}"/>
               </a:ext>
             </a:extLst>
           </p:cNvPr>
@@ -2544,7 +2544,7 @@
           <p:cNvPr id="3" name="Bildplatzhalter 2">
             <a:extLst>
               <a:ext uri="{FF2B5EF4-FFF2-40B4-BE49-F238E27FC236}">
-                <a16:creationId xmlns:a16="http://schemas.microsoft.com/office/drawing/2014/main" xmlns="" id="{ED1751C8-F889-4260-8874-1449020CB2FA}"/>
+                <a16:creationId xmlns="" xmlns:a16="http://schemas.microsoft.com/office/drawing/2014/main" id="{ED1751C8-F889-4260-8874-1449020CB2FA}"/>
               </a:ext>
             </a:extLst>
           </p:cNvPr>
@@ -2611,7 +2611,7 @@
           <p:cNvPr id="4" name="Textplatzhalter 3">
             <a:extLst>
               <a:ext uri="{FF2B5EF4-FFF2-40B4-BE49-F238E27FC236}">
-                <a16:creationId xmlns:a16="http://schemas.microsoft.com/office/drawing/2014/main" xmlns="" id="{6FCD641E-B967-4643-82BB-23007A5853AC}"/>
+                <a16:creationId xmlns="" xmlns:a16="http://schemas.microsoft.com/office/drawing/2014/main" id="{6FCD641E-B967-4643-82BB-23007A5853AC}"/>
               </a:ext>
             </a:extLst>
           </p:cNvPr>
@@ -2682,7 +2682,7 @@
           <p:cNvPr id="5" name="Datumsplatzhalter 4">
             <a:extLst>
               <a:ext uri="{FF2B5EF4-FFF2-40B4-BE49-F238E27FC236}">
-                <a16:creationId xmlns:a16="http://schemas.microsoft.com/office/drawing/2014/main" xmlns="" id="{22A91131-6478-4D90-87F6-14071969885A}"/>
+                <a16:creationId xmlns="" xmlns:a16="http://schemas.microsoft.com/office/drawing/2014/main" id="{22A91131-6478-4D90-87F6-14071969885A}"/>
               </a:ext>
             </a:extLst>
           </p:cNvPr>
@@ -2711,7 +2711,7 @@
           <p:cNvPr id="6" name="Fußzeilenplatzhalter 5">
             <a:extLst>
               <a:ext uri="{FF2B5EF4-FFF2-40B4-BE49-F238E27FC236}">
-                <a16:creationId xmlns:a16="http://schemas.microsoft.com/office/drawing/2014/main" xmlns="" id="{D9CE147C-30C7-4D52-9F9C-AF547A0620B9}"/>
+                <a16:creationId xmlns="" xmlns:a16="http://schemas.microsoft.com/office/drawing/2014/main" id="{D9CE147C-30C7-4D52-9F9C-AF547A0620B9}"/>
               </a:ext>
             </a:extLst>
           </p:cNvPr>
@@ -2736,7 +2736,7 @@
           <p:cNvPr id="7" name="Foliennummernplatzhalter 6">
             <a:extLst>
               <a:ext uri="{FF2B5EF4-FFF2-40B4-BE49-F238E27FC236}">
-                <a16:creationId xmlns:a16="http://schemas.microsoft.com/office/drawing/2014/main" xmlns="" id="{9A6D3D60-B498-43D4-B9BD-EA63BAE0B5AE}"/>
+                <a16:creationId xmlns="" xmlns:a16="http://schemas.microsoft.com/office/drawing/2014/main" id="{9A6D3D60-B498-43D4-B9BD-EA63BAE0B5AE}"/>
               </a:ext>
             </a:extLst>
           </p:cNvPr>
@@ -2800,7 +2800,7 @@
           <p:cNvPr id="2" name="Titelplatzhalter 1">
             <a:extLst>
               <a:ext uri="{FF2B5EF4-FFF2-40B4-BE49-F238E27FC236}">
-                <a16:creationId xmlns:a16="http://schemas.microsoft.com/office/drawing/2014/main" xmlns="" id="{D889ED81-9677-4075-9BF4-B94337B2A47A}"/>
+                <a16:creationId xmlns="" xmlns:a16="http://schemas.microsoft.com/office/drawing/2014/main" id="{D889ED81-9677-4075-9BF4-B94337B2A47A}"/>
               </a:ext>
             </a:extLst>
           </p:cNvPr>
@@ -2839,7 +2839,7 @@
           <p:cNvPr id="3" name="Textplatzhalter 2">
             <a:extLst>
               <a:ext uri="{FF2B5EF4-FFF2-40B4-BE49-F238E27FC236}">
-                <a16:creationId xmlns:a16="http://schemas.microsoft.com/office/drawing/2014/main" xmlns="" id="{7F34CF19-EABE-4F0B-B4AD-87D2E6331025}"/>
+                <a16:creationId xmlns="" xmlns:a16="http://schemas.microsoft.com/office/drawing/2014/main" id="{7F34CF19-EABE-4F0B-B4AD-87D2E6331025}"/>
               </a:ext>
             </a:extLst>
           </p:cNvPr>
@@ -2907,7 +2907,7 @@
           <p:cNvPr id="4" name="Datumsplatzhalter 3">
             <a:extLst>
               <a:ext uri="{FF2B5EF4-FFF2-40B4-BE49-F238E27FC236}">
-                <a16:creationId xmlns:a16="http://schemas.microsoft.com/office/drawing/2014/main" xmlns="" id="{2A8A6C8B-60DA-4470-A5B3-D7828F1AFA0D}"/>
+                <a16:creationId xmlns="" xmlns:a16="http://schemas.microsoft.com/office/drawing/2014/main" id="{2A8A6C8B-60DA-4470-A5B3-D7828F1AFA0D}"/>
               </a:ext>
             </a:extLst>
           </p:cNvPr>
@@ -2954,7 +2954,7 @@
           <p:cNvPr id="5" name="Fußzeilenplatzhalter 4">
             <a:extLst>
               <a:ext uri="{FF2B5EF4-FFF2-40B4-BE49-F238E27FC236}">
-                <a16:creationId xmlns:a16="http://schemas.microsoft.com/office/drawing/2014/main" xmlns="" id="{05881D91-6D11-40A8-9CE3-ED023A7B4C47}"/>
+                <a16:creationId xmlns="" xmlns:a16="http://schemas.microsoft.com/office/drawing/2014/main" id="{05881D91-6D11-40A8-9CE3-ED023A7B4C47}"/>
               </a:ext>
             </a:extLst>
           </p:cNvPr>
@@ -2997,7 +2997,7 @@
           <p:cNvPr id="6" name="Foliennummernplatzhalter 5">
             <a:extLst>
               <a:ext uri="{FF2B5EF4-FFF2-40B4-BE49-F238E27FC236}">
-                <a16:creationId xmlns:a16="http://schemas.microsoft.com/office/drawing/2014/main" xmlns="" id="{5DC318CB-1677-4E52-AC0F-4B3F7ADFBDAA}"/>
+                <a16:creationId xmlns="" xmlns:a16="http://schemas.microsoft.com/office/drawing/2014/main" id="{5DC318CB-1677-4E52-AC0F-4B3F7ADFBDAA}"/>
               </a:ext>
             </a:extLst>
           </p:cNvPr>
@@ -3365,7 +3365,7 @@
           <p:cNvPr id="2" name="Titel 1">
             <a:extLst>
               <a:ext uri="{FF2B5EF4-FFF2-40B4-BE49-F238E27FC236}">
-                <a16:creationId xmlns:a16="http://schemas.microsoft.com/office/drawing/2014/main" xmlns="" id="{B546CD53-F628-4921-AB00-C1B41183297C}"/>
+                <a16:creationId xmlns="" xmlns:a16="http://schemas.microsoft.com/office/drawing/2014/main" id="{B546CD53-F628-4921-AB00-C1B41183297C}"/>
               </a:ext>
             </a:extLst>
           </p:cNvPr>
@@ -3390,7 +3390,7 @@
           <p:cNvPr id="3" name="Untertitel 2">
             <a:extLst>
               <a:ext uri="{FF2B5EF4-FFF2-40B4-BE49-F238E27FC236}">
-                <a16:creationId xmlns:a16="http://schemas.microsoft.com/office/drawing/2014/main" xmlns="" id="{0703C719-B931-4FF1-8A37-A47F9BB39F6E}"/>
+                <a16:creationId xmlns="" xmlns:a16="http://schemas.microsoft.com/office/drawing/2014/main" id="{0703C719-B931-4FF1-8A37-A47F9BB39F6E}"/>
               </a:ext>
             </a:extLst>
           </p:cNvPr>
@@ -3435,7 +3435,7 @@
           <p:cNvPr id="6" name="Grafik 5">
             <a:extLst>
               <a:ext uri="{FF2B5EF4-FFF2-40B4-BE49-F238E27FC236}">
-                <a16:creationId xmlns:a16="http://schemas.microsoft.com/office/drawing/2014/main" xmlns="" id="{5D2BD1CF-3E73-4540-962F-4B216DB4FA31}"/>
+                <a16:creationId xmlns="" xmlns:a16="http://schemas.microsoft.com/office/drawing/2014/main" id="{5D2BD1CF-3E73-4540-962F-4B216DB4FA31}"/>
               </a:ext>
             </a:extLst>
           </p:cNvPr>
@@ -3508,7 +3508,7 @@
           <p:cNvPr id="88" name="Gruppieren 87">
             <a:extLst>
               <a:ext uri="{FF2B5EF4-FFF2-40B4-BE49-F238E27FC236}">
-                <a16:creationId xmlns:a16="http://schemas.microsoft.com/office/drawing/2014/main" xmlns="" id="{9C7F16F0-753A-47CF-99C8-7DC1D7FCBBD9}"/>
+                <a16:creationId xmlns="" xmlns:a16="http://schemas.microsoft.com/office/drawing/2014/main" id="{9C7F16F0-753A-47CF-99C8-7DC1D7FCBBD9}"/>
               </a:ext>
             </a:extLst>
           </p:cNvPr>
@@ -3528,7 +3528,7 @@
             <p:cNvPr id="4" name="Gruppieren 3">
               <a:extLst>
                 <a:ext uri="{FF2B5EF4-FFF2-40B4-BE49-F238E27FC236}">
-                  <a16:creationId xmlns:a16="http://schemas.microsoft.com/office/drawing/2014/main" xmlns="" id="{67ECDFEA-C7F7-46C7-82B5-7AD051F27BFC}"/>
+                  <a16:creationId xmlns="" xmlns:a16="http://schemas.microsoft.com/office/drawing/2014/main" id="{67ECDFEA-C7F7-46C7-82B5-7AD051F27BFC}"/>
                 </a:ext>
               </a:extLst>
             </p:cNvPr>
@@ -3548,7 +3548,7 @@
               <p:cNvPr id="5" name="Rechteck: obere Ecken abgerundet 4">
                 <a:extLst>
                   <a:ext uri="{FF2B5EF4-FFF2-40B4-BE49-F238E27FC236}">
-                    <a16:creationId xmlns:a16="http://schemas.microsoft.com/office/drawing/2014/main" xmlns="" id="{716995A8-4DFE-4AC6-9BE9-E0366B673E38}"/>
+                    <a16:creationId xmlns="" xmlns:a16="http://schemas.microsoft.com/office/drawing/2014/main" id="{716995A8-4DFE-4AC6-9BE9-E0366B673E38}"/>
                   </a:ext>
                 </a:extLst>
               </p:cNvPr>
@@ -3607,7 +3607,7 @@
               <p:cNvPr id="6" name="Ellipse 5">
                 <a:extLst>
                   <a:ext uri="{FF2B5EF4-FFF2-40B4-BE49-F238E27FC236}">
-                    <a16:creationId xmlns:a16="http://schemas.microsoft.com/office/drawing/2014/main" xmlns="" id="{F94FA258-93D9-48D3-AFDB-49308A91376D}"/>
+                    <a16:creationId xmlns="" xmlns:a16="http://schemas.microsoft.com/office/drawing/2014/main" id="{F94FA258-93D9-48D3-AFDB-49308A91376D}"/>
                   </a:ext>
                 </a:extLst>
               </p:cNvPr>
@@ -3664,7 +3664,7 @@
             <p:cNvPr id="7" name="Gruppieren 6">
               <a:extLst>
                 <a:ext uri="{FF2B5EF4-FFF2-40B4-BE49-F238E27FC236}">
-                  <a16:creationId xmlns:a16="http://schemas.microsoft.com/office/drawing/2014/main" xmlns="" id="{C5279C5A-4543-428C-B9BB-F05FD2862340}"/>
+                  <a16:creationId xmlns="" xmlns:a16="http://schemas.microsoft.com/office/drawing/2014/main" id="{C5279C5A-4543-428C-B9BB-F05FD2862340}"/>
                 </a:ext>
               </a:extLst>
             </p:cNvPr>
@@ -3684,7 +3684,7 @@
               <p:cNvPr id="8" name="Rechteck: obere Ecken abgerundet 7">
                 <a:extLst>
                   <a:ext uri="{FF2B5EF4-FFF2-40B4-BE49-F238E27FC236}">
-                    <a16:creationId xmlns:a16="http://schemas.microsoft.com/office/drawing/2014/main" xmlns="" id="{C7EC54D9-C7E5-411A-96C9-9030EA55186E}"/>
+                    <a16:creationId xmlns="" xmlns:a16="http://schemas.microsoft.com/office/drawing/2014/main" id="{C7EC54D9-C7E5-411A-96C9-9030EA55186E}"/>
                   </a:ext>
                 </a:extLst>
               </p:cNvPr>
@@ -3743,7 +3743,7 @@
               <p:cNvPr id="9" name="Ellipse 8">
                 <a:extLst>
                   <a:ext uri="{FF2B5EF4-FFF2-40B4-BE49-F238E27FC236}">
-                    <a16:creationId xmlns:a16="http://schemas.microsoft.com/office/drawing/2014/main" xmlns="" id="{60E07259-615A-44AA-B79A-FA5F7446501A}"/>
+                    <a16:creationId xmlns="" xmlns:a16="http://schemas.microsoft.com/office/drawing/2014/main" id="{60E07259-615A-44AA-B79A-FA5F7446501A}"/>
                   </a:ext>
                 </a:extLst>
               </p:cNvPr>
@@ -3800,7 +3800,7 @@
             <p:cNvPr id="10" name="Rechteck: abgerundete Ecken 9">
               <a:extLst>
                 <a:ext uri="{FF2B5EF4-FFF2-40B4-BE49-F238E27FC236}">
-                  <a16:creationId xmlns:a16="http://schemas.microsoft.com/office/drawing/2014/main" xmlns="" id="{0ACA73AA-A7DC-4D31-AC56-CCE6912DA8A7}"/>
+                  <a16:creationId xmlns="" xmlns:a16="http://schemas.microsoft.com/office/drawing/2014/main" id="{0ACA73AA-A7DC-4D31-AC56-CCE6912DA8A7}"/>
                 </a:ext>
               </a:extLst>
             </p:cNvPr>
@@ -3863,7 +3863,7 @@
             <p:cNvPr id="11" name="Rechteck: abgerundete Ecken 10">
               <a:extLst>
                 <a:ext uri="{FF2B5EF4-FFF2-40B4-BE49-F238E27FC236}">
-                  <a16:creationId xmlns:a16="http://schemas.microsoft.com/office/drawing/2014/main" xmlns="" id="{09E6810C-ECCE-4BCB-B54F-115DA41FECD6}"/>
+                  <a16:creationId xmlns="" xmlns:a16="http://schemas.microsoft.com/office/drawing/2014/main" id="{09E6810C-ECCE-4BCB-B54F-115DA41FECD6}"/>
                 </a:ext>
               </a:extLst>
             </p:cNvPr>
@@ -3926,7 +3926,7 @@
             <p:cNvPr id="12" name="Textfeld 11">
               <a:extLst>
                 <a:ext uri="{FF2B5EF4-FFF2-40B4-BE49-F238E27FC236}">
-                  <a16:creationId xmlns:a16="http://schemas.microsoft.com/office/drawing/2014/main" xmlns="" id="{CACC825B-A01A-44AF-8A16-EE77F17F3DAD}"/>
+                  <a16:creationId xmlns="" xmlns:a16="http://schemas.microsoft.com/office/drawing/2014/main" id="{CACC825B-A01A-44AF-8A16-EE77F17F3DAD}"/>
                 </a:ext>
               </a:extLst>
             </p:cNvPr>
@@ -3961,7 +3961,7 @@
             <p:cNvPr id="13" name="Textfeld 12">
               <a:extLst>
                 <a:ext uri="{FF2B5EF4-FFF2-40B4-BE49-F238E27FC236}">
-                  <a16:creationId xmlns:a16="http://schemas.microsoft.com/office/drawing/2014/main" xmlns="" id="{D0315F4D-A0EA-4B91-9186-2E6170F55A07}"/>
+                  <a16:creationId xmlns="" xmlns:a16="http://schemas.microsoft.com/office/drawing/2014/main" id="{D0315F4D-A0EA-4B91-9186-2E6170F55A07}"/>
                 </a:ext>
               </a:extLst>
             </p:cNvPr>
@@ -3996,7 +3996,7 @@
             <p:cNvPr id="14" name="Gruppieren 13">
               <a:extLst>
                 <a:ext uri="{FF2B5EF4-FFF2-40B4-BE49-F238E27FC236}">
-                  <a16:creationId xmlns:a16="http://schemas.microsoft.com/office/drawing/2014/main" xmlns="" id="{560B1DD5-8673-4C4C-B867-015472A3C2DA}"/>
+                  <a16:creationId xmlns="" xmlns:a16="http://schemas.microsoft.com/office/drawing/2014/main" id="{560B1DD5-8673-4C4C-B867-015472A3C2DA}"/>
                 </a:ext>
               </a:extLst>
             </p:cNvPr>
@@ -4016,7 +4016,7 @@
               <p:cNvPr id="15" name="Rechteck: obere Ecken abgerundet 14">
                 <a:extLst>
                   <a:ext uri="{FF2B5EF4-FFF2-40B4-BE49-F238E27FC236}">
-                    <a16:creationId xmlns:a16="http://schemas.microsoft.com/office/drawing/2014/main" xmlns="" id="{D4421D9F-5FBF-4C41-9B29-008E757C04E6}"/>
+                    <a16:creationId xmlns="" xmlns:a16="http://schemas.microsoft.com/office/drawing/2014/main" id="{D4421D9F-5FBF-4C41-9B29-008E757C04E6}"/>
                   </a:ext>
                 </a:extLst>
               </p:cNvPr>
@@ -4075,7 +4075,7 @@
               <p:cNvPr id="16" name="Ellipse 15">
                 <a:extLst>
                   <a:ext uri="{FF2B5EF4-FFF2-40B4-BE49-F238E27FC236}">
-                    <a16:creationId xmlns:a16="http://schemas.microsoft.com/office/drawing/2014/main" xmlns="" id="{EA3687B2-F403-4CFE-B55B-7A50793847CC}"/>
+                    <a16:creationId xmlns="" xmlns:a16="http://schemas.microsoft.com/office/drawing/2014/main" id="{EA3687B2-F403-4CFE-B55B-7A50793847CC}"/>
                   </a:ext>
                 </a:extLst>
               </p:cNvPr>
@@ -4132,7 +4132,7 @@
             <p:cNvPr id="17" name="Gruppieren 16">
               <a:extLst>
                 <a:ext uri="{FF2B5EF4-FFF2-40B4-BE49-F238E27FC236}">
-                  <a16:creationId xmlns:a16="http://schemas.microsoft.com/office/drawing/2014/main" xmlns="" id="{CBE2F339-C67D-4C47-A7ED-3B8A8A1038A6}"/>
+                  <a16:creationId xmlns="" xmlns:a16="http://schemas.microsoft.com/office/drawing/2014/main" id="{CBE2F339-C67D-4C47-A7ED-3B8A8A1038A6}"/>
                 </a:ext>
               </a:extLst>
             </p:cNvPr>
@@ -4152,7 +4152,7 @@
               <p:cNvPr id="18" name="Rechteck: obere Ecken abgerundet 17">
                 <a:extLst>
                   <a:ext uri="{FF2B5EF4-FFF2-40B4-BE49-F238E27FC236}">
-                    <a16:creationId xmlns:a16="http://schemas.microsoft.com/office/drawing/2014/main" xmlns="" id="{481D02E6-705F-4923-9778-5725C4D555E0}"/>
+                    <a16:creationId xmlns="" xmlns:a16="http://schemas.microsoft.com/office/drawing/2014/main" id="{481D02E6-705F-4923-9778-5725C4D555E0}"/>
                   </a:ext>
                 </a:extLst>
               </p:cNvPr>
@@ -4211,7 +4211,7 @@
               <p:cNvPr id="19" name="Ellipse 18">
                 <a:extLst>
                   <a:ext uri="{FF2B5EF4-FFF2-40B4-BE49-F238E27FC236}">
-                    <a16:creationId xmlns:a16="http://schemas.microsoft.com/office/drawing/2014/main" xmlns="" id="{68D20774-73FD-4847-AD87-4C8A7C77702E}"/>
+                    <a16:creationId xmlns="" xmlns:a16="http://schemas.microsoft.com/office/drawing/2014/main" id="{68D20774-73FD-4847-AD87-4C8A7C77702E}"/>
                   </a:ext>
                 </a:extLst>
               </p:cNvPr>
@@ -4268,7 +4268,7 @@
             <p:cNvPr id="20" name="Rechteck: abgerundete Ecken 19">
               <a:extLst>
                 <a:ext uri="{FF2B5EF4-FFF2-40B4-BE49-F238E27FC236}">
-                  <a16:creationId xmlns:a16="http://schemas.microsoft.com/office/drawing/2014/main" xmlns="" id="{6A31D0B3-8678-4A04-A019-F08B2A41B8EB}"/>
+                  <a16:creationId xmlns="" xmlns:a16="http://schemas.microsoft.com/office/drawing/2014/main" id="{6A31D0B3-8678-4A04-A019-F08B2A41B8EB}"/>
                 </a:ext>
               </a:extLst>
             </p:cNvPr>
@@ -4331,7 +4331,7 @@
             <p:cNvPr id="21" name="Rechteck: abgerundete Ecken 20">
               <a:extLst>
                 <a:ext uri="{FF2B5EF4-FFF2-40B4-BE49-F238E27FC236}">
-                  <a16:creationId xmlns:a16="http://schemas.microsoft.com/office/drawing/2014/main" xmlns="" id="{B4C589D2-A103-42B3-B91E-D6205ABF7F5A}"/>
+                  <a16:creationId xmlns="" xmlns:a16="http://schemas.microsoft.com/office/drawing/2014/main" id="{B4C589D2-A103-42B3-B91E-D6205ABF7F5A}"/>
                 </a:ext>
               </a:extLst>
             </p:cNvPr>
@@ -4394,7 +4394,7 @@
             <p:cNvPr id="22" name="Textfeld 21">
               <a:extLst>
                 <a:ext uri="{FF2B5EF4-FFF2-40B4-BE49-F238E27FC236}">
-                  <a16:creationId xmlns:a16="http://schemas.microsoft.com/office/drawing/2014/main" xmlns="" id="{8FCC2BD9-F20E-41B8-B321-CD5890C3DAA2}"/>
+                  <a16:creationId xmlns="" xmlns:a16="http://schemas.microsoft.com/office/drawing/2014/main" id="{8FCC2BD9-F20E-41B8-B321-CD5890C3DAA2}"/>
                 </a:ext>
               </a:extLst>
             </p:cNvPr>
@@ -4429,7 +4429,7 @@
             <p:cNvPr id="23" name="Textfeld 22">
               <a:extLst>
                 <a:ext uri="{FF2B5EF4-FFF2-40B4-BE49-F238E27FC236}">
-                  <a16:creationId xmlns:a16="http://schemas.microsoft.com/office/drawing/2014/main" xmlns="" id="{D0E67B75-9DAB-46B9-9B42-558A4746CF92}"/>
+                  <a16:creationId xmlns="" xmlns:a16="http://schemas.microsoft.com/office/drawing/2014/main" id="{D0E67B75-9DAB-46B9-9B42-558A4746CF92}"/>
                 </a:ext>
               </a:extLst>
             </p:cNvPr>
@@ -4464,7 +4464,7 @@
             <p:cNvPr id="24" name="Bogen 23">
               <a:extLst>
                 <a:ext uri="{FF2B5EF4-FFF2-40B4-BE49-F238E27FC236}">
-                  <a16:creationId xmlns:a16="http://schemas.microsoft.com/office/drawing/2014/main" xmlns="" id="{9E606C54-A77A-4121-BB1E-5E91F9EB972A}"/>
+                  <a16:creationId xmlns="" xmlns:a16="http://schemas.microsoft.com/office/drawing/2014/main" id="{9E606C54-A77A-4121-BB1E-5E91F9EB972A}"/>
                 </a:ext>
               </a:extLst>
             </p:cNvPr>
@@ -4518,7 +4518,7 @@
           <p:cNvPr id="25" name="Pfeil: nach rechts 24">
             <a:extLst>
               <a:ext uri="{FF2B5EF4-FFF2-40B4-BE49-F238E27FC236}">
-                <a16:creationId xmlns:a16="http://schemas.microsoft.com/office/drawing/2014/main" xmlns="" id="{65E24FF5-B1AA-43CA-9064-5AA2DD28446A}"/>
+                <a16:creationId xmlns="" xmlns:a16="http://schemas.microsoft.com/office/drawing/2014/main" id="{65E24FF5-B1AA-43CA-9064-5AA2DD28446A}"/>
               </a:ext>
             </a:extLst>
           </p:cNvPr>
@@ -4575,7 +4575,7 @@
           <p:cNvPr id="47" name="Pfeil: nach rechts 46">
             <a:extLst>
               <a:ext uri="{FF2B5EF4-FFF2-40B4-BE49-F238E27FC236}">
-                <a16:creationId xmlns:a16="http://schemas.microsoft.com/office/drawing/2014/main" xmlns="" id="{D4DFE8DE-D43D-495A-B031-3E4B46876D96}"/>
+                <a16:creationId xmlns="" xmlns:a16="http://schemas.microsoft.com/office/drawing/2014/main" id="{D4DFE8DE-D43D-495A-B031-3E4B46876D96}"/>
               </a:ext>
             </a:extLst>
           </p:cNvPr>
@@ -4632,7 +4632,7 @@
           <p:cNvPr id="89" name="Gruppieren 88">
             <a:extLst>
               <a:ext uri="{FF2B5EF4-FFF2-40B4-BE49-F238E27FC236}">
-                <a16:creationId xmlns:a16="http://schemas.microsoft.com/office/drawing/2014/main" xmlns="" id="{7DADACA5-5CA1-47D7-B0BC-557226F5E020}"/>
+                <a16:creationId xmlns="" xmlns:a16="http://schemas.microsoft.com/office/drawing/2014/main" id="{7DADACA5-5CA1-47D7-B0BC-557226F5E020}"/>
               </a:ext>
             </a:extLst>
           </p:cNvPr>
@@ -4652,7 +4652,7 @@
             <p:cNvPr id="26" name="Gruppieren 25">
               <a:extLst>
                 <a:ext uri="{FF2B5EF4-FFF2-40B4-BE49-F238E27FC236}">
-                  <a16:creationId xmlns:a16="http://schemas.microsoft.com/office/drawing/2014/main" xmlns="" id="{0BDEA192-AC26-4EB9-81F7-76DD6AC3564C}"/>
+                  <a16:creationId xmlns="" xmlns:a16="http://schemas.microsoft.com/office/drawing/2014/main" id="{0BDEA192-AC26-4EB9-81F7-76DD6AC3564C}"/>
                 </a:ext>
               </a:extLst>
             </p:cNvPr>
@@ -4672,7 +4672,7 @@
               <p:cNvPr id="27" name="Rechteck: obere Ecken abgerundet 26">
                 <a:extLst>
                   <a:ext uri="{FF2B5EF4-FFF2-40B4-BE49-F238E27FC236}">
-                    <a16:creationId xmlns:a16="http://schemas.microsoft.com/office/drawing/2014/main" xmlns="" id="{9F6990A9-57D7-410D-B965-DA249271F9F9}"/>
+                    <a16:creationId xmlns="" xmlns:a16="http://schemas.microsoft.com/office/drawing/2014/main" id="{9F6990A9-57D7-410D-B965-DA249271F9F9}"/>
                   </a:ext>
                 </a:extLst>
               </p:cNvPr>
@@ -4731,7 +4731,7 @@
               <p:cNvPr id="28" name="Ellipse 27">
                 <a:extLst>
                   <a:ext uri="{FF2B5EF4-FFF2-40B4-BE49-F238E27FC236}">
-                    <a16:creationId xmlns:a16="http://schemas.microsoft.com/office/drawing/2014/main" xmlns="" id="{12D6AFBA-19B3-46CE-ADBC-D1006AF9992F}"/>
+                    <a16:creationId xmlns="" xmlns:a16="http://schemas.microsoft.com/office/drawing/2014/main" id="{12D6AFBA-19B3-46CE-ADBC-D1006AF9992F}"/>
                   </a:ext>
                 </a:extLst>
               </p:cNvPr>
@@ -4788,7 +4788,7 @@
             <p:cNvPr id="29" name="Gruppieren 28">
               <a:extLst>
                 <a:ext uri="{FF2B5EF4-FFF2-40B4-BE49-F238E27FC236}">
-                  <a16:creationId xmlns:a16="http://schemas.microsoft.com/office/drawing/2014/main" xmlns="" id="{20D97C1B-0E43-40E2-86F3-296FAEAE2057}"/>
+                  <a16:creationId xmlns="" xmlns:a16="http://schemas.microsoft.com/office/drawing/2014/main" id="{20D97C1B-0E43-40E2-86F3-296FAEAE2057}"/>
                 </a:ext>
               </a:extLst>
             </p:cNvPr>
@@ -4808,7 +4808,7 @@
               <p:cNvPr id="30" name="Rechteck: obere Ecken abgerundet 29">
                 <a:extLst>
                   <a:ext uri="{FF2B5EF4-FFF2-40B4-BE49-F238E27FC236}">
-                    <a16:creationId xmlns:a16="http://schemas.microsoft.com/office/drawing/2014/main" xmlns="" id="{088EA9B5-AF75-4AAE-A1CE-452DC8B02CE9}"/>
+                    <a16:creationId xmlns="" xmlns:a16="http://schemas.microsoft.com/office/drawing/2014/main" id="{088EA9B5-AF75-4AAE-A1CE-452DC8B02CE9}"/>
                   </a:ext>
                 </a:extLst>
               </p:cNvPr>
@@ -4867,7 +4867,7 @@
               <p:cNvPr id="31" name="Ellipse 30">
                 <a:extLst>
                   <a:ext uri="{FF2B5EF4-FFF2-40B4-BE49-F238E27FC236}">
-                    <a16:creationId xmlns:a16="http://schemas.microsoft.com/office/drawing/2014/main" xmlns="" id="{9436A90F-F956-469D-9C68-58A480579DF1}"/>
+                    <a16:creationId xmlns="" xmlns:a16="http://schemas.microsoft.com/office/drawing/2014/main" id="{9436A90F-F956-469D-9C68-58A480579DF1}"/>
                   </a:ext>
                 </a:extLst>
               </p:cNvPr>
@@ -4924,7 +4924,7 @@
             <p:cNvPr id="32" name="Rechteck: abgerundete Ecken 31">
               <a:extLst>
                 <a:ext uri="{FF2B5EF4-FFF2-40B4-BE49-F238E27FC236}">
-                  <a16:creationId xmlns:a16="http://schemas.microsoft.com/office/drawing/2014/main" xmlns="" id="{38B02968-AED7-46CD-A99A-521B95B1A0E4}"/>
+                  <a16:creationId xmlns="" xmlns:a16="http://schemas.microsoft.com/office/drawing/2014/main" id="{38B02968-AED7-46CD-A99A-521B95B1A0E4}"/>
                 </a:ext>
               </a:extLst>
             </p:cNvPr>
@@ -4987,7 +4987,7 @@
             <p:cNvPr id="33" name="Rechteck: abgerundete Ecken 32">
               <a:extLst>
                 <a:ext uri="{FF2B5EF4-FFF2-40B4-BE49-F238E27FC236}">
-                  <a16:creationId xmlns:a16="http://schemas.microsoft.com/office/drawing/2014/main" xmlns="" id="{A3460637-2E18-46DC-B28F-B32236277DFE}"/>
+                  <a16:creationId xmlns="" xmlns:a16="http://schemas.microsoft.com/office/drawing/2014/main" id="{A3460637-2E18-46DC-B28F-B32236277DFE}"/>
                 </a:ext>
               </a:extLst>
             </p:cNvPr>
@@ -5050,7 +5050,7 @@
             <p:cNvPr id="34" name="Textfeld 33">
               <a:extLst>
                 <a:ext uri="{FF2B5EF4-FFF2-40B4-BE49-F238E27FC236}">
-                  <a16:creationId xmlns:a16="http://schemas.microsoft.com/office/drawing/2014/main" xmlns="" id="{04621091-8D39-45FA-B228-65AFE64167DB}"/>
+                  <a16:creationId xmlns="" xmlns:a16="http://schemas.microsoft.com/office/drawing/2014/main" id="{04621091-8D39-45FA-B228-65AFE64167DB}"/>
                 </a:ext>
               </a:extLst>
             </p:cNvPr>
@@ -5085,7 +5085,7 @@
             <p:cNvPr id="35" name="Textfeld 34">
               <a:extLst>
                 <a:ext uri="{FF2B5EF4-FFF2-40B4-BE49-F238E27FC236}">
-                  <a16:creationId xmlns:a16="http://schemas.microsoft.com/office/drawing/2014/main" xmlns="" id="{B567D6C2-ECFB-45C7-BDC1-7D59A844E996}"/>
+                  <a16:creationId xmlns="" xmlns:a16="http://schemas.microsoft.com/office/drawing/2014/main" id="{B567D6C2-ECFB-45C7-BDC1-7D59A844E996}"/>
                 </a:ext>
               </a:extLst>
             </p:cNvPr>
@@ -5120,7 +5120,7 @@
             <p:cNvPr id="39" name="Gruppieren 38">
               <a:extLst>
                 <a:ext uri="{FF2B5EF4-FFF2-40B4-BE49-F238E27FC236}">
-                  <a16:creationId xmlns:a16="http://schemas.microsoft.com/office/drawing/2014/main" xmlns="" id="{4C86AB00-B103-4E3E-A532-25FFA88EC3B0}"/>
+                  <a16:creationId xmlns="" xmlns:a16="http://schemas.microsoft.com/office/drawing/2014/main" id="{4C86AB00-B103-4E3E-A532-25FFA88EC3B0}"/>
                 </a:ext>
               </a:extLst>
             </p:cNvPr>
@@ -5140,7 +5140,7 @@
               <p:cNvPr id="40" name="Rechteck: obere Ecken abgerundet 39">
                 <a:extLst>
                   <a:ext uri="{FF2B5EF4-FFF2-40B4-BE49-F238E27FC236}">
-                    <a16:creationId xmlns:a16="http://schemas.microsoft.com/office/drawing/2014/main" xmlns="" id="{53F71C67-84D6-48AB-A000-A3B1CEE33816}"/>
+                    <a16:creationId xmlns="" xmlns:a16="http://schemas.microsoft.com/office/drawing/2014/main" id="{53F71C67-84D6-48AB-A000-A3B1CEE33816}"/>
                   </a:ext>
                 </a:extLst>
               </p:cNvPr>
@@ -5199,7 +5199,7 @@
               <p:cNvPr id="41" name="Ellipse 40">
                 <a:extLst>
                   <a:ext uri="{FF2B5EF4-FFF2-40B4-BE49-F238E27FC236}">
-                    <a16:creationId xmlns:a16="http://schemas.microsoft.com/office/drawing/2014/main" xmlns="" id="{CF668C80-D5F7-4FE6-B46A-485C7D307481}"/>
+                    <a16:creationId xmlns="" xmlns:a16="http://schemas.microsoft.com/office/drawing/2014/main" id="{CF668C80-D5F7-4FE6-B46A-485C7D307481}"/>
                   </a:ext>
                 </a:extLst>
               </p:cNvPr>
@@ -5256,7 +5256,7 @@
             <p:cNvPr id="42" name="Rechteck: abgerundete Ecken 41">
               <a:extLst>
                 <a:ext uri="{FF2B5EF4-FFF2-40B4-BE49-F238E27FC236}">
-                  <a16:creationId xmlns:a16="http://schemas.microsoft.com/office/drawing/2014/main" xmlns="" id="{67E5B9A2-6E69-4D22-9F8C-F944A518F918}"/>
+                  <a16:creationId xmlns="" xmlns:a16="http://schemas.microsoft.com/office/drawing/2014/main" id="{67E5B9A2-6E69-4D22-9F8C-F944A518F918}"/>
                 </a:ext>
               </a:extLst>
             </p:cNvPr>
@@ -5319,7 +5319,7 @@
             <p:cNvPr id="44" name="Textfeld 43">
               <a:extLst>
                 <a:ext uri="{FF2B5EF4-FFF2-40B4-BE49-F238E27FC236}">
-                  <a16:creationId xmlns:a16="http://schemas.microsoft.com/office/drawing/2014/main" xmlns="" id="{876BCE2A-37C3-4597-B55C-DFB20C5B8DDC}"/>
+                  <a16:creationId xmlns="" xmlns:a16="http://schemas.microsoft.com/office/drawing/2014/main" id="{876BCE2A-37C3-4597-B55C-DFB20C5B8DDC}"/>
                 </a:ext>
               </a:extLst>
             </p:cNvPr>
@@ -5354,7 +5354,7 @@
             <p:cNvPr id="45" name="Textfeld 44">
               <a:extLst>
                 <a:ext uri="{FF2B5EF4-FFF2-40B4-BE49-F238E27FC236}">
-                  <a16:creationId xmlns:a16="http://schemas.microsoft.com/office/drawing/2014/main" xmlns="" id="{F170ACB8-63F9-4432-80B4-5F30AF5845DD}"/>
+                  <a16:creationId xmlns="" xmlns:a16="http://schemas.microsoft.com/office/drawing/2014/main" id="{F170ACB8-63F9-4432-80B4-5F30AF5845DD}"/>
                 </a:ext>
               </a:extLst>
             </p:cNvPr>
@@ -5389,7 +5389,7 @@
             <p:cNvPr id="46" name="Bogen 45">
               <a:extLst>
                 <a:ext uri="{FF2B5EF4-FFF2-40B4-BE49-F238E27FC236}">
-                  <a16:creationId xmlns:a16="http://schemas.microsoft.com/office/drawing/2014/main" xmlns="" id="{D3F0F151-507E-4C03-91CD-8E34C3467E7A}"/>
+                  <a16:creationId xmlns="" xmlns:a16="http://schemas.microsoft.com/office/drawing/2014/main" id="{D3F0F151-507E-4C03-91CD-8E34C3467E7A}"/>
                 </a:ext>
               </a:extLst>
             </p:cNvPr>
@@ -5442,7 +5442,7 @@
             <p:cNvPr id="48" name="Rechteck: abgerundete Ecken 47">
               <a:extLst>
                 <a:ext uri="{FF2B5EF4-FFF2-40B4-BE49-F238E27FC236}">
-                  <a16:creationId xmlns:a16="http://schemas.microsoft.com/office/drawing/2014/main" xmlns="" id="{0864F0D3-25BD-40B0-A3EF-94AA006A8D7F}"/>
+                  <a16:creationId xmlns="" xmlns:a16="http://schemas.microsoft.com/office/drawing/2014/main" id="{0864F0D3-25BD-40B0-A3EF-94AA006A8D7F}"/>
                 </a:ext>
               </a:extLst>
             </p:cNvPr>
@@ -5505,7 +5505,7 @@
             <p:cNvPr id="49" name="Gruppieren 48">
               <a:extLst>
                 <a:ext uri="{FF2B5EF4-FFF2-40B4-BE49-F238E27FC236}">
-                  <a16:creationId xmlns:a16="http://schemas.microsoft.com/office/drawing/2014/main" xmlns="" id="{A4165298-8979-468F-82D7-3EFB21516A52}"/>
+                  <a16:creationId xmlns="" xmlns:a16="http://schemas.microsoft.com/office/drawing/2014/main" id="{A4165298-8979-468F-82D7-3EFB21516A52}"/>
                 </a:ext>
               </a:extLst>
             </p:cNvPr>
@@ -5525,7 +5525,7 @@
               <p:cNvPr id="50" name="Rechteck: obere Ecken abgerundet 49">
                 <a:extLst>
                   <a:ext uri="{FF2B5EF4-FFF2-40B4-BE49-F238E27FC236}">
-                    <a16:creationId xmlns:a16="http://schemas.microsoft.com/office/drawing/2014/main" xmlns="" id="{ABFC1CDB-641A-4B2F-8E6C-338E7E3F6625}"/>
+                    <a16:creationId xmlns="" xmlns:a16="http://schemas.microsoft.com/office/drawing/2014/main" id="{ABFC1CDB-641A-4B2F-8E6C-338E7E3F6625}"/>
                   </a:ext>
                 </a:extLst>
               </p:cNvPr>
@@ -5584,7 +5584,7 @@
               <p:cNvPr id="51" name="Ellipse 50">
                 <a:extLst>
                   <a:ext uri="{FF2B5EF4-FFF2-40B4-BE49-F238E27FC236}">
-                    <a16:creationId xmlns:a16="http://schemas.microsoft.com/office/drawing/2014/main" xmlns="" id="{1EB558F7-EF06-4682-AB88-C3E37A0B5DE1}"/>
+                    <a16:creationId xmlns="" xmlns:a16="http://schemas.microsoft.com/office/drawing/2014/main" id="{1EB558F7-EF06-4682-AB88-C3E37A0B5DE1}"/>
                   </a:ext>
                 </a:extLst>
               </p:cNvPr>
@@ -5642,7 +5642,7 @@
           <p:cNvPr id="90" name="Gruppieren 89">
             <a:extLst>
               <a:ext uri="{FF2B5EF4-FFF2-40B4-BE49-F238E27FC236}">
-                <a16:creationId xmlns:a16="http://schemas.microsoft.com/office/drawing/2014/main" xmlns="" id="{D950DAE2-B285-4EBF-A8FC-1AAE131C97B2}"/>
+                <a16:creationId xmlns="" xmlns:a16="http://schemas.microsoft.com/office/drawing/2014/main" id="{D950DAE2-B285-4EBF-A8FC-1AAE131C97B2}"/>
               </a:ext>
             </a:extLst>
           </p:cNvPr>
@@ -5662,7 +5662,7 @@
             <p:cNvPr id="55" name="Gruppieren 54">
               <a:extLst>
                 <a:ext uri="{FF2B5EF4-FFF2-40B4-BE49-F238E27FC236}">
-                  <a16:creationId xmlns:a16="http://schemas.microsoft.com/office/drawing/2014/main" xmlns="" id="{7C529067-6DCC-4976-87F4-BEAC46291249}"/>
+                  <a16:creationId xmlns="" xmlns:a16="http://schemas.microsoft.com/office/drawing/2014/main" id="{7C529067-6DCC-4976-87F4-BEAC46291249}"/>
                 </a:ext>
               </a:extLst>
             </p:cNvPr>
@@ -5682,7 +5682,7 @@
               <p:cNvPr id="56" name="Rechteck: obere Ecken abgerundet 55">
                 <a:extLst>
                   <a:ext uri="{FF2B5EF4-FFF2-40B4-BE49-F238E27FC236}">
-                    <a16:creationId xmlns:a16="http://schemas.microsoft.com/office/drawing/2014/main" xmlns="" id="{86F7B514-4556-48AE-85CC-AF876AFB30EC}"/>
+                    <a16:creationId xmlns="" xmlns:a16="http://schemas.microsoft.com/office/drawing/2014/main" id="{86F7B514-4556-48AE-85CC-AF876AFB30EC}"/>
                   </a:ext>
                 </a:extLst>
               </p:cNvPr>
@@ -5741,7 +5741,7 @@
               <p:cNvPr id="57" name="Ellipse 56">
                 <a:extLst>
                   <a:ext uri="{FF2B5EF4-FFF2-40B4-BE49-F238E27FC236}">
-                    <a16:creationId xmlns:a16="http://schemas.microsoft.com/office/drawing/2014/main" xmlns="" id="{193EFBED-4EF6-40FA-89FF-F22C9065A059}"/>
+                    <a16:creationId xmlns="" xmlns:a16="http://schemas.microsoft.com/office/drawing/2014/main" id="{193EFBED-4EF6-40FA-89FF-F22C9065A059}"/>
                   </a:ext>
                 </a:extLst>
               </p:cNvPr>
@@ -5798,7 +5798,7 @@
             <p:cNvPr id="58" name="Rechteck: abgerundete Ecken 57">
               <a:extLst>
                 <a:ext uri="{FF2B5EF4-FFF2-40B4-BE49-F238E27FC236}">
-                  <a16:creationId xmlns:a16="http://schemas.microsoft.com/office/drawing/2014/main" xmlns="" id="{49E45ED3-067D-4246-B13B-C5F56D930E80}"/>
+                  <a16:creationId xmlns="" xmlns:a16="http://schemas.microsoft.com/office/drawing/2014/main" id="{49E45ED3-067D-4246-B13B-C5F56D930E80}"/>
                 </a:ext>
               </a:extLst>
             </p:cNvPr>
@@ -5861,7 +5861,7 @@
             <p:cNvPr id="60" name="Textfeld 59">
               <a:extLst>
                 <a:ext uri="{FF2B5EF4-FFF2-40B4-BE49-F238E27FC236}">
-                  <a16:creationId xmlns:a16="http://schemas.microsoft.com/office/drawing/2014/main" xmlns="" id="{95515A46-0A60-456B-9E22-551E6971C1FD}"/>
+                  <a16:creationId xmlns="" xmlns:a16="http://schemas.microsoft.com/office/drawing/2014/main" id="{95515A46-0A60-456B-9E22-551E6971C1FD}"/>
                 </a:ext>
               </a:extLst>
             </p:cNvPr>
@@ -5896,7 +5896,7 @@
             <p:cNvPr id="61" name="Textfeld 60">
               <a:extLst>
                 <a:ext uri="{FF2B5EF4-FFF2-40B4-BE49-F238E27FC236}">
-                  <a16:creationId xmlns:a16="http://schemas.microsoft.com/office/drawing/2014/main" xmlns="" id="{3BF283B3-8A47-4F17-B31B-07AC7E4E0DB7}"/>
+                  <a16:creationId xmlns="" xmlns:a16="http://schemas.microsoft.com/office/drawing/2014/main" id="{3BF283B3-8A47-4F17-B31B-07AC7E4E0DB7}"/>
                 </a:ext>
               </a:extLst>
             </p:cNvPr>
@@ -5931,7 +5931,7 @@
             <p:cNvPr id="62" name="Gruppieren 61">
               <a:extLst>
                 <a:ext uri="{FF2B5EF4-FFF2-40B4-BE49-F238E27FC236}">
-                  <a16:creationId xmlns:a16="http://schemas.microsoft.com/office/drawing/2014/main" xmlns="" id="{C5632381-62AF-41AD-A0E7-C897FC4CCC30}"/>
+                  <a16:creationId xmlns="" xmlns:a16="http://schemas.microsoft.com/office/drawing/2014/main" id="{C5632381-62AF-41AD-A0E7-C897FC4CCC30}"/>
                 </a:ext>
               </a:extLst>
             </p:cNvPr>
@@ -5951,7 +5951,7 @@
               <p:cNvPr id="63" name="Rechteck: obere Ecken abgerundet 62">
                 <a:extLst>
                   <a:ext uri="{FF2B5EF4-FFF2-40B4-BE49-F238E27FC236}">
-                    <a16:creationId xmlns:a16="http://schemas.microsoft.com/office/drawing/2014/main" xmlns="" id="{DFBB5A90-21BB-4893-AF46-DFDEA165261B}"/>
+                    <a16:creationId xmlns="" xmlns:a16="http://schemas.microsoft.com/office/drawing/2014/main" id="{DFBB5A90-21BB-4893-AF46-DFDEA165261B}"/>
                   </a:ext>
                 </a:extLst>
               </p:cNvPr>
@@ -6010,7 +6010,7 @@
               <p:cNvPr id="64" name="Ellipse 63">
                 <a:extLst>
                   <a:ext uri="{FF2B5EF4-FFF2-40B4-BE49-F238E27FC236}">
-                    <a16:creationId xmlns:a16="http://schemas.microsoft.com/office/drawing/2014/main" xmlns="" id="{5CF91120-58AF-4E16-AC01-2B7977E96552}"/>
+                    <a16:creationId xmlns="" xmlns:a16="http://schemas.microsoft.com/office/drawing/2014/main" id="{5CF91120-58AF-4E16-AC01-2B7977E96552}"/>
                   </a:ext>
                 </a:extLst>
               </p:cNvPr>
@@ -6067,7 +6067,7 @@
             <p:cNvPr id="65" name="Rechteck: abgerundete Ecken 64">
               <a:extLst>
                 <a:ext uri="{FF2B5EF4-FFF2-40B4-BE49-F238E27FC236}">
-                  <a16:creationId xmlns:a16="http://schemas.microsoft.com/office/drawing/2014/main" xmlns="" id="{E5397E03-9002-4C27-852B-0E0EF4487837}"/>
+                  <a16:creationId xmlns="" xmlns:a16="http://schemas.microsoft.com/office/drawing/2014/main" id="{E5397E03-9002-4C27-852B-0E0EF4487837}"/>
                 </a:ext>
               </a:extLst>
             </p:cNvPr>
@@ -6130,7 +6130,7 @@
             <p:cNvPr id="66" name="Textfeld 65">
               <a:extLst>
                 <a:ext uri="{FF2B5EF4-FFF2-40B4-BE49-F238E27FC236}">
-                  <a16:creationId xmlns:a16="http://schemas.microsoft.com/office/drawing/2014/main" xmlns="" id="{E67F00E2-BAF7-4B8D-863E-8F35A0B7B1B2}"/>
+                  <a16:creationId xmlns="" xmlns:a16="http://schemas.microsoft.com/office/drawing/2014/main" id="{E67F00E2-BAF7-4B8D-863E-8F35A0B7B1B2}"/>
                 </a:ext>
               </a:extLst>
             </p:cNvPr>
@@ -6165,7 +6165,7 @@
             <p:cNvPr id="67" name="Textfeld 66">
               <a:extLst>
                 <a:ext uri="{FF2B5EF4-FFF2-40B4-BE49-F238E27FC236}">
-                  <a16:creationId xmlns:a16="http://schemas.microsoft.com/office/drawing/2014/main" xmlns="" id="{BC34DDE6-7F52-4425-9F97-269201EAB402}"/>
+                  <a16:creationId xmlns="" xmlns:a16="http://schemas.microsoft.com/office/drawing/2014/main" id="{BC34DDE6-7F52-4425-9F97-269201EAB402}"/>
                 </a:ext>
               </a:extLst>
             </p:cNvPr>
@@ -6200,7 +6200,7 @@
             <p:cNvPr id="69" name="Rechteck: abgerundete Ecken 68">
               <a:extLst>
                 <a:ext uri="{FF2B5EF4-FFF2-40B4-BE49-F238E27FC236}">
-                  <a16:creationId xmlns:a16="http://schemas.microsoft.com/office/drawing/2014/main" xmlns="" id="{59C00337-32C6-46C5-B7D1-1958E7C89BD2}"/>
+                  <a16:creationId xmlns="" xmlns:a16="http://schemas.microsoft.com/office/drawing/2014/main" id="{59C00337-32C6-46C5-B7D1-1958E7C89BD2}"/>
                 </a:ext>
               </a:extLst>
             </p:cNvPr>
@@ -6263,7 +6263,7 @@
             <p:cNvPr id="70" name="Gruppieren 69">
               <a:extLst>
                 <a:ext uri="{FF2B5EF4-FFF2-40B4-BE49-F238E27FC236}">
-                  <a16:creationId xmlns:a16="http://schemas.microsoft.com/office/drawing/2014/main" xmlns="" id="{27634134-E9EB-4F8C-AE47-0F526C7CB793}"/>
+                  <a16:creationId xmlns="" xmlns:a16="http://schemas.microsoft.com/office/drawing/2014/main" id="{27634134-E9EB-4F8C-AE47-0F526C7CB793}"/>
                 </a:ext>
               </a:extLst>
             </p:cNvPr>
@@ -6283,7 +6283,7 @@
               <p:cNvPr id="71" name="Rechteck: obere Ecken abgerundet 70">
                 <a:extLst>
                   <a:ext uri="{FF2B5EF4-FFF2-40B4-BE49-F238E27FC236}">
-                    <a16:creationId xmlns:a16="http://schemas.microsoft.com/office/drawing/2014/main" xmlns="" id="{0B7E16FC-1936-47B8-9FB5-B75CB8117EE8}"/>
+                    <a16:creationId xmlns="" xmlns:a16="http://schemas.microsoft.com/office/drawing/2014/main" id="{0B7E16FC-1936-47B8-9FB5-B75CB8117EE8}"/>
                   </a:ext>
                 </a:extLst>
               </p:cNvPr>
@@ -6342,7 +6342,7 @@
               <p:cNvPr id="72" name="Ellipse 71">
                 <a:extLst>
                   <a:ext uri="{FF2B5EF4-FFF2-40B4-BE49-F238E27FC236}">
-                    <a16:creationId xmlns:a16="http://schemas.microsoft.com/office/drawing/2014/main" xmlns="" id="{89F04DED-70C5-4505-955F-93A4ABA024CA}"/>
+                    <a16:creationId xmlns="" xmlns:a16="http://schemas.microsoft.com/office/drawing/2014/main" id="{89F04DED-70C5-4505-955F-93A4ABA024CA}"/>
                   </a:ext>
                 </a:extLst>
               </p:cNvPr>
@@ -6399,7 +6399,7 @@
             <p:cNvPr id="73" name="Rechteck: abgerundete Ecken 72">
               <a:extLst>
                 <a:ext uri="{FF2B5EF4-FFF2-40B4-BE49-F238E27FC236}">
-                  <a16:creationId xmlns:a16="http://schemas.microsoft.com/office/drawing/2014/main" xmlns="" id="{77FD0564-CBD1-41EE-9279-FBA2E4A04EB1}"/>
+                  <a16:creationId xmlns="" xmlns:a16="http://schemas.microsoft.com/office/drawing/2014/main" id="{77FD0564-CBD1-41EE-9279-FBA2E4A04EB1}"/>
                 </a:ext>
               </a:extLst>
             </p:cNvPr>
@@ -6462,7 +6462,7 @@
             <p:cNvPr id="74" name="Gruppieren 73">
               <a:extLst>
                 <a:ext uri="{FF2B5EF4-FFF2-40B4-BE49-F238E27FC236}">
-                  <a16:creationId xmlns:a16="http://schemas.microsoft.com/office/drawing/2014/main" xmlns="" id="{EA1FA1FA-9BFE-4C42-B329-440D206B9DEB}"/>
+                  <a16:creationId xmlns="" xmlns:a16="http://schemas.microsoft.com/office/drawing/2014/main" id="{EA1FA1FA-9BFE-4C42-B329-440D206B9DEB}"/>
                 </a:ext>
               </a:extLst>
             </p:cNvPr>
@@ -6482,7 +6482,7 @@
               <p:cNvPr id="75" name="Rechteck: obere Ecken abgerundet 74">
                 <a:extLst>
                   <a:ext uri="{FF2B5EF4-FFF2-40B4-BE49-F238E27FC236}">
-                    <a16:creationId xmlns:a16="http://schemas.microsoft.com/office/drawing/2014/main" xmlns="" id="{007A5BE8-DB3E-4835-B951-9F9BD199F518}"/>
+                    <a16:creationId xmlns="" xmlns:a16="http://schemas.microsoft.com/office/drawing/2014/main" id="{007A5BE8-DB3E-4835-B951-9F9BD199F518}"/>
                   </a:ext>
                 </a:extLst>
               </p:cNvPr>
@@ -6541,7 +6541,7 @@
               <p:cNvPr id="76" name="Ellipse 75">
                 <a:extLst>
                   <a:ext uri="{FF2B5EF4-FFF2-40B4-BE49-F238E27FC236}">
-                    <a16:creationId xmlns:a16="http://schemas.microsoft.com/office/drawing/2014/main" xmlns="" id="{C608C56B-9D96-4DD0-8137-D0ADF93E869B}"/>
+                    <a16:creationId xmlns="" xmlns:a16="http://schemas.microsoft.com/office/drawing/2014/main" id="{C608C56B-9D96-4DD0-8137-D0ADF93E869B}"/>
                   </a:ext>
                 </a:extLst>
               </p:cNvPr>
@@ -6599,7 +6599,7 @@
           <p:cNvPr id="80" name="Titel 1">
             <a:extLst>
               <a:ext uri="{FF2B5EF4-FFF2-40B4-BE49-F238E27FC236}">
-                <a16:creationId xmlns:a16="http://schemas.microsoft.com/office/drawing/2014/main" xmlns="" id="{1DC5EA29-B20F-4E40-9060-547F40A617DB}"/>
+                <a16:creationId xmlns="" xmlns:a16="http://schemas.microsoft.com/office/drawing/2014/main" id="{1DC5EA29-B20F-4E40-9060-547F40A617DB}"/>
               </a:ext>
             </a:extLst>
           </p:cNvPr>
@@ -6632,7 +6632,7 @@
           <p:cNvPr id="83" name="Grafik 82">
             <a:extLst>
               <a:ext uri="{FF2B5EF4-FFF2-40B4-BE49-F238E27FC236}">
-                <a16:creationId xmlns:a16="http://schemas.microsoft.com/office/drawing/2014/main" xmlns="" id="{EBF1A908-3658-45E9-9375-2406DEB9FD5E}"/>
+                <a16:creationId xmlns="" xmlns:a16="http://schemas.microsoft.com/office/drawing/2014/main" id="{EBF1A908-3658-45E9-9375-2406DEB9FD5E}"/>
               </a:ext>
             </a:extLst>
           </p:cNvPr>
@@ -6668,7 +6668,7 @@
           <p:cNvPr id="87" name="Textfeld 86">
             <a:extLst>
               <a:ext uri="{FF2B5EF4-FFF2-40B4-BE49-F238E27FC236}">
-                <a16:creationId xmlns:a16="http://schemas.microsoft.com/office/drawing/2014/main" xmlns="" id="{A9D04EAB-0599-46D9-916A-50A1E611D79B}"/>
+                <a16:creationId xmlns="" xmlns:a16="http://schemas.microsoft.com/office/drawing/2014/main" id="{A9D04EAB-0599-46D9-916A-50A1E611D79B}"/>
               </a:ext>
             </a:extLst>
           </p:cNvPr>
@@ -6988,7 +6988,7 @@
           <p:cNvPr id="4" name="Grafik 3">
             <a:extLst>
               <a:ext uri="{FF2B5EF4-FFF2-40B4-BE49-F238E27FC236}">
-                <a16:creationId xmlns:a16="http://schemas.microsoft.com/office/drawing/2014/main" xmlns="" id="{F99A212A-4427-4D63-83C6-A504D8957438}"/>
+                <a16:creationId xmlns="" xmlns:a16="http://schemas.microsoft.com/office/drawing/2014/main" id="{F99A212A-4427-4D63-83C6-A504D8957438}"/>
               </a:ext>
             </a:extLst>
           </p:cNvPr>
@@ -7023,7 +7023,7 @@
           <p:cNvPr id="6" name="Titel 1">
             <a:extLst>
               <a:ext uri="{FF2B5EF4-FFF2-40B4-BE49-F238E27FC236}">
-                <a16:creationId xmlns:a16="http://schemas.microsoft.com/office/drawing/2014/main" xmlns="" id="{C5AA3EC1-2448-468A-AE92-790677090544}"/>
+                <a16:creationId xmlns="" xmlns:a16="http://schemas.microsoft.com/office/drawing/2014/main" id="{C5AA3EC1-2448-468A-AE92-790677090544}"/>
               </a:ext>
             </a:extLst>
           </p:cNvPr>
@@ -7056,7 +7056,7 @@
           <p:cNvPr id="7" name="Grafik 6">
             <a:extLst>
               <a:ext uri="{FF2B5EF4-FFF2-40B4-BE49-F238E27FC236}">
-                <a16:creationId xmlns:a16="http://schemas.microsoft.com/office/drawing/2014/main" xmlns="" id="{D83DB4C8-7F6F-44A6-B6B6-CF84179EF2FD}"/>
+                <a16:creationId xmlns="" xmlns:a16="http://schemas.microsoft.com/office/drawing/2014/main" id="{D83DB4C8-7F6F-44A6-B6B6-CF84179EF2FD}"/>
               </a:ext>
             </a:extLst>
           </p:cNvPr>
@@ -7129,7 +7129,7 @@
           <p:cNvPr id="6" name="Titel 1">
             <a:extLst>
               <a:ext uri="{FF2B5EF4-FFF2-40B4-BE49-F238E27FC236}">
-                <a16:creationId xmlns:a16="http://schemas.microsoft.com/office/drawing/2014/main" xmlns="" id="{C5AA3EC1-2448-468A-AE92-790677090544}"/>
+                <a16:creationId xmlns="" xmlns:a16="http://schemas.microsoft.com/office/drawing/2014/main" id="{C5AA3EC1-2448-468A-AE92-790677090544}"/>
               </a:ext>
             </a:extLst>
           </p:cNvPr>
@@ -7162,7 +7162,7 @@
           <p:cNvPr id="7" name="Grafik 6">
             <a:extLst>
               <a:ext uri="{FF2B5EF4-FFF2-40B4-BE49-F238E27FC236}">
-                <a16:creationId xmlns:a16="http://schemas.microsoft.com/office/drawing/2014/main" xmlns="" id="{D83DB4C8-7F6F-44A6-B6B6-CF84179EF2FD}"/>
+                <a16:creationId xmlns="" xmlns:a16="http://schemas.microsoft.com/office/drawing/2014/main" id="{D83DB4C8-7F6F-44A6-B6B6-CF84179EF2FD}"/>
               </a:ext>
             </a:extLst>
           </p:cNvPr>
@@ -7198,7 +7198,7 @@
           <p:cNvPr id="5" name="Grafik 4">
             <a:extLst>
               <a:ext uri="{FF2B5EF4-FFF2-40B4-BE49-F238E27FC236}">
-                <a16:creationId xmlns:a16="http://schemas.microsoft.com/office/drawing/2014/main" xmlns="" id="{631A1F56-4742-4B93-AF31-9A95193C91B4}"/>
+                <a16:creationId xmlns="" xmlns:a16="http://schemas.microsoft.com/office/drawing/2014/main" id="{631A1F56-4742-4B93-AF31-9A95193C91B4}"/>
               </a:ext>
             </a:extLst>
           </p:cNvPr>
@@ -7270,7 +7270,7 @@
           <p:cNvPr id="5" name="Titel 1">
             <a:extLst>
               <a:ext uri="{FF2B5EF4-FFF2-40B4-BE49-F238E27FC236}">
-                <a16:creationId xmlns:a16="http://schemas.microsoft.com/office/drawing/2014/main" xmlns="" id="{0414DF75-E692-43F3-A07F-F54CE7C528ED}"/>
+                <a16:creationId xmlns="" xmlns:a16="http://schemas.microsoft.com/office/drawing/2014/main" id="{0414DF75-E692-43F3-A07F-F54CE7C528ED}"/>
               </a:ext>
             </a:extLst>
           </p:cNvPr>
@@ -7303,7 +7303,7 @@
           <p:cNvPr id="6" name="Grafik 5">
             <a:extLst>
               <a:ext uri="{FF2B5EF4-FFF2-40B4-BE49-F238E27FC236}">
-                <a16:creationId xmlns:a16="http://schemas.microsoft.com/office/drawing/2014/main" xmlns="" id="{024FC5CC-B75F-4D21-9FAB-EA7C81B69608}"/>
+                <a16:creationId xmlns="" xmlns:a16="http://schemas.microsoft.com/office/drawing/2014/main" id="{024FC5CC-B75F-4D21-9FAB-EA7C81B69608}"/>
               </a:ext>
             </a:extLst>
           </p:cNvPr>
@@ -7339,7 +7339,7 @@
           <p:cNvPr id="7" name="Grafik 6">
             <a:extLst>
               <a:ext uri="{FF2B5EF4-FFF2-40B4-BE49-F238E27FC236}">
-                <a16:creationId xmlns:a16="http://schemas.microsoft.com/office/drawing/2014/main" xmlns="" id="{A8BCC594-BA8B-4E23-88F7-4912FD10579E}"/>
+                <a16:creationId xmlns="" xmlns:a16="http://schemas.microsoft.com/office/drawing/2014/main" id="{A8BCC594-BA8B-4E23-88F7-4912FD10579E}"/>
               </a:ext>
             </a:extLst>
           </p:cNvPr>
@@ -7411,7 +7411,7 @@
           <p:cNvPr id="4" name="Grafik 3">
             <a:extLst>
               <a:ext uri="{FF2B5EF4-FFF2-40B4-BE49-F238E27FC236}">
-                <a16:creationId xmlns:a16="http://schemas.microsoft.com/office/drawing/2014/main" xmlns="" id="{F987C00E-C416-4040-BDF4-D1E96CD1B20D}"/>
+                <a16:creationId xmlns="" xmlns:a16="http://schemas.microsoft.com/office/drawing/2014/main" id="{F987C00E-C416-4040-BDF4-D1E96CD1B20D}"/>
               </a:ext>
             </a:extLst>
           </p:cNvPr>
@@ -7446,7 +7446,7 @@
           <p:cNvPr id="5" name="Titel 1">
             <a:extLst>
               <a:ext uri="{FF2B5EF4-FFF2-40B4-BE49-F238E27FC236}">
-                <a16:creationId xmlns:a16="http://schemas.microsoft.com/office/drawing/2014/main" xmlns="" id="{0414DF75-E692-43F3-A07F-F54CE7C528ED}"/>
+                <a16:creationId xmlns="" xmlns:a16="http://schemas.microsoft.com/office/drawing/2014/main" id="{0414DF75-E692-43F3-A07F-F54CE7C528ED}"/>
               </a:ext>
             </a:extLst>
           </p:cNvPr>
@@ -7479,7 +7479,7 @@
           <p:cNvPr id="6" name="Grafik 5">
             <a:extLst>
               <a:ext uri="{FF2B5EF4-FFF2-40B4-BE49-F238E27FC236}">
-                <a16:creationId xmlns:a16="http://schemas.microsoft.com/office/drawing/2014/main" xmlns="" id="{024FC5CC-B75F-4D21-9FAB-EA7C81B69608}"/>
+                <a16:creationId xmlns="" xmlns:a16="http://schemas.microsoft.com/office/drawing/2014/main" id="{024FC5CC-B75F-4D21-9FAB-EA7C81B69608}"/>
               </a:ext>
             </a:extLst>
           </p:cNvPr>
@@ -7552,7 +7552,7 @@
           <p:cNvPr id="4" name="Titel 1">
             <a:extLst>
               <a:ext uri="{FF2B5EF4-FFF2-40B4-BE49-F238E27FC236}">
-                <a16:creationId xmlns:a16="http://schemas.microsoft.com/office/drawing/2014/main" xmlns="" id="{B453ED61-2837-4DEE-AD29-85C425BDB7F2}"/>
+                <a16:creationId xmlns="" xmlns:a16="http://schemas.microsoft.com/office/drawing/2014/main" id="{B453ED61-2837-4DEE-AD29-85C425BDB7F2}"/>
               </a:ext>
             </a:extLst>
           </p:cNvPr>
@@ -7589,7 +7589,7 @@
           <p:cNvPr id="5" name="Grafik 4">
             <a:extLst>
               <a:ext uri="{FF2B5EF4-FFF2-40B4-BE49-F238E27FC236}">
-                <a16:creationId xmlns:a16="http://schemas.microsoft.com/office/drawing/2014/main" xmlns="" id="{02B10405-AFC8-4F9A-9AA1-FA1B927D035C}"/>
+                <a16:creationId xmlns="" xmlns:a16="http://schemas.microsoft.com/office/drawing/2014/main" id="{02B10405-AFC8-4F9A-9AA1-FA1B927D035C}"/>
               </a:ext>
             </a:extLst>
           </p:cNvPr>
@@ -7619,7 +7619,7 @@
           <p:cNvPr id="6" name="Grafik 5">
             <a:extLst>
               <a:ext uri="{FF2B5EF4-FFF2-40B4-BE49-F238E27FC236}">
-                <a16:creationId xmlns:a16="http://schemas.microsoft.com/office/drawing/2014/main" xmlns="" id="{D9C7537E-64D7-43A8-8157-EC73AF934240}"/>
+                <a16:creationId xmlns="" xmlns:a16="http://schemas.microsoft.com/office/drawing/2014/main" id="{D9C7537E-64D7-43A8-8157-EC73AF934240}"/>
               </a:ext>
             </a:extLst>
           </p:cNvPr>
@@ -7649,7 +7649,7 @@
           <p:cNvPr id="7" name="Titel 1">
             <a:extLst>
               <a:ext uri="{FF2B5EF4-FFF2-40B4-BE49-F238E27FC236}">
-                <a16:creationId xmlns:a16="http://schemas.microsoft.com/office/drawing/2014/main" xmlns="" id="{28F53DE5-130F-457C-98E6-913F8625A286}"/>
+                <a16:creationId xmlns="" xmlns:a16="http://schemas.microsoft.com/office/drawing/2014/main" id="{28F53DE5-130F-457C-98E6-913F8625A286}"/>
               </a:ext>
             </a:extLst>
           </p:cNvPr>
@@ -7708,7 +7708,7 @@
           <p:cNvPr id="8" name="Grafik 7">
             <a:extLst>
               <a:ext uri="{FF2B5EF4-FFF2-40B4-BE49-F238E27FC236}">
-                <a16:creationId xmlns:a16="http://schemas.microsoft.com/office/drawing/2014/main" xmlns="" id="{A27FA97B-067D-4ECA-87C9-032C32C555A9}"/>
+                <a16:creationId xmlns="" xmlns:a16="http://schemas.microsoft.com/office/drawing/2014/main" id="{A27FA97B-067D-4ECA-87C9-032C32C555A9}"/>
               </a:ext>
             </a:extLst>
           </p:cNvPr>
@@ -7738,7 +7738,7 @@
           <p:cNvPr id="9" name="Titel 1">
             <a:extLst>
               <a:ext uri="{FF2B5EF4-FFF2-40B4-BE49-F238E27FC236}">
-                <a16:creationId xmlns:a16="http://schemas.microsoft.com/office/drawing/2014/main" xmlns="" id="{F98DFF16-ED47-410C-9843-929F061E6A8E}"/>
+                <a16:creationId xmlns="" xmlns:a16="http://schemas.microsoft.com/office/drawing/2014/main" id="{F98DFF16-ED47-410C-9843-929F061E6A8E}"/>
               </a:ext>
             </a:extLst>
           </p:cNvPr>
@@ -8005,7 +8005,7 @@
           <p:cNvPr id="2" name="Titel 1">
             <a:extLst>
               <a:ext uri="{FF2B5EF4-FFF2-40B4-BE49-F238E27FC236}">
-                <a16:creationId xmlns:a16="http://schemas.microsoft.com/office/drawing/2014/main" xmlns="" id="{77054662-E199-4C6D-9DD9-F99ADD6B70CB}"/>
+                <a16:creationId xmlns="" xmlns:a16="http://schemas.microsoft.com/office/drawing/2014/main" id="{77054662-E199-4C6D-9DD9-F99ADD6B70CB}"/>
               </a:ext>
             </a:extLst>
           </p:cNvPr>
@@ -8038,7 +8038,7 @@
           <p:cNvPr id="7" name="Grafik 6">
             <a:extLst>
               <a:ext uri="{FF2B5EF4-FFF2-40B4-BE49-F238E27FC236}">
-                <a16:creationId xmlns:a16="http://schemas.microsoft.com/office/drawing/2014/main" xmlns="" id="{7B5E6D19-7F31-41E6-B4C5-CE1265229A06}"/>
+                <a16:creationId xmlns="" xmlns:a16="http://schemas.microsoft.com/office/drawing/2014/main" id="{7B5E6D19-7F31-41E6-B4C5-CE1265229A06}"/>
               </a:ext>
             </a:extLst>
           </p:cNvPr>
@@ -8378,7 +8378,75 @@
   <p:timing>
     <p:tnLst>
       <p:par>
-        <p:cTn id="1" dur="indefinite" restart="never" nodeType="tmRoot"/>
+        <p:cTn id="1" dur="indefinite" restart="never" nodeType="tmRoot">
+          <p:childTnLst>
+            <p:seq concurrent="1" nextAc="seek">
+              <p:cTn id="2" dur="indefinite" nodeType="mainSeq">
+                <p:childTnLst>
+                  <p:par>
+                    <p:cTn id="3" fill="hold">
+                      <p:stCondLst>
+                        <p:cond delay="indefinite"/>
+                      </p:stCondLst>
+                      <p:childTnLst>
+                        <p:par>
+                          <p:cTn id="4" fill="hold">
+                            <p:stCondLst>
+                              <p:cond delay="0"/>
+                            </p:stCondLst>
+                            <p:childTnLst>
+                              <p:par>
+                                <p:cTn id="5" presetID="1" presetClass="entr" presetSubtype="0" fill="hold" nodeType="clickEffect">
+                                  <p:stCondLst>
+                                    <p:cond delay="0"/>
+                                  </p:stCondLst>
+                                  <p:childTnLst>
+                                    <p:set>
+                                      <p:cBhvr>
+                                        <p:cTn id="6" dur="1" fill="hold">
+                                          <p:stCondLst>
+                                            <p:cond delay="0"/>
+                                          </p:stCondLst>
+                                        </p:cTn>
+                                        <p:tgtEl>
+                                          <p:spTgt spid="5"/>
+                                        </p:tgtEl>
+                                        <p:attrNameLst>
+                                          <p:attrName>style.visibility</p:attrName>
+                                        </p:attrNameLst>
+                                      </p:cBhvr>
+                                      <p:to>
+                                        <p:strVal val="visible"/>
+                                      </p:to>
+                                    </p:set>
+                                  </p:childTnLst>
+                                </p:cTn>
+                              </p:par>
+                            </p:childTnLst>
+                          </p:cTn>
+                        </p:par>
+                      </p:childTnLst>
+                    </p:cTn>
+                  </p:par>
+                </p:childTnLst>
+              </p:cTn>
+              <p:prevCondLst>
+                <p:cond evt="onPrev" delay="0">
+                  <p:tgtEl>
+                    <p:sldTgt/>
+                  </p:tgtEl>
+                </p:cond>
+              </p:prevCondLst>
+              <p:nextCondLst>
+                <p:cond evt="onNext" delay="0">
+                  <p:tgtEl>
+                    <p:sldTgt/>
+                  </p:tgtEl>
+                </p:cond>
+              </p:nextCondLst>
+            </p:seq>
+          </p:childTnLst>
+        </p:cTn>
       </p:par>
     </p:tnLst>
   </p:timing>
@@ -8407,7 +8475,7 @@
           <p:cNvPr id="2" name="Titel 1">
             <a:extLst>
               <a:ext uri="{FF2B5EF4-FFF2-40B4-BE49-F238E27FC236}">
-                <a16:creationId xmlns:a16="http://schemas.microsoft.com/office/drawing/2014/main" xmlns="" id="{77054662-E199-4C6D-9DD9-F99ADD6B70CB}"/>
+                <a16:creationId xmlns="" xmlns:a16="http://schemas.microsoft.com/office/drawing/2014/main" id="{77054662-E199-4C6D-9DD9-F99ADD6B70CB}"/>
               </a:ext>
             </a:extLst>
           </p:cNvPr>
@@ -8440,7 +8508,7 @@
           <p:cNvPr id="5" name="Grafik 4">
             <a:extLst>
               <a:ext uri="{FF2B5EF4-FFF2-40B4-BE49-F238E27FC236}">
-                <a16:creationId xmlns:a16="http://schemas.microsoft.com/office/drawing/2014/main" xmlns="" id="{C187BA4A-6C36-4ACB-B033-CA98382373C3}"/>
+                <a16:creationId xmlns="" xmlns:a16="http://schemas.microsoft.com/office/drawing/2014/main" id="{C187BA4A-6C36-4ACB-B033-CA98382373C3}"/>
               </a:ext>
             </a:extLst>
           </p:cNvPr>
@@ -8470,7 +8538,7 @@
           <p:cNvPr id="4" name="Grafik 3">
             <a:extLst>
               <a:ext uri="{FF2B5EF4-FFF2-40B4-BE49-F238E27FC236}">
-                <a16:creationId xmlns:a16="http://schemas.microsoft.com/office/drawing/2014/main" xmlns="" id="{6320A846-85B1-41B0-96C6-C56AF057F189}"/>
+                <a16:creationId xmlns="" xmlns:a16="http://schemas.microsoft.com/office/drawing/2014/main" id="{6320A846-85B1-41B0-96C6-C56AF057F189}"/>
               </a:ext>
             </a:extLst>
           </p:cNvPr>
@@ -8510,7 +8578,7 @@
           <p:cNvPr id="7" name="Rechteck 6">
             <a:extLst>
               <a:ext uri="{FF2B5EF4-FFF2-40B4-BE49-F238E27FC236}">
-                <a16:creationId xmlns:a16="http://schemas.microsoft.com/office/drawing/2014/main" xmlns="" id="{F96427ED-6524-473D-8E20-B2DA03F37926}"/>
+                <a16:creationId xmlns="" xmlns:a16="http://schemas.microsoft.com/office/drawing/2014/main" id="{F96427ED-6524-473D-8E20-B2DA03F37926}"/>
               </a:ext>
             </a:extLst>
           </p:cNvPr>
@@ -8667,7 +8735,7 @@
           <p:cNvPr id="2" name="Titel 1">
             <a:extLst>
               <a:ext uri="{FF2B5EF4-FFF2-40B4-BE49-F238E27FC236}">
-                <a16:creationId xmlns:a16="http://schemas.microsoft.com/office/drawing/2014/main" xmlns="" id="{77054662-E199-4C6D-9DD9-F99ADD6B70CB}"/>
+                <a16:creationId xmlns="" xmlns:a16="http://schemas.microsoft.com/office/drawing/2014/main" id="{77054662-E199-4C6D-9DD9-F99ADD6B70CB}"/>
               </a:ext>
             </a:extLst>
           </p:cNvPr>
@@ -8700,7 +8768,7 @@
           <p:cNvPr id="5" name="Grafik 4">
             <a:extLst>
               <a:ext uri="{FF2B5EF4-FFF2-40B4-BE49-F238E27FC236}">
-                <a16:creationId xmlns:a16="http://schemas.microsoft.com/office/drawing/2014/main" xmlns="" id="{C187BA4A-6C36-4ACB-B033-CA98382373C3}"/>
+                <a16:creationId xmlns="" xmlns:a16="http://schemas.microsoft.com/office/drawing/2014/main" id="{C187BA4A-6C36-4ACB-B033-CA98382373C3}"/>
               </a:ext>
             </a:extLst>
           </p:cNvPr>
@@ -8730,7 +8798,7 @@
           <p:cNvPr id="11" name="Grafik 10">
             <a:extLst>
               <a:ext uri="{FF2B5EF4-FFF2-40B4-BE49-F238E27FC236}">
-                <a16:creationId xmlns:a16="http://schemas.microsoft.com/office/drawing/2014/main" xmlns="" id="{2D2C24F1-0807-4A44-A896-6D579E58C8D2}"/>
+                <a16:creationId xmlns="" xmlns:a16="http://schemas.microsoft.com/office/drawing/2014/main" id="{2D2C24F1-0807-4A44-A896-6D579E58C8D2}"/>
               </a:ext>
             </a:extLst>
           </p:cNvPr>
@@ -8803,7 +8871,7 @@
           <p:cNvPr id="2" name="Titel 1">
             <a:extLst>
               <a:ext uri="{FF2B5EF4-FFF2-40B4-BE49-F238E27FC236}">
-                <a16:creationId xmlns:a16="http://schemas.microsoft.com/office/drawing/2014/main" xmlns="" id="{77054662-E199-4C6D-9DD9-F99ADD6B70CB}"/>
+                <a16:creationId xmlns="" xmlns:a16="http://schemas.microsoft.com/office/drawing/2014/main" id="{77054662-E199-4C6D-9DD9-F99ADD6B70CB}"/>
               </a:ext>
             </a:extLst>
           </p:cNvPr>
@@ -8836,7 +8904,7 @@
           <p:cNvPr id="5" name="Grafik 4">
             <a:extLst>
               <a:ext uri="{FF2B5EF4-FFF2-40B4-BE49-F238E27FC236}">
-                <a16:creationId xmlns:a16="http://schemas.microsoft.com/office/drawing/2014/main" xmlns="" id="{C187BA4A-6C36-4ACB-B033-CA98382373C3}"/>
+                <a16:creationId xmlns="" xmlns:a16="http://schemas.microsoft.com/office/drawing/2014/main" id="{C187BA4A-6C36-4ACB-B033-CA98382373C3}"/>
               </a:ext>
             </a:extLst>
           </p:cNvPr>
@@ -8866,7 +8934,7 @@
           <p:cNvPr id="9" name="Grafik 8">
             <a:extLst>
               <a:ext uri="{FF2B5EF4-FFF2-40B4-BE49-F238E27FC236}">
-                <a16:creationId xmlns:a16="http://schemas.microsoft.com/office/drawing/2014/main" xmlns="" id="{CE0D307F-3F68-467A-BEF0-7E4C5AA5056F}"/>
+                <a16:creationId xmlns="" xmlns:a16="http://schemas.microsoft.com/office/drawing/2014/main" id="{CE0D307F-3F68-467A-BEF0-7E4C5AA5056F}"/>
               </a:ext>
             </a:extLst>
           </p:cNvPr>
@@ -8902,7 +8970,7 @@
           <p:cNvPr id="4" name="Pfeil: nach rechts 3">
             <a:extLst>
               <a:ext uri="{FF2B5EF4-FFF2-40B4-BE49-F238E27FC236}">
-                <a16:creationId xmlns:a16="http://schemas.microsoft.com/office/drawing/2014/main" xmlns="" id="{B149E191-5D63-4A59-8508-354EAC11FC71}"/>
+                <a16:creationId xmlns="" xmlns:a16="http://schemas.microsoft.com/office/drawing/2014/main" id="{B149E191-5D63-4A59-8508-354EAC11FC71}"/>
               </a:ext>
             </a:extLst>
           </p:cNvPr>
@@ -8959,7 +9027,7 @@
           <p:cNvPr id="7" name="Grafik 6">
             <a:extLst>
               <a:ext uri="{FF2B5EF4-FFF2-40B4-BE49-F238E27FC236}">
-                <a16:creationId xmlns:a16="http://schemas.microsoft.com/office/drawing/2014/main" xmlns="" id="{A99A5AE1-30AA-4587-9F1F-C91BAAE54BAC}"/>
+                <a16:creationId xmlns="" xmlns:a16="http://schemas.microsoft.com/office/drawing/2014/main" id="{A99A5AE1-30AA-4587-9F1F-C91BAAE54BAC}"/>
               </a:ext>
             </a:extLst>
           </p:cNvPr>
@@ -9103,7 +9171,7 @@
           <p:cNvPr id="2" name="Titel 1">
             <a:extLst>
               <a:ext uri="{FF2B5EF4-FFF2-40B4-BE49-F238E27FC236}">
-                <a16:creationId xmlns:a16="http://schemas.microsoft.com/office/drawing/2014/main" xmlns="" id="{77054662-E199-4C6D-9DD9-F99ADD6B70CB}"/>
+                <a16:creationId xmlns="" xmlns:a16="http://schemas.microsoft.com/office/drawing/2014/main" id="{77054662-E199-4C6D-9DD9-F99ADD6B70CB}"/>
               </a:ext>
             </a:extLst>
           </p:cNvPr>
@@ -9136,7 +9204,7 @@
           <p:cNvPr id="4" name="Grafik 3">
             <a:extLst>
               <a:ext uri="{FF2B5EF4-FFF2-40B4-BE49-F238E27FC236}">
-                <a16:creationId xmlns:a16="http://schemas.microsoft.com/office/drawing/2014/main" xmlns="" id="{2ABF8F8C-E80E-4DE7-AFBD-AC867B5E9134}"/>
+                <a16:creationId xmlns="" xmlns:a16="http://schemas.microsoft.com/office/drawing/2014/main" id="{2ABF8F8C-E80E-4DE7-AFBD-AC867B5E9134}"/>
               </a:ext>
             </a:extLst>
           </p:cNvPr>
@@ -9166,7 +9234,7 @@
           <p:cNvPr id="5" name="Textfeld 4">
             <a:extLst>
               <a:ext uri="{FF2B5EF4-FFF2-40B4-BE49-F238E27FC236}">
-                <a16:creationId xmlns:a16="http://schemas.microsoft.com/office/drawing/2014/main" xmlns="" id="{38DDDC9A-26AF-4597-AB91-FD4794DCA7FA}"/>
+                <a16:creationId xmlns="" xmlns:a16="http://schemas.microsoft.com/office/drawing/2014/main" id="{38DDDC9A-26AF-4597-AB91-FD4794DCA7FA}"/>
               </a:ext>
             </a:extLst>
           </p:cNvPr>
@@ -9258,7 +9326,7 @@
           <p:cNvPr id="2" name="Titel 1">
             <a:extLst>
               <a:ext uri="{FF2B5EF4-FFF2-40B4-BE49-F238E27FC236}">
-                <a16:creationId xmlns:a16="http://schemas.microsoft.com/office/drawing/2014/main" xmlns="" id="{77054662-E199-4C6D-9DD9-F99ADD6B70CB}"/>
+                <a16:creationId xmlns="" xmlns:a16="http://schemas.microsoft.com/office/drawing/2014/main" id="{77054662-E199-4C6D-9DD9-F99ADD6B70CB}"/>
               </a:ext>
             </a:extLst>
           </p:cNvPr>
@@ -9291,7 +9359,7 @@
           <p:cNvPr id="4" name="Grafik 3">
             <a:extLst>
               <a:ext uri="{FF2B5EF4-FFF2-40B4-BE49-F238E27FC236}">
-                <a16:creationId xmlns:a16="http://schemas.microsoft.com/office/drawing/2014/main" xmlns="" id="{2ABF8F8C-E80E-4DE7-AFBD-AC867B5E9134}"/>
+                <a16:creationId xmlns="" xmlns:a16="http://schemas.microsoft.com/office/drawing/2014/main" id="{2ABF8F8C-E80E-4DE7-AFBD-AC867B5E9134}"/>
               </a:ext>
             </a:extLst>
           </p:cNvPr>
@@ -9321,7 +9389,7 @@
           <p:cNvPr id="3" name="Grafik 2">
             <a:extLst>
               <a:ext uri="{FF2B5EF4-FFF2-40B4-BE49-F238E27FC236}">
-                <a16:creationId xmlns:a16="http://schemas.microsoft.com/office/drawing/2014/main" xmlns="" id="{5037875D-223D-4E6A-B507-1684835F0906}"/>
+                <a16:creationId xmlns="" xmlns:a16="http://schemas.microsoft.com/office/drawing/2014/main" id="{5037875D-223D-4E6A-B507-1684835F0906}"/>
               </a:ext>
             </a:extLst>
           </p:cNvPr>
@@ -9393,7 +9461,7 @@
           <p:cNvPr id="2" name="Titel 1">
             <a:extLst>
               <a:ext uri="{FF2B5EF4-FFF2-40B4-BE49-F238E27FC236}">
-                <a16:creationId xmlns:a16="http://schemas.microsoft.com/office/drawing/2014/main" xmlns="" id="{77054662-E199-4C6D-9DD9-F99ADD6B70CB}"/>
+                <a16:creationId xmlns="" xmlns:a16="http://schemas.microsoft.com/office/drawing/2014/main" id="{77054662-E199-4C6D-9DD9-F99ADD6B70CB}"/>
               </a:ext>
             </a:extLst>
           </p:cNvPr>
@@ -9426,7 +9494,7 @@
           <p:cNvPr id="4" name="Grafik 3">
             <a:extLst>
               <a:ext uri="{FF2B5EF4-FFF2-40B4-BE49-F238E27FC236}">
-                <a16:creationId xmlns:a16="http://schemas.microsoft.com/office/drawing/2014/main" xmlns="" id="{2ABF8F8C-E80E-4DE7-AFBD-AC867B5E9134}"/>
+                <a16:creationId xmlns="" xmlns:a16="http://schemas.microsoft.com/office/drawing/2014/main" id="{2ABF8F8C-E80E-4DE7-AFBD-AC867B5E9134}"/>
               </a:ext>
             </a:extLst>
           </p:cNvPr>
@@ -9456,7 +9524,7 @@
           <p:cNvPr id="5" name="Textfeld 4">
             <a:extLst>
               <a:ext uri="{FF2B5EF4-FFF2-40B4-BE49-F238E27FC236}">
-                <a16:creationId xmlns:a16="http://schemas.microsoft.com/office/drawing/2014/main" xmlns="" id="{7903ABD0-89CF-40E9-8392-5F4320D3B433}"/>
+                <a16:creationId xmlns="" xmlns:a16="http://schemas.microsoft.com/office/drawing/2014/main" id="{7903ABD0-89CF-40E9-8392-5F4320D3B433}"/>
               </a:ext>
             </a:extLst>
           </p:cNvPr>

</xml_diff>